<commit_message>
Copy Files From Source Repo (2025-05-27 04:02)
</commit_message>
<xml_diff>
--- a/ResourceFiles/Mystic Spice Premium Chai Market Analysis Presentation.pptx
+++ b/ResourceFiles/Mystic Spice Premium Chai Market Analysis Presentation.pptx
@@ -1,28 +1,27 @@
 
 <file path=ppt/presentation.xml><?xml version="1.0" encoding="utf-8"?>
-<!--Generated by Aspose.Slides for Java 23.6.1-->
-<p:presentation xmlns:r="http://schemas.openxmlformats.org/officeDocument/2006/relationships" xmlns:a="http://schemas.openxmlformats.org/drawingml/2006/main" xmlns:p="http://schemas.openxmlformats.org/presentationml/2006/main" removePersonalInfoOnSave="1" saveSubsetFonts="1">
+<p:presentation xmlns:a="http://schemas.openxmlformats.org/drawingml/2006/main" xmlns:r="http://schemas.openxmlformats.org/officeDocument/2006/relationships" xmlns:p="http://schemas.openxmlformats.org/presentationml/2006/main" removePersonalInfoOnSave="1" saveSubsetFonts="1">
   <p:sldMasterIdLst>
     <p:sldMasterId id="2147483660" r:id="rId1"/>
   </p:sldMasterIdLst>
   <p:notesMasterIdLst>
-    <p:notesMasterId r:id="rId2"/>
+    <p:notesMasterId r:id="rId16"/>
   </p:notesMasterIdLst>
   <p:sldIdLst>
-    <p:sldId id="256" r:id="rId3"/>
-    <p:sldId id="257" r:id="rId4"/>
-    <p:sldId id="258" r:id="rId5"/>
-    <p:sldId id="259" r:id="rId6"/>
-    <p:sldId id="260" r:id="rId7"/>
-    <p:sldId id="261" r:id="rId8"/>
-    <p:sldId id="262" r:id="rId9"/>
-    <p:sldId id="268" r:id="rId10"/>
-    <p:sldId id="269" r:id="rId11"/>
-    <p:sldId id="270" r:id="rId12"/>
-    <p:sldId id="271" r:id="rId13"/>
-    <p:sldId id="272" r:id="rId14"/>
-    <p:sldId id="273" r:id="rId15"/>
-    <p:sldId id="274" r:id="rId16"/>
+    <p:sldId id="256" r:id="rId2"/>
+    <p:sldId id="257" r:id="rId3"/>
+    <p:sldId id="258" r:id="rId4"/>
+    <p:sldId id="259" r:id="rId5"/>
+    <p:sldId id="260" r:id="rId6"/>
+    <p:sldId id="261" r:id="rId7"/>
+    <p:sldId id="262" r:id="rId8"/>
+    <p:sldId id="268" r:id="rId9"/>
+    <p:sldId id="269" r:id="rId10"/>
+    <p:sldId id="270" r:id="rId11"/>
+    <p:sldId id="271" r:id="rId12"/>
+    <p:sldId id="272" r:id="rId13"/>
+    <p:sldId id="273" r:id="rId14"/>
+    <p:sldId id="274" r:id="rId15"/>
   </p:sldIdLst>
   <p:sldSz cx="12192000" cy="6858000"/>
   <p:notesSz cx="6858000" cy="9144000"/>
@@ -128,13 +127,16 @@
     <p:ext uri="{EFAFB233-063F-42B5-8137-9DF3F51BA10A}">
       <p15:sldGuideLst xmlns:p15="http://schemas.microsoft.com/office/powerpoint/2012/main"/>
     </p:ext>
+    <p:ext uri="{2D200454-40CA-4A62-9FC3-DE9A4176ACB9}">
+      <p15:notesGuideLst xmlns:p15="http://schemas.microsoft.com/office/powerpoint/2012/main"/>
+    </p:ext>
   </p:extLst>
 </p:presentation>
 </file>
 
 <file path=ppt/notesMasters/notesMaster1.xml><?xml version="1.0" encoding="utf-8"?>
-<p:notesMaster xmlns:a="http://schemas.openxmlformats.org/drawingml/2006/main" xmlns:r="http://schemas.openxmlformats.org/officeDocument/2006/relationships" xmlns:m="http://schemas.openxmlformats.org/officeDocument/2006/math" xmlns:w="http://schemas.openxmlformats.org/wordprocessingml/2006/main" xmlns:wp="http://schemas.openxmlformats.org/drawingml/2006/wordprocessingDrawing" xmlns:a14="http://schemas.microsoft.com/office/drawing/2010/main" xmlns:mc="http://schemas.openxmlformats.org/markup-compatibility/2006" xmlns:p14="http://schemas.microsoft.com/office/powerpoint/2010/main" xmlns:p="http://schemas.openxmlformats.org/presentationml/2006/main">
-  <p:cSld name="">
+<p:notesMaster xmlns:a="http://schemas.openxmlformats.org/drawingml/2006/main" xmlns:r="http://schemas.openxmlformats.org/officeDocument/2006/relationships" xmlns:p="http://schemas.openxmlformats.org/presentationml/2006/main">
+  <p:cSld>
     <p:bg>
       <p:bgRef idx="1001">
         <a:schemeClr val="bg1"/>
@@ -150,6 +152,8 @@
         <a:xfrm>
           <a:off x="0" y="0"/>
           <a:ext cx="0" cy="0"/>
+          <a:chOff x="0" y="0"/>
+          <a:chExt cx="0" cy="0"/>
         </a:xfrm>
       </p:grpSpPr>
       <p:sp>
@@ -212,7 +216,7 @@
           <a:p>
             <a:fld id="{4B79337C-AD0D-499E-B6BA-802817985C42}" type="datetimeFigureOut">
               <a:rPr lang="en-US" smtClean="0"/>
-              <a:t>6/26/2024</a:t>
+              <a:t>5/16/2025</a:t>
             </a:fld>
             <a:endParaRPr lang="en-US"/>
           </a:p>
@@ -473,8 +477,8 @@
 </file>
 
 <file path=ppt/notesSlides/notesSlide1.xml><?xml version="1.0" encoding="utf-8"?>
-<p:notes xmlns:a="http://schemas.openxmlformats.org/drawingml/2006/main" xmlns:r="http://schemas.openxmlformats.org/officeDocument/2006/relationships" xmlns:m="http://schemas.openxmlformats.org/officeDocument/2006/math" xmlns:w="http://schemas.openxmlformats.org/wordprocessingml/2006/main" xmlns:wp="http://schemas.openxmlformats.org/drawingml/2006/wordprocessingDrawing" xmlns:a14="http://schemas.microsoft.com/office/drawing/2010/main" xmlns:mc="http://schemas.openxmlformats.org/markup-compatibility/2006" xmlns:p14="http://schemas.microsoft.com/office/powerpoint/2010/main" xmlns:p="http://schemas.openxmlformats.org/presentationml/2006/main">
-  <p:cSld name="">
+<p:notes xmlns:a="http://schemas.openxmlformats.org/drawingml/2006/main" xmlns:r="http://schemas.openxmlformats.org/officeDocument/2006/relationships" xmlns:p="http://schemas.openxmlformats.org/presentationml/2006/main">
+  <p:cSld>
     <p:spTree>
       <p:nvGrpSpPr>
         <p:cNvPr id="1" name=""/>
@@ -485,6 +489,8 @@
         <a:xfrm>
           <a:off x="0" y="0"/>
           <a:ext cx="0" cy="0"/>
+          <a:chOff x="0" y="0"/>
+          <a:chExt cx="0" cy="0"/>
         </a:xfrm>
       </p:grpSpPr>
       <p:sp>
@@ -542,16 +548,6 @@
                 <a:cs typeface="Aptos"/>
               </a:rPr>
               <a:t>https://microsoft-my.sharepoint.com/personal/dahans_microsoft_com/Documents/MS-4005/Market%20Analysis%20Report%20for%20Mystic%20Spice%20Premium%20Chai%20Tea.docx</a:t>
-            </a:r>
-            <a:r>
-              <a:rPr sz="1200"/>
-              <a:t>
-</a:t>
-            </a:r>
-            <a:r>
-              <a:rPr sz="1200"/>
-              <a:t>
-</a:t>
             </a:r>
             <a:r>
               <a:rPr sz="1200"/>
@@ -610,8 +606,8 @@
 </file>
 
 <file path=ppt/notesSlides/notesSlide10.xml><?xml version="1.0" encoding="utf-8"?>
-<p:notes xmlns:a="http://schemas.openxmlformats.org/drawingml/2006/main" xmlns:r="http://schemas.openxmlformats.org/officeDocument/2006/relationships" xmlns:m="http://schemas.openxmlformats.org/officeDocument/2006/math" xmlns:w="http://schemas.openxmlformats.org/wordprocessingml/2006/main" xmlns:wp="http://schemas.openxmlformats.org/drawingml/2006/wordprocessingDrawing" xmlns:a14="http://schemas.microsoft.com/office/drawing/2010/main" xmlns:mc="http://schemas.openxmlformats.org/markup-compatibility/2006" xmlns:p14="http://schemas.microsoft.com/office/powerpoint/2010/main" xmlns:p="http://schemas.openxmlformats.org/presentationml/2006/main">
-  <p:cSld name="">
+<p:notes xmlns:a="http://schemas.openxmlformats.org/drawingml/2006/main" xmlns:r="http://schemas.openxmlformats.org/officeDocument/2006/relationships" xmlns:p="http://schemas.openxmlformats.org/presentationml/2006/main">
+  <p:cSld>
     <p:spTree>
       <p:nvGrpSpPr>
         <p:cNvPr id="1" name=""/>
@@ -622,6 +618,8 @@
         <a:xfrm>
           <a:off x="0" y="0"/>
           <a:ext cx="0" cy="0"/>
+          <a:chOff x="0" y="0"/>
+          <a:chExt cx="0" cy="0"/>
         </a:xfrm>
       </p:grpSpPr>
       <p:sp>
@@ -661,7 +659,12 @@
                 <a:ea typeface="Aptos"/>
                 <a:cs typeface="Aptos"/>
               </a:rPr>
-              <a:t>Distributor mewakili dan mendistribusikan produk teh Chai, memfasilitasi pergerakan dan penjualan mereka, serta menawarkan layanan pemasaran, penjualan, dan purna jual.</a:t>
+              <a:t>Distributor mewakili dan mendistribusikan produk teh Chai, memfasilitasi pergerakan dan penjualan mereka, serta menawarkan layanan pemasaran, penjualan, dan purna jual. Mereka menjalin dan memelihara hubungan dengan peritel dan konsumen, serta memberikan dukungan teknis dan logistik. Distributor utama di Amerika Latin termasuk Unilever, Nestle, Coca-Cola, dan PepsiCo.</a:t>
+            </a:r>
+            <a:r>
+              <a:rPr sz="1200"/>
+              <a:t>
+</a:t>
             </a:r>
             <a:r>
               <a:rPr lang="id-ID" sz="1200" b="0" i="0" strike="noStrike" cap="none" baseline="0">
@@ -673,7 +676,12 @@
                 <a:ea typeface="Aptos"/>
                 <a:cs typeface="Aptos"/>
               </a:rPr>
-              <a:t> </a:t>
+              <a:t>Konten Asli:</a:t>
+            </a:r>
+            <a:r>
+              <a:rPr sz="1200"/>
+              <a:t>
+</a:t>
             </a:r>
             <a:r>
               <a:rPr lang="id-ID" sz="1200" b="0" i="0" strike="noStrike" cap="none" baseline="0">
@@ -685,147 +693,7 @@
                 <a:ea typeface="Aptos"/>
                 <a:cs typeface="Aptos"/>
               </a:rPr>
-              <a:t>Mereka menjalin dan memelihara hubungan dengan peritel dan konsumen, serta memberikan dukungan teknis dan logistik.</a:t>
-            </a:r>
-            <a:r>
-              <a:rPr lang="id-ID" sz="1200" b="0" i="0" strike="noStrike" cap="none" baseline="0">
-                <a:solidFill>
-                  <a:srgbClr val="000000"/>
-                </a:solidFill>
-                <a:effectLst/>
-                <a:latin typeface="Aptos"/>
-                <a:ea typeface="Aptos"/>
-                <a:cs typeface="Aptos"/>
-              </a:rPr>
-              <a:t> </a:t>
-            </a:r>
-            <a:r>
-              <a:rPr lang="id-ID" sz="1200" b="0" i="0" strike="noStrike" cap="none" baseline="0">
-                <a:solidFill>
-                  <a:srgbClr val="000000"/>
-                </a:solidFill>
-                <a:effectLst/>
-                <a:latin typeface="Aptos"/>
-                <a:ea typeface="Aptos"/>
-                <a:cs typeface="Aptos"/>
-              </a:rPr>
-              <a:t>Distributor utama di Amerika Latin termasuk Unilever, Nestle, Coca-Cola, dan PepsiCo.</a:t>
-            </a:r>
-            <a:r>
-              <a:rPr sz="1200"/>
-              <a:t>
-</a:t>
-            </a:r>
-            <a:r>
-              <a:rPr sz="1200"/>
-              <a:t>
-</a:t>
-            </a:r>
-            <a:r>
-              <a:rPr sz="1200"/>
-              <a:t>
-</a:t>
-            </a:r>
-            <a:r>
-              <a:rPr lang="id-ID" sz="1200" b="0" i="0" strike="noStrike" cap="none" baseline="0">
-                <a:solidFill>
-                  <a:srgbClr val="000000"/>
-                </a:solidFill>
-                <a:effectLst/>
-                <a:latin typeface="Aptos"/>
-                <a:ea typeface="Aptos"/>
-                <a:cs typeface="Aptos"/>
-              </a:rPr>
-              <a:t>Konten Asli:</a:t>
-            </a:r>
-            <a:r>
-              <a:rPr sz="1200"/>
-              <a:t>
-</a:t>
-            </a:r>
-            <a:r>
-              <a:rPr lang="id-ID" sz="1200" b="0" i="0" strike="noStrike" cap="none" baseline="0">
-                <a:solidFill>
-                  <a:srgbClr val="000000"/>
-                </a:solidFill>
-                <a:effectLst/>
-                <a:latin typeface="Aptos"/>
-                <a:ea typeface="Aptos"/>
-                <a:cs typeface="Aptos"/>
-              </a:rPr>
-              <a:t>Distributor adalah bisnis yang mewakili dan mendistribusikan produk teh Chai mewakili produsen atau grosir.</a:t>
-            </a:r>
-            <a:r>
-              <a:rPr lang="id-ID" sz="1200" b="0" i="0" strike="noStrike" cap="none" baseline="0">
-                <a:solidFill>
-                  <a:srgbClr val="000000"/>
-                </a:solidFill>
-                <a:effectLst/>
-                <a:latin typeface="Aptos"/>
-                <a:ea typeface="Aptos"/>
-                <a:cs typeface="Aptos"/>
-              </a:rPr>
-              <a:t> </a:t>
-            </a:r>
-            <a:r>
-              <a:rPr lang="id-ID" sz="1200" b="0" i="0" strike="noStrike" cap="none" baseline="0">
-                <a:solidFill>
-                  <a:srgbClr val="000000"/>
-                </a:solidFill>
-                <a:effectLst/>
-                <a:latin typeface="Aptos"/>
-                <a:ea typeface="Aptos"/>
-                <a:cs typeface="Aptos"/>
-              </a:rPr>
-              <a:t>Distributor adalah agen yang memfasilitasi pergerakan dan penjualan produk teh Chai di berbagai pasar dan wilayah, dan mereka dapat menawarkan layanan pemasaran, penjualan, dan purna jual untuk produk teh Chai.</a:t>
-            </a:r>
-            <a:r>
-              <a:rPr lang="id-ID" sz="1200" b="0" i="0" strike="noStrike" cap="none" baseline="0">
-                <a:solidFill>
-                  <a:srgbClr val="000000"/>
-                </a:solidFill>
-                <a:effectLst/>
-                <a:latin typeface="Aptos"/>
-                <a:ea typeface="Aptos"/>
-                <a:cs typeface="Aptos"/>
-              </a:rPr>
-              <a:t> </a:t>
-            </a:r>
-            <a:r>
-              <a:rPr lang="id-ID" sz="1200" b="0" i="0" strike="noStrike" cap="none" baseline="0">
-                <a:solidFill>
-                  <a:srgbClr val="000000"/>
-                </a:solidFill>
-                <a:effectLst/>
-                <a:latin typeface="Aptos"/>
-                <a:ea typeface="Aptos"/>
-                <a:cs typeface="Aptos"/>
-              </a:rPr>
-              <a:t>Distributor juga dapat menjalin dan memelihara hubungan dengan peritel dan konsumen, serta memberikan dukungan teknis dan logistik untuk produk teh Chai.</a:t>
-            </a:r>
-            <a:r>
-              <a:rPr lang="id-ID" sz="1200" b="0" i="0" strike="noStrike" cap="none" baseline="0">
-                <a:solidFill>
-                  <a:srgbClr val="000000"/>
-                </a:solidFill>
-                <a:effectLst/>
-                <a:latin typeface="Aptos"/>
-                <a:ea typeface="Aptos"/>
-                <a:cs typeface="Aptos"/>
-              </a:rPr>
-              <a:t> </a:t>
-            </a:r>
-            <a:r>
-              <a:rPr lang="id-ID" sz="1200" b="0" i="0" strike="noStrike" cap="none" baseline="0">
-                <a:solidFill>
-                  <a:srgbClr val="000000"/>
-                </a:solidFill>
-                <a:effectLst/>
-                <a:latin typeface="Aptos"/>
-                <a:ea typeface="Aptos"/>
-                <a:cs typeface="Aptos"/>
-              </a:rPr>
-              <a:t>Beberapa distributor utama produk teh Chai di Amerika Latin adalah Unilever, Nestle, Coca-Cola, dan PepsiCo.</a:t>
+              <a:t>Distributor adalah bisnis yang mewakili dan mendistribusikan produk teh Chai mewakili produsen atau grosir. Distributor adalah agen yang memfasilitasi pergerakan dan penjualan produk teh Chai di berbagai pasar dan wilayah, dan mereka dapat menawarkan layanan pemasaran, penjualan, dan purna jual untuk produk teh Chai. Distributor juga dapat menjalin dan memelihara hubungan dengan peritel dan konsumen, serta memberikan dukungan teknis dan logistik untuk produk teh Chai. Beberapa distributor utama produk teh Chai di Amerika Latin adalah Unilever, Nestle, Coca-Cola, dan PepsiCo.</a:t>
             </a:r>
             <a:r>
               <a:rPr sz="1200"/>
@@ -872,8 +740,8 @@
 </file>
 
 <file path=ppt/notesSlides/notesSlide11.xml><?xml version="1.0" encoding="utf-8"?>
-<p:notes xmlns:a="http://schemas.openxmlformats.org/drawingml/2006/main" xmlns:r="http://schemas.openxmlformats.org/officeDocument/2006/relationships" xmlns:m="http://schemas.openxmlformats.org/officeDocument/2006/math" xmlns:w="http://schemas.openxmlformats.org/wordprocessingml/2006/main" xmlns:wp="http://schemas.openxmlformats.org/drawingml/2006/wordprocessingDrawing" xmlns:a14="http://schemas.microsoft.com/office/drawing/2010/main" xmlns:mc="http://schemas.openxmlformats.org/markup-compatibility/2006" xmlns:p14="http://schemas.microsoft.com/office/powerpoint/2010/main" xmlns:p="http://schemas.openxmlformats.org/presentationml/2006/main">
-  <p:cSld name="">
+<p:notes xmlns:a="http://schemas.openxmlformats.org/drawingml/2006/main" xmlns:r="http://schemas.openxmlformats.org/officeDocument/2006/relationships" xmlns:p="http://schemas.openxmlformats.org/presentationml/2006/main">
+  <p:cSld>
     <p:spTree>
       <p:nvGrpSpPr>
         <p:cNvPr id="1" name=""/>
@@ -884,6 +752,8 @@
         <a:xfrm>
           <a:off x="0" y="0"/>
           <a:ext cx="0" cy="0"/>
+          <a:chOff x="0" y="0"/>
+          <a:chExt cx="0" cy="0"/>
         </a:xfrm>
       </p:grpSpPr>
       <p:sp>
@@ -923,7 +793,12 @@
                 <a:ea typeface="Aptos"/>
                 <a:cs typeface="Aptos"/>
               </a:rPr>
-              <a:t>Rencana promosi dan strategi untuk teh Chai di Amerika Latin bertujuan untuk meningkatkan kesadaran, memosisikannya sebagai produk premium, mendorong percobaan dan pembelian, dan membangun loyalitas.</a:t>
+              <a:t>Rencana promosi dan strategi untuk teh Chai di Amerika Latin bertujuan untuk meningkatkan kesadaran, memosisikannya sebagai produk premium, mendorong percobaan dan pembelian, dan membangun loyalitas. Taktik termasuk membuat nama merek dan logo, mengembangkan situs web dan kehadiran media sosial, meluncurkan kampanye pemasaran digital, mendistribusikan sampel gratis, mengatur acara, dan bermitra dengan bisnis lokal. Rencana ini akan diimplementasikan selama 12 bulan dengan anggaran $100.000 dan dievaluasi menggunakan indikator performa utama.</a:t>
+            </a:r>
+            <a:r>
+              <a:rPr sz="1200"/>
+              <a:t>
+</a:t>
             </a:r>
             <a:r>
               <a:rPr lang="id-ID" sz="1200" b="0" i="0" strike="noStrike" cap="none" baseline="0">
@@ -935,7 +810,12 @@
                 <a:ea typeface="Aptos"/>
                 <a:cs typeface="Aptos"/>
               </a:rPr>
-              <a:t> </a:t>
+              <a:t>Konten Asli:</a:t>
+            </a:r>
+            <a:r>
+              <a:rPr sz="1200"/>
+              <a:t>
+</a:t>
             </a:r>
             <a:r>
               <a:rPr lang="id-ID" sz="1200" b="0" i="0" strike="noStrike" cap="none" baseline="0">
@@ -947,7 +827,12 @@
                 <a:ea typeface="Aptos"/>
                 <a:cs typeface="Aptos"/>
               </a:rPr>
-              <a:t>Taktik termasuk membuat nama merek dan logo, mengembangkan situs web dan kehadiran media sosial, meluncurkan kampanye pemasaran digital, mendistribusikan sampel gratis, mengatur acara, dan bermitra dengan bisnis lokal.</a:t>
+              <a:t>Rencana Promosi dan Strategi</a:t>
+            </a:r>
+            <a:r>
+              <a:rPr sz="1200"/>
+              <a:t>
+</a:t>
             </a:r>
             <a:r>
               <a:rPr lang="id-ID" sz="1200" b="0" i="0" strike="noStrike" cap="none" baseline="0">
@@ -959,7 +844,12 @@
                 <a:ea typeface="Aptos"/>
                 <a:cs typeface="Aptos"/>
               </a:rPr>
-              <a:t> </a:t>
+              <a:t>Rencana promosi dan strategi untuk teh Chai di Amerika Latin bertujuan untuk mencapai tujuan berikut:</a:t>
+            </a:r>
+            <a:r>
+              <a:rPr sz="1200"/>
+              <a:t>
+</a:t>
             </a:r>
             <a:r>
               <a:rPr lang="id-ID" sz="1200" b="0" i="0" strike="noStrike" cap="none" baseline="0">
@@ -971,7 +861,7 @@
                 <a:ea typeface="Aptos"/>
                 <a:cs typeface="Aptos"/>
               </a:rPr>
-              <a:t>Rencana ini akan diimplementasikan selama 12 bulan dengan anggaran $100.000 dan dievaluasi menggunakan indikator performa utama.</a:t>
+              <a:t>·         Meningkatkan kesadaran dan minat terhadap teh Chai di antara audiens target</a:t>
             </a:r>
             <a:r>
               <a:rPr sz="1200"/>
@@ -979,11 +869,35 @@
 </a:t>
             </a:r>
             <a:r>
+              <a:rPr lang="id-ID" sz="1200" b="0" i="0" strike="noStrike" cap="none" baseline="0">
+                <a:solidFill>
+                  <a:srgbClr val="000000"/>
+                </a:solidFill>
+                <a:effectLst/>
+                <a:latin typeface="Aptos"/>
+                <a:ea typeface="Aptos"/>
+                <a:cs typeface="Aptos"/>
+              </a:rPr>
+              <a:t>·         Memosisikan teh Chai sebagai produk premium, alami, dan sehat yang menawarkan pengalaman yang unik dan memuaskan</a:t>
+            </a:r>
+            <a:r>
               <a:rPr sz="1200"/>
               <a:t>
 </a:t>
             </a:r>
             <a:r>
+              <a:rPr lang="id-ID" sz="1200" b="0" i="0" strike="noStrike" cap="none" baseline="0">
+                <a:solidFill>
+                  <a:srgbClr val="000000"/>
+                </a:solidFill>
+                <a:effectLst/>
+                <a:latin typeface="Aptos"/>
+                <a:ea typeface="Aptos"/>
+                <a:cs typeface="Aptos"/>
+              </a:rPr>
+              <a:t>·         Mendorong uji coba dan pembelian teh Chai melalui berbagai saluran dan insentif</a:t>
+            </a:r>
+            <a:r>
               <a:rPr sz="1200"/>
               <a:t>
 </a:t>
@@ -998,7 +912,7 @@
                 <a:ea typeface="Aptos"/>
                 <a:cs typeface="Aptos"/>
               </a:rPr>
-              <a:t>Konten Asli:</a:t>
+              <a:t>·         Membangun loyalitas dan retensi di antara konsumen teh Chai melalui keterlibatan dan umpan balik</a:t>
             </a:r>
             <a:r>
               <a:rPr sz="1200"/>
@@ -1015,7 +929,7 @@
                 <a:ea typeface="Aptos"/>
                 <a:cs typeface="Aptos"/>
               </a:rPr>
-              <a:t>Rencana Promosi dan Strategi</a:t>
+              <a:t>Rencana promosi dan strategi untuk teh Chai di Amerika Latin akan menggunakan kombinasi taktik, seperti:</a:t>
             </a:r>
             <a:r>
               <a:rPr sz="1200"/>
@@ -1032,7 +946,7 @@
                 <a:ea typeface="Aptos"/>
                 <a:cs typeface="Aptos"/>
               </a:rPr>
-              <a:t>Rencana promosi dan strategi untuk teh Chai di Amerika Latin bertujuan untuk mencapai tujuan berikut:</a:t>
+              <a:t>·         Membuat nama dan logo merek yang menarik dan mudah diingat untuk teh Chai</a:t>
             </a:r>
             <a:r>
               <a:rPr sz="1200"/>
@@ -1049,7 +963,7 @@
                 <a:ea typeface="Aptos"/>
                 <a:cs typeface="Aptos"/>
               </a:rPr>
-              <a:t>·         Meningkatkan kesadaran dan minat terhadap teh Chai di antara audiens target</a:t>
+              <a:t>·         Mengembangkan situs web dan kehadiran media sosial untuk teh Chai yang menampilkan manfaat, fitur, dan ceritanya</a:t>
             </a:r>
             <a:r>
               <a:rPr sz="1200"/>
@@ -1066,7 +980,7 @@
                 <a:ea typeface="Aptos"/>
                 <a:cs typeface="Aptos"/>
               </a:rPr>
-              <a:t>·         Memosisikan teh Chai sebagai produk premium, alami, dan sehat yang menawarkan pengalaman yang unik dan memuaskan</a:t>
+              <a:t>·         Meluncurkan kampanye pemasaran digital yang menggunakan SEO, SEM, pemasaran email, dan influencer marketing untuk menjangkau dan menarik pelanggan potensial</a:t>
             </a:r>
             <a:r>
               <a:rPr sz="1200"/>
@@ -1083,7 +997,7 @@
                 <a:ea typeface="Aptos"/>
                 <a:cs typeface="Aptos"/>
               </a:rPr>
-              <a:t>·         Mendorong uji coba dan pembelian teh Chai melalui berbagai saluran dan insentif</a:t>
+              <a:t>·         Mendistribusikan sampel gratis dan kupon teh Chai di lokasi strategis, seperti supermarket, kafe, dan toko kesehatan</a:t>
             </a:r>
             <a:r>
               <a:rPr sz="1200"/>
@@ -1100,7 +1014,7 @@
                 <a:ea typeface="Aptos"/>
                 <a:cs typeface="Aptos"/>
               </a:rPr>
-              <a:t>·         Membangun loyalitas dan retensi di antara konsumen teh Chai melalui keterlibatan dan umpan balik</a:t>
+              <a:t>·         Menyelenggarakan acara dan kontes yang mengundang orang untuk mencoba dan berbagi teh Chai dengan teman dan keluarga mereka</a:t>
             </a:r>
             <a:r>
               <a:rPr sz="1200"/>
@@ -1117,7 +1031,7 @@
                 <a:ea typeface="Aptos"/>
                 <a:cs typeface="Aptos"/>
               </a:rPr>
-              <a:t>Rencana promosi dan strategi untuk teh Chai di Amerika Latin akan menggunakan kombinasi taktik, seperti:</a:t>
+              <a:t>·         Bermitra dengan bisnis dan organisasi lokal yang memiliki nilai dan visi yang sama dengan teh Chai</a:t>
             </a:r>
             <a:r>
               <a:rPr sz="1200"/>
@@ -1134,133 +1048,7 @@
                 <a:ea typeface="Aptos"/>
                 <a:cs typeface="Aptos"/>
               </a:rPr>
-              <a:t>·         Membuat nama dan logo merek yang menarik dan mudah diingat untuk teh Chai</a:t>
-            </a:r>
-            <a:r>
-              <a:rPr sz="1200"/>
-              <a:t>
-</a:t>
-            </a:r>
-            <a:r>
-              <a:rPr lang="id-ID" sz="1200" b="0" i="0" strike="noStrike" cap="none" baseline="0">
-                <a:solidFill>
-                  <a:srgbClr val="000000"/>
-                </a:solidFill>
-                <a:effectLst/>
-                <a:latin typeface="Aptos"/>
-                <a:ea typeface="Aptos"/>
-                <a:cs typeface="Aptos"/>
-              </a:rPr>
-              <a:t>·         Mengembangkan situs web dan kehadiran media sosial untuk teh Chai yang menampilkan manfaat, fitur, dan ceritanya</a:t>
-            </a:r>
-            <a:r>
-              <a:rPr sz="1200"/>
-              <a:t>
-</a:t>
-            </a:r>
-            <a:r>
-              <a:rPr lang="id-ID" sz="1200" b="0" i="0" strike="noStrike" cap="none" baseline="0">
-                <a:solidFill>
-                  <a:srgbClr val="000000"/>
-                </a:solidFill>
-                <a:effectLst/>
-                <a:latin typeface="Aptos"/>
-                <a:ea typeface="Aptos"/>
-                <a:cs typeface="Aptos"/>
-              </a:rPr>
-              <a:t>·         Meluncurkan kampanye pemasaran digital yang menggunakan SEO, SEM, pemasaran email, dan influencer marketing untuk menjangkau dan menarik pelanggan potensial</a:t>
-            </a:r>
-            <a:r>
-              <a:rPr sz="1200"/>
-              <a:t>
-</a:t>
-            </a:r>
-            <a:r>
-              <a:rPr lang="id-ID" sz="1200" b="0" i="0" strike="noStrike" cap="none" baseline="0">
-                <a:solidFill>
-                  <a:srgbClr val="000000"/>
-                </a:solidFill>
-                <a:effectLst/>
-                <a:latin typeface="Aptos"/>
-                <a:ea typeface="Aptos"/>
-                <a:cs typeface="Aptos"/>
-              </a:rPr>
-              <a:t>·         Mendistribusikan sampel gratis dan kupon teh Chai di lokasi strategis, seperti supermarket, kafe, dan toko kesehatan</a:t>
-            </a:r>
-            <a:r>
-              <a:rPr sz="1200"/>
-              <a:t>
-</a:t>
-            </a:r>
-            <a:r>
-              <a:rPr lang="id-ID" sz="1200" b="0" i="0" strike="noStrike" cap="none" baseline="0">
-                <a:solidFill>
-                  <a:srgbClr val="000000"/>
-                </a:solidFill>
-                <a:effectLst/>
-                <a:latin typeface="Aptos"/>
-                <a:ea typeface="Aptos"/>
-                <a:cs typeface="Aptos"/>
-              </a:rPr>
-              <a:t>·         Menyelenggarakan acara dan kontes yang mengundang orang untuk mencoba dan berbagi teh Chai dengan teman dan keluarga mereka</a:t>
-            </a:r>
-            <a:r>
-              <a:rPr sz="1200"/>
-              <a:t>
-</a:t>
-            </a:r>
-            <a:r>
-              <a:rPr lang="id-ID" sz="1200" b="0" i="0" strike="noStrike" cap="none" baseline="0">
-                <a:solidFill>
-                  <a:srgbClr val="000000"/>
-                </a:solidFill>
-                <a:effectLst/>
-                <a:latin typeface="Aptos"/>
-                <a:ea typeface="Aptos"/>
-                <a:cs typeface="Aptos"/>
-              </a:rPr>
-              <a:t>·         Bermitra dengan bisnis dan organisasi lokal yang memiliki nilai dan visi yang sama dengan teh Chai</a:t>
-            </a:r>
-            <a:r>
-              <a:rPr sz="1200"/>
-              <a:t>
-</a:t>
-            </a:r>
-            <a:r>
-              <a:rPr lang="id-ID" sz="1200" b="0" i="0" strike="noStrike" cap="none" baseline="0">
-                <a:solidFill>
-                  <a:srgbClr val="000000"/>
-                </a:solidFill>
-                <a:effectLst/>
-                <a:latin typeface="Aptos"/>
-                <a:ea typeface="Aptos"/>
-                <a:cs typeface="Aptos"/>
-              </a:rPr>
-              <a:t>Rencana promosi dan strategi untuk teh Chai di Amerika Latin akan diterapkan selama periode 12 bulan, dengan anggaran $ 100.000.</a:t>
-            </a:r>
-            <a:r>
-              <a:rPr lang="id-ID" sz="1200" b="0" i="0" strike="noStrike" cap="none" baseline="0">
-                <a:solidFill>
-                  <a:srgbClr val="000000"/>
-                </a:solidFill>
-                <a:effectLst/>
-                <a:latin typeface="Aptos"/>
-                <a:ea typeface="Aptos"/>
-                <a:cs typeface="Aptos"/>
-              </a:rPr>
-              <a:t> </a:t>
-            </a:r>
-            <a:r>
-              <a:rPr lang="id-ID" sz="1200" b="0" i="0" strike="noStrike" cap="none" baseline="0">
-                <a:solidFill>
-                  <a:srgbClr val="000000"/>
-                </a:solidFill>
-                <a:effectLst/>
-                <a:latin typeface="Aptos"/>
-                <a:ea typeface="Aptos"/>
-                <a:cs typeface="Aptos"/>
-              </a:rPr>
-              <a:t>Rencana ini akan dipantau dan dievaluasi menggunakan indikator performa utama, seperti lalu lintas situs web, keterlibatan media sosial, tingkat email yang dibuka, tingkat konversi, volume penjualan, kepuasan pelanggan, dan tingkat retensi.</a:t>
+              <a:t>Rencana promosi dan strategi untuk teh Chai di Amerika Latin akan diterapkan selama periode 12 bulan, dengan anggaran $ 100.000. Rencana ini akan dipantau dan dievaluasi menggunakan indikator performa utama, seperti lalu lintas situs web, keterlibatan media sosial, tingkat email yang dibuka, tingkat konversi, volume penjualan, kepuasan pelanggan, dan tingkat retensi.</a:t>
             </a:r>
             <a:r>
               <a:rPr sz="1200"/>
@@ -1307,8 +1095,8 @@
 </file>
 
 <file path=ppt/notesSlides/notesSlide12.xml><?xml version="1.0" encoding="utf-8"?>
-<p:notes xmlns:a="http://schemas.openxmlformats.org/drawingml/2006/main" xmlns:r="http://schemas.openxmlformats.org/officeDocument/2006/relationships" xmlns:m="http://schemas.openxmlformats.org/officeDocument/2006/math" xmlns:w="http://schemas.openxmlformats.org/wordprocessingml/2006/main" xmlns:wp="http://schemas.openxmlformats.org/drawingml/2006/wordprocessingDrawing" xmlns:a14="http://schemas.microsoft.com/office/drawing/2010/main" xmlns:mc="http://schemas.openxmlformats.org/markup-compatibility/2006" xmlns:p14="http://schemas.microsoft.com/office/powerpoint/2010/main" xmlns:p="http://schemas.openxmlformats.org/presentationml/2006/main">
-  <p:cSld name="">
+<p:notes xmlns:a="http://schemas.openxmlformats.org/drawingml/2006/main" xmlns:r="http://schemas.openxmlformats.org/officeDocument/2006/relationships" xmlns:p="http://schemas.openxmlformats.org/presentationml/2006/main">
+  <p:cSld>
     <p:spTree>
       <p:nvGrpSpPr>
         <p:cNvPr id="1" name=""/>
@@ -1319,6 +1107,8 @@
         <a:xfrm>
           <a:off x="0" y="0"/>
           <a:ext cx="0" cy="0"/>
+          <a:chOff x="0" y="0"/>
+          <a:chExt cx="0" cy="0"/>
         </a:xfrm>
       </p:grpSpPr>
       <p:sp>
@@ -1359,16 +1149,6 @@
                 <a:cs typeface="Aptos"/>
               </a:rPr>
               <a:t>Rencana promosi dan strategi untuk teh Chai di Amerika Latin diperkirakan akan menghasilkan peningkatan 20% dalam kesadaran dan minat, peningkatan 10% dalam pangsa pasar, peningkatan 15% dalam volume penjualan dan pendapatan, dan peningkatan 25% dalam tingkat kepuasan dan retensi pelanggan.</a:t>
-            </a:r>
-            <a:r>
-              <a:rPr sz="1200"/>
-              <a:t>
-</a:t>
-            </a:r>
-            <a:r>
-              <a:rPr sz="1200"/>
-              <a:t>
-</a:t>
             </a:r>
             <a:r>
               <a:rPr sz="1200"/>
@@ -1534,8 +1314,8 @@
 </file>
 
 <file path=ppt/notesSlides/notesSlide13.xml><?xml version="1.0" encoding="utf-8"?>
-<p:notes xmlns:a="http://schemas.openxmlformats.org/drawingml/2006/main" xmlns:r="http://schemas.openxmlformats.org/officeDocument/2006/relationships" xmlns:m="http://schemas.openxmlformats.org/officeDocument/2006/math" xmlns:w="http://schemas.openxmlformats.org/wordprocessingml/2006/main" xmlns:wp="http://schemas.openxmlformats.org/drawingml/2006/wordprocessingDrawing" xmlns:a14="http://schemas.microsoft.com/office/drawing/2010/main" xmlns:mc="http://schemas.openxmlformats.org/markup-compatibility/2006" xmlns:p14="http://schemas.microsoft.com/office/powerpoint/2010/main" xmlns:p="http://schemas.openxmlformats.org/presentationml/2006/main">
-  <p:cSld name="">
+<p:notes xmlns:a="http://schemas.openxmlformats.org/drawingml/2006/main" xmlns:r="http://schemas.openxmlformats.org/officeDocument/2006/relationships" xmlns:p="http://schemas.openxmlformats.org/presentationml/2006/main">
+  <p:cSld>
     <p:spTree>
       <p:nvGrpSpPr>
         <p:cNvPr id="1" name=""/>
@@ -1546,6 +1326,8 @@
         <a:xfrm>
           <a:off x="0" y="0"/>
           <a:ext cx="0" cy="0"/>
+          <a:chOff x="0" y="0"/>
+          <a:chExt cx="0" cy="0"/>
         </a:xfrm>
       </p:grpSpPr>
       <p:sp>
@@ -1586,16 +1368,6 @@
                 <a:cs typeface="Aptos"/>
               </a:rPr>
               <a:t>Rencana promosi dan strategi untuk teh Chai di Amerika Latin menghadapi beberapa tantangan, termasuk harga tinggi, kurangnya kesadaran, persaingan dari produk teh lainnya, hambatan peraturan dan budaya, dan masalah lingkungan dan sosial yang dapat memengaruhi pasokan dan kualitas bahan teh Chai.</a:t>
-            </a:r>
-            <a:r>
-              <a:rPr sz="1200"/>
-              <a:t>
-</a:t>
-            </a:r>
-            <a:r>
-              <a:rPr sz="1200"/>
-              <a:t>
-</a:t>
             </a:r>
             <a:r>
               <a:rPr sz="1200"/>
@@ -1761,8 +1533,8 @@
 </file>
 
 <file path=ppt/notesSlides/notesSlide14.xml><?xml version="1.0" encoding="utf-8"?>
-<p:notes xmlns:a="http://schemas.openxmlformats.org/drawingml/2006/main" xmlns:r="http://schemas.openxmlformats.org/officeDocument/2006/relationships" xmlns:m="http://schemas.openxmlformats.org/officeDocument/2006/math" xmlns:w="http://schemas.openxmlformats.org/wordprocessingml/2006/main" xmlns:wp="http://schemas.openxmlformats.org/drawingml/2006/wordprocessingDrawing" xmlns:a14="http://schemas.microsoft.com/office/drawing/2010/main" xmlns:mc="http://schemas.openxmlformats.org/markup-compatibility/2006" xmlns:p14="http://schemas.microsoft.com/office/powerpoint/2010/main" xmlns:p="http://schemas.openxmlformats.org/presentationml/2006/main">
-  <p:cSld name="">
+<p:notes xmlns:a="http://schemas.openxmlformats.org/drawingml/2006/main" xmlns:r="http://schemas.openxmlformats.org/officeDocument/2006/relationships" xmlns:p="http://schemas.openxmlformats.org/presentationml/2006/main">
+  <p:cSld>
     <p:spTree>
       <p:nvGrpSpPr>
         <p:cNvPr id="1" name=""/>
@@ -1773,6 +1545,8 @@
         <a:xfrm>
           <a:off x="0" y="0"/>
           <a:ext cx="0" cy="0"/>
+          <a:chOff x="0" y="0"/>
+          <a:chExt cx="0" cy="0"/>
         </a:xfrm>
       </p:grpSpPr>
       <p:sp>
@@ -1812,7 +1586,12 @@
                 <a:ea typeface="Aptos"/>
                 <a:cs typeface="Aptos"/>
               </a:rPr>
-              <a:t>Teh Chai adalah produk yang menjanjikan di pasar Amerika Latin, menawarkan alternatif yang sehat dan eksotis.</a:t>
+              <a:t>Teh Chai adalah produk yang menjanjikan di pasar Amerika Latin, menawarkan alternatif yang sehat dan eksotis. Ini harus diposisikan sebagai produk premium dan serbaguna, memanfaatkan fitur dan manfaat uniknya. Campuran taktik online dan offline harus digunakan untuk menjangkau audiens target dan mengatasi tantangan.</a:t>
+            </a:r>
+            <a:r>
+              <a:rPr sz="1200"/>
+              <a:t>
+</a:t>
             </a:r>
             <a:r>
               <a:rPr lang="id-ID" sz="1200" b="0" i="0" strike="noStrike" cap="none" baseline="0">
@@ -1824,7 +1603,12 @@
                 <a:ea typeface="Aptos"/>
                 <a:cs typeface="Aptos"/>
               </a:rPr>
-              <a:t> </a:t>
+              <a:t>Konten Asli:</a:t>
+            </a:r>
+            <a:r>
+              <a:rPr sz="1200"/>
+              <a:t>
+</a:t>
             </a:r>
             <a:r>
               <a:rPr lang="id-ID" sz="1200" b="0" i="0" strike="noStrike" cap="none" baseline="0">
@@ -1836,7 +1620,12 @@
                 <a:ea typeface="Aptos"/>
                 <a:cs typeface="Aptos"/>
               </a:rPr>
-              <a:t>Ini harus diposisikan sebagai produk premium dan serbaguna, memanfaatkan fitur dan manfaat uniknya.</a:t>
+              <a:t>Rekomendasi dan Kesimpulan</a:t>
+            </a:r>
+            <a:r>
+              <a:rPr sz="1200"/>
+              <a:t>
+</a:t>
             </a:r>
             <a:r>
               <a:rPr lang="id-ID" sz="1200" b="0" i="0" strike="noStrike" cap="none" baseline="0">
@@ -1848,7 +1637,12 @@
                 <a:ea typeface="Aptos"/>
                 <a:cs typeface="Aptos"/>
               </a:rPr>
-              <a:t> </a:t>
+              <a:t>Berdasarkan analisis pasar, analisis kompetitif, saluran distribusi, dan rencana dan strategi promosi, rekomendasi dan kesimpulan berikut dapat diambil untuk masa depan teh Chai di Amerika Latin:</a:t>
+            </a:r>
+            <a:r>
+              <a:rPr sz="1200"/>
+              <a:t>
+</a:t>
             </a:r>
             <a:r>
               <a:rPr lang="id-ID" sz="1200" b="0" i="0" strike="noStrike" cap="none" baseline="0">
@@ -1860,7 +1654,7 @@
                 <a:ea typeface="Aptos"/>
                 <a:cs typeface="Aptos"/>
               </a:rPr>
-              <a:t>Campuran taktik online dan offline harus digunakan untuk menjangkau audiens target dan mengatasi tantangan.</a:t>
+              <a:t>·         Teh Chai adalah produk menjanjikan yang memiliki potensi untuk tumbuh dan sukses di pasar Amerika Latin, karena menawarkan alternatif yang sehat, alami, dan eksotis untuk minuman lainnya</a:t>
             </a:r>
             <a:r>
               <a:rPr sz="1200"/>
@@ -1868,11 +1662,35 @@
 </a:t>
             </a:r>
             <a:r>
+              <a:rPr lang="id-ID" sz="1200" b="0" i="0" strike="noStrike" cap="none" baseline="0">
+                <a:solidFill>
+                  <a:srgbClr val="000000"/>
+                </a:solidFill>
+                <a:effectLst/>
+                <a:latin typeface="Aptos"/>
+                <a:ea typeface="Aptos"/>
+                <a:cs typeface="Aptos"/>
+              </a:rPr>
+              <a:t>·         Teh Chai perlu diposisikan dan dipasarkan sebagai produk premium, autentik, dan serbaguna yang bisa menarik untuk berbagai segmen dan kesempatan</a:t>
+            </a:r>
+            <a:r>
               <a:rPr sz="1200"/>
               <a:t>
 </a:t>
             </a:r>
             <a:r>
+              <a:rPr lang="id-ID" sz="1200" b="0" i="0" strike="noStrike" cap="none" baseline="0">
+                <a:solidFill>
+                  <a:srgbClr val="000000"/>
+                </a:solidFill>
+                <a:effectLst/>
+                <a:latin typeface="Aptos"/>
+                <a:ea typeface="Aptos"/>
+                <a:cs typeface="Aptos"/>
+              </a:rPr>
+              <a:t>·         Teh Chai perlu memanfaatkan fitur dan manfaat uniknya, seperti aroma, rasa, dan manfaat kesehatannya yang kaya, untuk membedakan dirinya dari produk teh lainnya</a:t>
+            </a:r>
+            <a:r>
               <a:rPr sz="1200"/>
               <a:t>
 </a:t>
@@ -1887,7 +1705,7 @@
                 <a:ea typeface="Aptos"/>
                 <a:cs typeface="Aptos"/>
               </a:rPr>
-              <a:t>Konten Asli:</a:t>
+              <a:t>·         Teh Chai perlu menggunakan campuran taktik online dan offline untuk menjangkau dan berinteraksi dengan audiens target, dan untuk menciptakan basis pelanggan yang setia dan puas</a:t>
             </a:r>
             <a:r>
               <a:rPr sz="1200"/>
@@ -1904,7 +1722,7 @@
                 <a:ea typeface="Aptos"/>
                 <a:cs typeface="Aptos"/>
               </a:rPr>
-              <a:t>Rekomendasi dan Kesimpulan</a:t>
+              <a:t>·         Teh Chai perlu mengatasi tantangan dan ancaman yang dapat menghambat pertumbuhan dan ekspansinya di wilayah tersebut, seperti harga, kesadaran, persaingan, peraturan, dan keberlanjutan</a:t>
             </a:r>
             <a:r>
               <a:rPr sz="1200"/>
@@ -1921,157 +1739,7 @@
                 <a:ea typeface="Aptos"/>
                 <a:cs typeface="Aptos"/>
               </a:rPr>
-              <a:t>Berdasarkan analisis pasar, analisis kompetitif, saluran distribusi, dan rencana dan strategi promosi, rekomendasi dan kesimpulan berikut dapat diambil untuk masa depan teh Chai di Amerika Latin:</a:t>
-            </a:r>
-            <a:r>
-              <a:rPr sz="1200"/>
-              <a:t>
-</a:t>
-            </a:r>
-            <a:r>
-              <a:rPr lang="id-ID" sz="1200" b="0" i="0" strike="noStrike" cap="none" baseline="0">
-                <a:solidFill>
-                  <a:srgbClr val="000000"/>
-                </a:solidFill>
-                <a:effectLst/>
-                <a:latin typeface="Aptos"/>
-                <a:ea typeface="Aptos"/>
-                <a:cs typeface="Aptos"/>
-              </a:rPr>
-              <a:t>·         Teh Chai adalah produk menjanjikan yang memiliki potensi untuk tumbuh dan sukses di pasar Amerika Latin, karena menawarkan alternatif yang sehat, alami, dan eksotis untuk minuman lainnya</a:t>
-            </a:r>
-            <a:r>
-              <a:rPr sz="1200"/>
-              <a:t>
-</a:t>
-            </a:r>
-            <a:r>
-              <a:rPr lang="id-ID" sz="1200" b="0" i="0" strike="noStrike" cap="none" baseline="0">
-                <a:solidFill>
-                  <a:srgbClr val="000000"/>
-                </a:solidFill>
-                <a:effectLst/>
-                <a:latin typeface="Aptos"/>
-                <a:ea typeface="Aptos"/>
-                <a:cs typeface="Aptos"/>
-              </a:rPr>
-              <a:t>·         Teh Chai perlu diposisikan dan dipasarkan sebagai produk premium, autentik, dan serbaguna yang bisa menarik untuk berbagai segmen dan kesempatan</a:t>
-            </a:r>
-            <a:r>
-              <a:rPr sz="1200"/>
-              <a:t>
-</a:t>
-            </a:r>
-            <a:r>
-              <a:rPr lang="id-ID" sz="1200" b="0" i="0" strike="noStrike" cap="none" baseline="0">
-                <a:solidFill>
-                  <a:srgbClr val="000000"/>
-                </a:solidFill>
-                <a:effectLst/>
-                <a:latin typeface="Aptos"/>
-                <a:ea typeface="Aptos"/>
-                <a:cs typeface="Aptos"/>
-              </a:rPr>
-              <a:t>·         Teh Chai perlu memanfaatkan fitur dan manfaat uniknya, seperti aroma, rasa, dan manfaat kesehatannya yang kaya, untuk membedakan dirinya dari produk teh lainnya</a:t>
-            </a:r>
-            <a:r>
-              <a:rPr sz="1200"/>
-              <a:t>
-</a:t>
-            </a:r>
-            <a:r>
-              <a:rPr lang="id-ID" sz="1200" b="0" i="0" strike="noStrike" cap="none" baseline="0">
-                <a:solidFill>
-                  <a:srgbClr val="000000"/>
-                </a:solidFill>
-                <a:effectLst/>
-                <a:latin typeface="Aptos"/>
-                <a:ea typeface="Aptos"/>
-                <a:cs typeface="Aptos"/>
-              </a:rPr>
-              <a:t>·         Teh Chai perlu menggunakan campuran taktik online dan offline untuk menjangkau dan berinteraksi dengan audiens target, dan untuk menciptakan basis pelanggan yang setia dan puas</a:t>
-            </a:r>
-            <a:r>
-              <a:rPr sz="1200"/>
-              <a:t>
-</a:t>
-            </a:r>
-            <a:r>
-              <a:rPr lang="id-ID" sz="1200" b="0" i="0" strike="noStrike" cap="none" baseline="0">
-                <a:solidFill>
-                  <a:srgbClr val="000000"/>
-                </a:solidFill>
-                <a:effectLst/>
-                <a:latin typeface="Aptos"/>
-                <a:ea typeface="Aptos"/>
-                <a:cs typeface="Aptos"/>
-              </a:rPr>
-              <a:t>·         Teh Chai perlu mengatasi tantangan dan ancaman yang dapat menghambat pertumbuhan dan ekspansinya di wilayah tersebut, seperti harga, kesadaran, persaingan, peraturan, dan keberlanjutan</a:t>
-            </a:r>
-            <a:r>
-              <a:rPr sz="1200"/>
-              <a:t>
-</a:t>
-            </a:r>
-            <a:r>
-              <a:rPr lang="id-ID" sz="1200" b="0" i="0" strike="noStrike" cap="none" baseline="0">
-                <a:solidFill>
-                  <a:srgbClr val="000000"/>
-                </a:solidFill>
-                <a:effectLst/>
-                <a:latin typeface="Aptos"/>
-                <a:ea typeface="Aptos"/>
-                <a:cs typeface="Aptos"/>
-              </a:rPr>
-              <a:t>Kesimpulannya, teh Chai adalah produk yang memiliki banyak potensi dan peluang di pasar Amerika Latin, tetapi juga menghadapi beberapa tantangan dan risiko.</a:t>
-            </a:r>
-            <a:r>
-              <a:rPr lang="id-ID" sz="1200" b="0" i="0" strike="noStrike" cap="none" baseline="0">
-                <a:solidFill>
-                  <a:srgbClr val="000000"/>
-                </a:solidFill>
-                <a:effectLst/>
-                <a:latin typeface="Aptos"/>
-                <a:ea typeface="Aptos"/>
-                <a:cs typeface="Aptos"/>
-              </a:rPr>
-              <a:t> </a:t>
-            </a:r>
-            <a:r>
-              <a:rPr lang="id-ID" sz="1200" b="0" i="0" strike="noStrike" cap="none" baseline="0">
-                <a:solidFill>
-                  <a:srgbClr val="000000"/>
-                </a:solidFill>
-                <a:effectLst/>
-                <a:latin typeface="Aptos"/>
-                <a:ea typeface="Aptos"/>
-                <a:cs typeface="Aptos"/>
-              </a:rPr>
-              <a:t>Rencana promosi dan strategi yang diuraikan dalam laporan ini bertujuan untuk mengatasi masalah ini dan untuk mencapai hasil yang diinginkan.</a:t>
-            </a:r>
-            <a:r>
-              <a:rPr lang="id-ID" sz="1200" b="0" i="0" strike="noStrike" cap="none" baseline="0">
-                <a:solidFill>
-                  <a:srgbClr val="000000"/>
-                </a:solidFill>
-                <a:effectLst/>
-                <a:latin typeface="Aptos"/>
-                <a:ea typeface="Aptos"/>
-                <a:cs typeface="Aptos"/>
-              </a:rPr>
-              <a:t> </a:t>
-            </a:r>
-            <a:r>
-              <a:rPr lang="id-ID" sz="1200" b="0" i="0" strike="noStrike" cap="none" baseline="0">
-                <a:solidFill>
-                  <a:srgbClr val="000000"/>
-                </a:solidFill>
-                <a:effectLst/>
-                <a:latin typeface="Aptos"/>
-                <a:ea typeface="Aptos"/>
-                <a:cs typeface="Aptos"/>
-              </a:rPr>
-              <a:t>Namun, rencana dan strategi promosi perlu terus dipantau, dievaluasi, dan disesuaikan sesuai dengan perubahan kondisi pasar dan umpan balik pelanggan.</a:t>
+              <a:t>Kesimpulannya, teh Chai adalah produk yang memiliki banyak potensi dan peluang di pasar Amerika Latin, tetapi juga menghadapi beberapa tantangan dan risiko. Rencana promosi dan strategi yang diuraikan dalam laporan ini bertujuan untuk mengatasi masalah ini dan untuk mencapai hasil yang diinginkan. Namun, rencana dan strategi promosi perlu terus dipantau, dievaluasi, dan disesuaikan sesuai dengan perubahan kondisi pasar dan umpan balik pelanggan.</a:t>
             </a:r>
             <a:r>
               <a:rPr sz="1200"/>
@@ -2118,8 +1786,8 @@
 </file>
 
 <file path=ppt/notesSlides/notesSlide2.xml><?xml version="1.0" encoding="utf-8"?>
-<p:notes xmlns:a="http://schemas.openxmlformats.org/drawingml/2006/main" xmlns:r="http://schemas.openxmlformats.org/officeDocument/2006/relationships" xmlns:m="http://schemas.openxmlformats.org/officeDocument/2006/math" xmlns:w="http://schemas.openxmlformats.org/wordprocessingml/2006/main" xmlns:wp="http://schemas.openxmlformats.org/drawingml/2006/wordprocessingDrawing" xmlns:a14="http://schemas.microsoft.com/office/drawing/2010/main" xmlns:mc="http://schemas.openxmlformats.org/markup-compatibility/2006" xmlns:p14="http://schemas.microsoft.com/office/powerpoint/2010/main" xmlns:p="http://schemas.openxmlformats.org/presentationml/2006/main">
-  <p:cSld name="">
+<p:notes xmlns:a="http://schemas.openxmlformats.org/drawingml/2006/main" xmlns:r="http://schemas.openxmlformats.org/officeDocument/2006/relationships" xmlns:p="http://schemas.openxmlformats.org/presentationml/2006/main">
+  <p:cSld>
     <p:spTree>
       <p:nvGrpSpPr>
         <p:cNvPr id="1" name=""/>
@@ -2130,6 +1798,8 @@
         <a:xfrm>
           <a:off x="0" y="0"/>
           <a:ext cx="0" cy="0"/>
+          <a:chOff x="0" y="0"/>
+          <a:chExt cx="0" cy="0"/>
         </a:xfrm>
       </p:grpSpPr>
       <p:sp>
@@ -2170,11 +1840,6 @@
                 <a:cs typeface="Aptos"/>
               </a:rPr>
               <a:t>Agenda</a:t>
-            </a:r>
-            <a:r>
-              <a:rPr sz="1200"/>
-              <a:t>
-</a:t>
             </a:r>
             <a:r>
               <a:rPr sz="1200"/>
@@ -2561,8 +2226,8 @@
 </file>
 
 <file path=ppt/notesSlides/notesSlide3.xml><?xml version="1.0" encoding="utf-8"?>
-<p:notes xmlns:a="http://schemas.openxmlformats.org/drawingml/2006/main" xmlns:r="http://schemas.openxmlformats.org/officeDocument/2006/relationships" xmlns:m="http://schemas.openxmlformats.org/officeDocument/2006/math" xmlns:w="http://schemas.openxmlformats.org/wordprocessingml/2006/main" xmlns:wp="http://schemas.openxmlformats.org/drawingml/2006/wordprocessingDrawing" xmlns:a14="http://schemas.microsoft.com/office/drawing/2010/main" xmlns:mc="http://schemas.openxmlformats.org/markup-compatibility/2006" xmlns:p14="http://schemas.microsoft.com/office/powerpoint/2010/main" xmlns:p="http://schemas.openxmlformats.org/presentationml/2006/main">
-  <p:cSld name="">
+<p:notes xmlns:a="http://schemas.openxmlformats.org/drawingml/2006/main" xmlns:r="http://schemas.openxmlformats.org/officeDocument/2006/relationships" xmlns:p="http://schemas.openxmlformats.org/presentationml/2006/main">
+  <p:cSld>
     <p:spTree>
       <p:nvGrpSpPr>
         <p:cNvPr id="1" name=""/>
@@ -2573,6 +2238,8 @@
         <a:xfrm>
           <a:off x="0" y="0"/>
           <a:ext cx="0" cy="0"/>
+          <a:chOff x="0" y="0"/>
+          <a:chExt cx="0" cy="0"/>
         </a:xfrm>
       </p:grpSpPr>
       <p:sp>
@@ -2612,7 +2279,12 @@
                 <a:ea typeface="Aptos"/>
                 <a:cs typeface="Aptos"/>
               </a:rPr>
-              <a:t>Laporan ini memberikan analisis pasar untuk Mystic Spice Premium Chai Tea di wilayah Amerika Latin.</a:t>
+              <a:t>Laporan ini memberikan analisis pasar untuk Mystic Spice Premium Chai Tea di wilayah Amerika Latin. Ini mencakup deskripsi produk, tren pasar, analisis kompetitif, saluran distribusi, rencana promosi, hasil yang diharapkan, dan rekomendasi untuk masa depan.</a:t>
+            </a:r>
+            <a:r>
+              <a:rPr sz="1200"/>
+              <a:t>
+</a:t>
             </a:r>
             <a:r>
               <a:rPr lang="id-ID" sz="1200" b="0" i="0" strike="noStrike" cap="none" baseline="0">
@@ -2624,7 +2296,12 @@
                 <a:ea typeface="Aptos"/>
                 <a:cs typeface="Aptos"/>
               </a:rPr>
-              <a:t> </a:t>
+              <a:t>Original Content:</a:t>
+            </a:r>
+            <a:r>
+              <a:rPr sz="1200"/>
+              <a:t>
+</a:t>
             </a:r>
             <a:r>
               <a:rPr lang="id-ID" sz="1200" b="0" i="0" strike="noStrike" cap="none" baseline="0">
@@ -2636,7 +2313,7 @@
                 <a:ea typeface="Aptos"/>
                 <a:cs typeface="Aptos"/>
               </a:rPr>
-              <a:t>Ini mencakup deskripsi produk, tren pasar, analisis kompetitif, saluran distribusi, rencana promosi, hasil yang diharapkan, dan rekomendasi untuk masa depan.</a:t>
+              <a:t>Pengantar</a:t>
             </a:r>
             <a:r>
               <a:rPr sz="1200"/>
@@ -2644,16 +2321,23 @@
 </a:t>
             </a:r>
             <a:r>
+              <a:rPr lang="id-ID" sz="1200" b="0" i="0" strike="noStrike" cap="none" baseline="0">
+                <a:solidFill>
+                  <a:srgbClr val="000000"/>
+                </a:solidFill>
+                <a:effectLst/>
+                <a:latin typeface="Aptos"/>
+                <a:ea typeface="Aptos"/>
+                <a:cs typeface="Aptos"/>
+              </a:rPr>
+              <a:t>Mystic Spice Premium Chai Tea adalah produk baru yang diluncurkan oleh Contoso Beverage, sebuah perusahaan yang berspesialisasi dalam memproduksi dan mendistribusikan minuman berkualitas tinggi di seluruh dunia. Mystic Spice Premium Chai Tea adalah minuman teh dengan rempah-rempah yang berasal dari India dan telah menjadi populer di seluruh dunia. Ini adalah minuman serbaguna yang dapat dinikmati panas atau dingin, dengan atau tanpa susu, dan dengan rempah-rempah dan pemanis yang berbeda. Teh Chai memiliki banyak manfaat kesehatan, seperti meningkatkan kekebalan tubuh, mengurangi peradangan, dan melancarkan pencernaan. Ini juga memiliki signifikansi budaya dan sejarah yang kaya, karena sering dikaitkan dengan keramahan, persahabatan, dan relaksasi.</a:t>
+            </a:r>
+            <a:r>
               <a:rPr sz="1200"/>
               <a:t>
 </a:t>
             </a:r>
             <a:r>
-              <a:rPr sz="1200"/>
-              <a:t>
-</a:t>
-            </a:r>
-            <a:r>
               <a:rPr lang="id-ID" sz="1200" b="0" i="0" strike="noStrike" cap="none" baseline="0">
                 <a:solidFill>
                   <a:srgbClr val="000000"/>
@@ -2663,178 +2347,7 @@
                 <a:ea typeface="Aptos"/>
                 <a:cs typeface="Aptos"/>
               </a:rPr>
-              <a:t>Original Content:</a:t>
-            </a:r>
-            <a:r>
-              <a:rPr sz="1200"/>
-              <a:t>
-</a:t>
-            </a:r>
-            <a:r>
-              <a:rPr lang="id-ID" sz="1200" b="0" i="0" strike="noStrike" cap="none" baseline="0">
-                <a:solidFill>
-                  <a:srgbClr val="000000"/>
-                </a:solidFill>
-                <a:effectLst/>
-                <a:latin typeface="Aptos"/>
-                <a:ea typeface="Aptos"/>
-                <a:cs typeface="Aptos"/>
-              </a:rPr>
-              <a:t>Pengantar</a:t>
-            </a:r>
-            <a:r>
-              <a:rPr sz="1200"/>
-              <a:t>
-</a:t>
-            </a:r>
-            <a:r>
-              <a:rPr lang="id-ID" sz="1200" b="0" i="0" strike="noStrike" cap="none" baseline="0">
-                <a:solidFill>
-                  <a:srgbClr val="000000"/>
-                </a:solidFill>
-                <a:effectLst/>
-                <a:latin typeface="Aptos"/>
-                <a:ea typeface="Aptos"/>
-                <a:cs typeface="Aptos"/>
-              </a:rPr>
-              <a:t>Mystic Spice Premium Chai Tea adalah produk baru yang diluncurkan oleh Contoso Beverage, sebuah perusahaan yang berspesialisasi dalam memproduksi dan mendistribusikan minuman berkualitas tinggi di seluruh dunia.</a:t>
-            </a:r>
-            <a:r>
-              <a:rPr lang="id-ID" sz="1200" b="0" i="0" strike="noStrike" cap="none" baseline="0">
-                <a:solidFill>
-                  <a:srgbClr val="000000"/>
-                </a:solidFill>
-                <a:effectLst/>
-                <a:latin typeface="Aptos"/>
-                <a:ea typeface="Aptos"/>
-                <a:cs typeface="Aptos"/>
-              </a:rPr>
-              <a:t> </a:t>
-            </a:r>
-            <a:r>
-              <a:rPr lang="id-ID" sz="1200" b="0" i="0" strike="noStrike" cap="none" baseline="0">
-                <a:solidFill>
-                  <a:srgbClr val="000000"/>
-                </a:solidFill>
-                <a:effectLst/>
-                <a:latin typeface="Aptos"/>
-                <a:ea typeface="Aptos"/>
-                <a:cs typeface="Aptos"/>
-              </a:rPr>
-              <a:t>Mystic Spice Premium Chai Tea adalah minuman teh dengan rempah-rempah yang berasal dari India dan telah menjadi populer di seluruh dunia.</a:t>
-            </a:r>
-            <a:r>
-              <a:rPr lang="id-ID" sz="1200" b="0" i="0" strike="noStrike" cap="none" baseline="0">
-                <a:solidFill>
-                  <a:srgbClr val="000000"/>
-                </a:solidFill>
-                <a:effectLst/>
-                <a:latin typeface="Aptos"/>
-                <a:ea typeface="Aptos"/>
-                <a:cs typeface="Aptos"/>
-              </a:rPr>
-              <a:t> </a:t>
-            </a:r>
-            <a:r>
-              <a:rPr lang="id-ID" sz="1200" b="0" i="0" strike="noStrike" cap="none" baseline="0">
-                <a:solidFill>
-                  <a:srgbClr val="000000"/>
-                </a:solidFill>
-                <a:effectLst/>
-                <a:latin typeface="Aptos"/>
-                <a:ea typeface="Aptos"/>
-                <a:cs typeface="Aptos"/>
-              </a:rPr>
-              <a:t>Ini adalah minuman serbaguna yang dapat dinikmati panas atau dingin, dengan atau tanpa susu, dan dengan rempah-rempah dan pemanis yang berbeda.</a:t>
-            </a:r>
-            <a:r>
-              <a:rPr lang="id-ID" sz="1200" b="0" i="0" strike="noStrike" cap="none" baseline="0">
-                <a:solidFill>
-                  <a:srgbClr val="000000"/>
-                </a:solidFill>
-                <a:effectLst/>
-                <a:latin typeface="Aptos"/>
-                <a:ea typeface="Aptos"/>
-                <a:cs typeface="Aptos"/>
-              </a:rPr>
-              <a:t> </a:t>
-            </a:r>
-            <a:r>
-              <a:rPr lang="id-ID" sz="1200" b="0" i="0" strike="noStrike" cap="none" baseline="0">
-                <a:solidFill>
-                  <a:srgbClr val="000000"/>
-                </a:solidFill>
-                <a:effectLst/>
-                <a:latin typeface="Aptos"/>
-                <a:ea typeface="Aptos"/>
-                <a:cs typeface="Aptos"/>
-              </a:rPr>
-              <a:t>Teh Chai memiliki banyak manfaat kesehatan, seperti meningkatkan kekebalan tubuh, mengurangi peradangan, dan melancarkan pencernaan.</a:t>
-            </a:r>
-            <a:r>
-              <a:rPr lang="id-ID" sz="1200" b="0" i="0" strike="noStrike" cap="none" baseline="0">
-                <a:solidFill>
-                  <a:srgbClr val="000000"/>
-                </a:solidFill>
-                <a:effectLst/>
-                <a:latin typeface="Aptos"/>
-                <a:ea typeface="Aptos"/>
-                <a:cs typeface="Aptos"/>
-              </a:rPr>
-              <a:t> </a:t>
-            </a:r>
-            <a:r>
-              <a:rPr lang="id-ID" sz="1200" b="0" i="0" strike="noStrike" cap="none" baseline="0">
-                <a:solidFill>
-                  <a:srgbClr val="000000"/>
-                </a:solidFill>
-                <a:effectLst/>
-                <a:latin typeface="Aptos"/>
-                <a:ea typeface="Aptos"/>
-                <a:cs typeface="Aptos"/>
-              </a:rPr>
-              <a:t>Ini juga memiliki signifikansi budaya dan sejarah yang kaya, karena sering dikaitkan dengan keramahan, persahabatan, dan relaksasi.</a:t>
-            </a:r>
-            <a:r>
-              <a:rPr sz="1200"/>
-              <a:t>
-</a:t>
-            </a:r>
-            <a:r>
-              <a:rPr lang="id-ID" sz="1200" b="0" i="0" strike="noStrike" cap="none" baseline="0">
-                <a:solidFill>
-                  <a:srgbClr val="000000"/>
-                </a:solidFill>
-                <a:effectLst/>
-                <a:latin typeface="Aptos"/>
-                <a:ea typeface="Aptos"/>
-                <a:cs typeface="Aptos"/>
-              </a:rPr>
-              <a:t>Tujuan dari laporan ini adalah untuk memberikan analisis pasar untuk Mystic Spice Premium Chai Tea, yang berfokus pada wilayah Amerika Latin.</a:t>
-            </a:r>
-            <a:r>
-              <a:rPr lang="id-ID" sz="1200" b="0" i="0" strike="noStrike" cap="none" baseline="0">
-                <a:solidFill>
-                  <a:srgbClr val="000000"/>
-                </a:solidFill>
-                <a:effectLst/>
-                <a:latin typeface="Aptos"/>
-                <a:ea typeface="Aptos"/>
-                <a:cs typeface="Aptos"/>
-              </a:rPr>
-              <a:t> </a:t>
-            </a:r>
-            <a:r>
-              <a:rPr lang="id-ID" sz="1200" b="0" i="0" strike="noStrike" cap="none" baseline="0">
-                <a:solidFill>
-                  <a:srgbClr val="000000"/>
-                </a:solidFill>
-                <a:effectLst/>
-                <a:latin typeface="Aptos"/>
-                <a:ea typeface="Aptos"/>
-                <a:cs typeface="Aptos"/>
-              </a:rPr>
-              <a:t>Laporan ini akan mencakup aspek-aspek berikut:</a:t>
+              <a:t>Tujuan dari laporan ini adalah untuk memberikan analisis pasar untuk Mystic Spice Premium Chai Tea, yang berfokus pada wilayah Amerika Latin. Laporan ini akan mencakup aspek-aspek berikut:</a:t>
             </a:r>
             <a:r>
               <a:rPr sz="1200"/>
@@ -3000,8 +2513,8 @@
 </file>
 
 <file path=ppt/notesSlides/notesSlide4.xml><?xml version="1.0" encoding="utf-8"?>
-<p:notes xmlns:a="http://schemas.openxmlformats.org/drawingml/2006/main" xmlns:r="http://schemas.openxmlformats.org/officeDocument/2006/relationships" xmlns:m="http://schemas.openxmlformats.org/officeDocument/2006/math" xmlns:w="http://schemas.openxmlformats.org/wordprocessingml/2006/main" xmlns:wp="http://schemas.openxmlformats.org/drawingml/2006/wordprocessingDrawing" xmlns:a14="http://schemas.microsoft.com/office/drawing/2010/main" xmlns:mc="http://schemas.openxmlformats.org/markup-compatibility/2006" xmlns:p14="http://schemas.microsoft.com/office/powerpoint/2010/main" xmlns:p="http://schemas.openxmlformats.org/presentationml/2006/main">
-  <p:cSld name="">
+<p:notes xmlns:a="http://schemas.openxmlformats.org/drawingml/2006/main" xmlns:r="http://schemas.openxmlformats.org/officeDocument/2006/relationships" xmlns:p="http://schemas.openxmlformats.org/presentationml/2006/main">
+  <p:cSld>
     <p:spTree>
       <p:nvGrpSpPr>
         <p:cNvPr id="1" name=""/>
@@ -3012,6 +2525,8 @@
         <a:xfrm>
           <a:off x="0" y="0"/>
           <a:ext cx="0" cy="0"/>
+          <a:chOff x="0" y="0"/>
+          <a:chExt cx="0" cy="0"/>
         </a:xfrm>
       </p:grpSpPr>
       <p:sp>
@@ -3051,7 +2566,12 @@
                 <a:ea typeface="Aptos"/>
                 <a:cs typeface="Aptos"/>
               </a:rPr>
-              <a:t>Mystic Spice Premium Chai Tea adalah perpaduan yang dibuat dengan cermat yang menghormati tradisi chai India.</a:t>
+              <a:t>Mystic Spice Premium Chai Tea adalah perpaduan yang dibuat dengan cermat yang menghormati tradisi chai India. Setiap cangkir membawa Anda dalam perjalanan melalui lanskap India yang semarak, membawa pengalaman chai yang autentik ke rumah Anda.</a:t>
+            </a:r>
+            <a:r>
+              <a:rPr sz="1200"/>
+              <a:t>
+</a:t>
             </a:r>
             <a:r>
               <a:rPr lang="id-ID" sz="1200" b="0" i="0" strike="noStrike" cap="none" baseline="0">
@@ -3063,7 +2583,12 @@
                 <a:ea typeface="Aptos"/>
                 <a:cs typeface="Aptos"/>
               </a:rPr>
-              <a:t> </a:t>
+              <a:t>Konten Asli:</a:t>
+            </a:r>
+            <a:r>
+              <a:rPr sz="1200"/>
+              <a:t>
+</a:t>
             </a:r>
             <a:r>
               <a:rPr lang="id-ID" sz="1200" b="0" i="0" strike="noStrike" cap="none" baseline="0">
@@ -3075,7 +2600,7 @@
                 <a:ea typeface="Aptos"/>
                 <a:cs typeface="Aptos"/>
               </a:rPr>
-              <a:t>Setiap cangkir membawa Anda dalam perjalanan melalui lanskap India yang semarak, membawa pengalaman chai yang autentik ke rumah Anda.</a:t>
+              <a:t>Deskripsi Produk</a:t>
             </a:r>
             <a:r>
               <a:rPr sz="1200"/>
@@ -3083,16 +2608,6 @@
 </a:t>
             </a:r>
             <a:r>
-              <a:rPr sz="1200"/>
-              <a:t>
-</a:t>
-            </a:r>
-            <a:r>
-              <a:rPr sz="1200"/>
-              <a:t>
-</a:t>
-            </a:r>
-            <a:r>
               <a:rPr lang="id-ID" sz="1200" b="0" i="0" strike="noStrike" cap="none" baseline="0">
                 <a:solidFill>
                   <a:srgbClr val="000000"/>
@@ -3102,89 +2617,7 @@
                 <a:ea typeface="Aptos"/>
                 <a:cs typeface="Aptos"/>
               </a:rPr>
-              <a:t>Konten Asli:</a:t>
-            </a:r>
-            <a:r>
-              <a:rPr sz="1200"/>
-              <a:t>
-</a:t>
-            </a:r>
-            <a:r>
-              <a:rPr lang="id-ID" sz="1200" b="0" i="0" strike="noStrike" cap="none" baseline="0">
-                <a:solidFill>
-                  <a:srgbClr val="000000"/>
-                </a:solidFill>
-                <a:effectLst/>
-                <a:latin typeface="Aptos"/>
-                <a:ea typeface="Aptos"/>
-                <a:cs typeface="Aptos"/>
-              </a:rPr>
-              <a:t>Deskripsi Produk</a:t>
-            </a:r>
-            <a:r>
-              <a:rPr sz="1200"/>
-              <a:t>
-</a:t>
-            </a:r>
-            <a:r>
-              <a:rPr lang="id-ID" sz="1200" b="0" i="0" strike="noStrike" cap="none" baseline="0">
-                <a:solidFill>
-                  <a:srgbClr val="000000"/>
-                </a:solidFill>
-                <a:effectLst/>
-                <a:latin typeface="Aptos"/>
-                <a:ea typeface="Aptos"/>
-                <a:cs typeface="Aptos"/>
-              </a:rPr>
-              <a:t>Mystic Spice Premium Chai Tea adalah perpaduan cermat yang memberikan penghormatan pada tradisi chai India yang abadi.</a:t>
-            </a:r>
-            <a:r>
-              <a:rPr lang="id-ID" sz="1200" b="0" i="0" strike="noStrike" cap="none" baseline="0">
-                <a:solidFill>
-                  <a:srgbClr val="000000"/>
-                </a:solidFill>
-                <a:effectLst/>
-                <a:latin typeface="Aptos"/>
-                <a:ea typeface="Aptos"/>
-                <a:cs typeface="Aptos"/>
-              </a:rPr>
-              <a:t> </a:t>
-            </a:r>
-            <a:r>
-              <a:rPr lang="id-ID" sz="1200" b="0" i="0" strike="noStrike" cap="none" baseline="0">
-                <a:solidFill>
-                  <a:srgbClr val="000000"/>
-                </a:solidFill>
-                <a:effectLst/>
-                <a:latin typeface="Aptos"/>
-                <a:ea typeface="Aptos"/>
-                <a:cs typeface="Aptos"/>
-              </a:rPr>
-              <a:t>Setiap cangkir menawarkan perjalanan yang memikat melalui lanskap India yang semarak, menghadirkan pengalaman chai yang autentik langsung di rumah Anda</a:t>
-            </a:r>
-            <a:r>
-              <a:rPr lang="id-ID" sz="1200" b="0" i="0" strike="noStrike" cap="none" baseline="0">
-                <a:solidFill>
-                  <a:srgbClr val="000000"/>
-                </a:solidFill>
-                <a:effectLst/>
-                <a:latin typeface="Aptos"/>
-                <a:ea typeface="Aptos"/>
-                <a:cs typeface="Aptos"/>
-              </a:rPr>
-              <a:t> </a:t>
-            </a:r>
-            <a:r>
-              <a:rPr lang="id-ID" sz="1200" b="0" i="0" strike="noStrike" cap="none" baseline="0">
-                <a:solidFill>
-                  <a:srgbClr val="000000"/>
-                </a:solidFill>
-                <a:effectLst/>
-                <a:latin typeface="Aptos"/>
-                <a:ea typeface="Aptos"/>
-                <a:cs typeface="Aptos"/>
-              </a:rPr>
-              <a:t>Deskripsi produk, fitur, dan manfaat Mystic Spice Premium Chai Tea dirangkum dalam tabel di bawah ini:</a:t>
+              <a:t>Mystic Spice Premium Chai Tea adalah perpaduan cermat yang memberikan penghormatan pada tradisi chai India yang abadi. Setiap cangkir menawarkan perjalanan yang memikat melalui lanskap India yang semarak, menghadirkan pengalaman chai yang autentik langsung di rumah Anda Deskripsi produk, fitur, dan manfaat Mystic Spice Premium Chai Tea dirangkum dalam tabel di bawah ini:</a:t>
             </a:r>
             <a:r>
               <a:rPr sz="1200"/>
@@ -3231,8 +2664,8 @@
 </file>
 
 <file path=ppt/notesSlides/notesSlide5.xml><?xml version="1.0" encoding="utf-8"?>
-<p:notes xmlns:a="http://schemas.openxmlformats.org/drawingml/2006/main" xmlns:r="http://schemas.openxmlformats.org/officeDocument/2006/relationships" xmlns:m="http://schemas.openxmlformats.org/officeDocument/2006/math" xmlns:w="http://schemas.openxmlformats.org/wordprocessingml/2006/main" xmlns:wp="http://schemas.openxmlformats.org/drawingml/2006/wordprocessingDrawing" xmlns:a14="http://schemas.microsoft.com/office/drawing/2010/main" xmlns:mc="http://schemas.openxmlformats.org/markup-compatibility/2006" xmlns:p14="http://schemas.microsoft.com/office/powerpoint/2010/main" xmlns:p="http://schemas.openxmlformats.org/presentationml/2006/main">
-  <p:cSld name="">
+<p:notes xmlns:a="http://schemas.openxmlformats.org/drawingml/2006/main" xmlns:r="http://schemas.openxmlformats.org/officeDocument/2006/relationships" xmlns:p="http://schemas.openxmlformats.org/presentationml/2006/main">
+  <p:cSld>
     <p:spTree>
       <p:nvGrpSpPr>
         <p:cNvPr id="1" name=""/>
@@ -3243,6 +2676,8 @@
         <a:xfrm>
           <a:off x="0" y="0"/>
           <a:ext cx="0" cy="0"/>
+          <a:chOff x="0" y="0"/>
+          <a:chExt cx="0" cy="0"/>
         </a:xfrm>
       </p:grpSpPr>
       <p:sp>
@@ -3324,8 +2759,8 @@
 </file>
 
 <file path=ppt/notesSlides/notesSlide6.xml><?xml version="1.0" encoding="utf-8"?>
-<p:notes xmlns:a="http://schemas.openxmlformats.org/drawingml/2006/main" xmlns:r="http://schemas.openxmlformats.org/officeDocument/2006/relationships" xmlns:m="http://schemas.openxmlformats.org/officeDocument/2006/math" xmlns:w="http://schemas.openxmlformats.org/wordprocessingml/2006/main" xmlns:wp="http://schemas.openxmlformats.org/drawingml/2006/wordprocessingDrawing" xmlns:a14="http://schemas.microsoft.com/office/drawing/2010/main" xmlns:mc="http://schemas.openxmlformats.org/markup-compatibility/2006" xmlns:p14="http://schemas.microsoft.com/office/powerpoint/2010/main" xmlns:p="http://schemas.openxmlformats.org/presentationml/2006/main">
-  <p:cSld name="">
+<p:notes xmlns:a="http://schemas.openxmlformats.org/drawingml/2006/main" xmlns:r="http://schemas.openxmlformats.org/officeDocument/2006/relationships" xmlns:p="http://schemas.openxmlformats.org/presentationml/2006/main">
+  <p:cSld>
     <p:spTree>
       <p:nvGrpSpPr>
         <p:cNvPr id="1" name=""/>
@@ -3336,6 +2771,8 @@
         <a:xfrm>
           <a:off x="0" y="0"/>
           <a:ext cx="0" cy="0"/>
+          <a:chOff x="0" y="0"/>
+          <a:chExt cx="0" cy="0"/>
         </a:xfrm>
       </p:grpSpPr>
       <p:sp>
@@ -3417,8 +2854,8 @@
 </file>
 
 <file path=ppt/notesSlides/notesSlide7.xml><?xml version="1.0" encoding="utf-8"?>
-<p:notes xmlns:a="http://schemas.openxmlformats.org/drawingml/2006/main" xmlns:r="http://schemas.openxmlformats.org/officeDocument/2006/relationships" xmlns:m="http://schemas.openxmlformats.org/officeDocument/2006/math" xmlns:w="http://schemas.openxmlformats.org/wordprocessingml/2006/main" xmlns:wp="http://schemas.openxmlformats.org/drawingml/2006/wordprocessingDrawing" xmlns:a14="http://schemas.microsoft.com/office/drawing/2010/main" xmlns:mc="http://schemas.openxmlformats.org/markup-compatibility/2006" xmlns:p14="http://schemas.microsoft.com/office/powerpoint/2010/main" xmlns:p="http://schemas.openxmlformats.org/presentationml/2006/main">
-  <p:cSld name="">
+<p:notes xmlns:a="http://schemas.openxmlformats.org/drawingml/2006/main" xmlns:r="http://schemas.openxmlformats.org/officeDocument/2006/relationships" xmlns:p="http://schemas.openxmlformats.org/presentationml/2006/main">
+  <p:cSld>
     <p:spTree>
       <p:nvGrpSpPr>
         <p:cNvPr id="1" name=""/>
@@ -3429,6 +2866,8 @@
         <a:xfrm>
           <a:off x="0" y="0"/>
           <a:ext cx="0" cy="0"/>
+          <a:chOff x="0" y="0"/>
+          <a:chExt cx="0" cy="0"/>
         </a:xfrm>
       </p:grpSpPr>
       <p:sp>
@@ -3468,7 +2907,12 @@
                 <a:ea typeface="Aptos"/>
                 <a:cs typeface="Aptos"/>
               </a:rPr>
-              <a:t>Pasar Amerika Latin menawarkan peluang besar untuk teh Chai, dengan meningkatnya permintaan akan produk yang sehat, alami, dan eksotis.</a:t>
+              <a:t>Pasar Amerika Latin menawarkan peluang besar untuk teh Chai, dengan meningkatnya permintaan akan produk yang sehat, alami, dan eksotis. Ukuran pasar teh Chai global dihargai USD 1,9 miliar pada 2019 dan diperkirakan tumbuh pada CAGR 5,5% dari 2020 hingga 2027, dengan Amerika Latin menjadi salah satu wilayah dengan pertumbuhan tercepat. Pendorong utama pertumbuhan meliputi peningkatan kesadaran, peningkatan pendapatan yang dapat dibelanjakan, dan perluasan distribusi.</a:t>
+            </a:r>
+            <a:r>
+              <a:rPr sz="1200"/>
+              <a:t>
+</a:t>
             </a:r>
             <a:r>
               <a:rPr lang="id-ID" sz="1200" b="0" i="0" strike="noStrike" cap="none" baseline="0">
@@ -3480,7 +2924,12 @@
                 <a:ea typeface="Aptos"/>
                 <a:cs typeface="Aptos"/>
               </a:rPr>
-              <a:t> </a:t>
+              <a:t>Konten Asli:</a:t>
+            </a:r>
+            <a:r>
+              <a:rPr sz="1200"/>
+              <a:t>
+</a:t>
             </a:r>
             <a:r>
               <a:rPr lang="id-ID" sz="1200" b="0" i="0" strike="noStrike" cap="none" baseline="0">
@@ -3492,7 +2941,12 @@
                 <a:ea typeface="Aptos"/>
                 <a:cs typeface="Aptos"/>
               </a:rPr>
-              <a:t>Ukuran pasar teh Chai global dihargai USD 1,9 miliar pada 2019 dan diperkirakan tumbuh pada CAGR 5,5% dari 2020 hingga 2027, dengan Amerika Latin menjadi salah satu wilayah dengan pertumbuhan tercepat.</a:t>
+              <a:t>Tren Pasar dan Permintaan</a:t>
+            </a:r>
+            <a:r>
+              <a:rPr sz="1200"/>
+              <a:t>
+</a:t>
             </a:r>
             <a:r>
               <a:rPr lang="id-ID" sz="1200" b="0" i="0" strike="noStrike" cap="none" baseline="0">
@@ -3504,7 +2958,12 @@
                 <a:ea typeface="Aptos"/>
                 <a:cs typeface="Aptos"/>
               </a:rPr>
-              <a:t> </a:t>
+              <a:t>Pasar Amerika Latin menawarkan peluang besar untuk teh Chai, karena wilayah ini memiliki permintaan yang meningkat untuk produk yang sehat, alami, dan eksotis. Wilayah ini juga memiliki budaya teh yang kuat, terutama di negara-negara seperti Argentina, Chili, dan Uruguay, di mana mate adalah minuman yang populer. Teh Chai dapat menarik bagi pecinta teh dan peminum kopi, karena menawarkan peningkatan kafein yang serupa dan profil rasa yang lebih kompleks. Teh Chai juga dapat sesuai dengan gaya hidup dan preferensi konsumen Amerika Latin, yang senang bersosialisasi, berbagi, dan memanjakan diri dengan suguhan manis.</a:t>
+            </a:r>
+            <a:r>
+              <a:rPr sz="1200"/>
+              <a:t>
+</a:t>
             </a:r>
             <a:r>
               <a:rPr lang="id-ID" sz="1200" b="0" i="0" strike="noStrike" cap="none" baseline="0">
@@ -3516,205 +2975,7 @@
                 <a:ea typeface="Aptos"/>
                 <a:cs typeface="Aptos"/>
               </a:rPr>
-              <a:t>Pendorong utama pertumbuhan meliputi peningkatan kesadaran, peningkatan pendapatan yang dapat dibelanjakan, dan perluasan distribusi.</a:t>
-            </a:r>
-            <a:r>
-              <a:rPr sz="1200"/>
-              <a:t>
-</a:t>
-            </a:r>
-            <a:r>
-              <a:rPr sz="1200"/>
-              <a:t>
-</a:t>
-            </a:r>
-            <a:r>
-              <a:rPr sz="1200"/>
-              <a:t>
-</a:t>
-            </a:r>
-            <a:r>
-              <a:rPr lang="id-ID" sz="1200" b="0" i="0" strike="noStrike" cap="none" baseline="0">
-                <a:solidFill>
-                  <a:srgbClr val="000000"/>
-                </a:solidFill>
-                <a:effectLst/>
-                <a:latin typeface="Aptos"/>
-                <a:ea typeface="Aptos"/>
-                <a:cs typeface="Aptos"/>
-              </a:rPr>
-              <a:t>Konten Asli:</a:t>
-            </a:r>
-            <a:r>
-              <a:rPr sz="1200"/>
-              <a:t>
-</a:t>
-            </a:r>
-            <a:r>
-              <a:rPr lang="id-ID" sz="1200" b="0" i="0" strike="noStrike" cap="none" baseline="0">
-                <a:solidFill>
-                  <a:srgbClr val="000000"/>
-                </a:solidFill>
-                <a:effectLst/>
-                <a:latin typeface="Aptos"/>
-                <a:ea typeface="Aptos"/>
-                <a:cs typeface="Aptos"/>
-              </a:rPr>
-              <a:t>Tren Pasar dan Permintaan</a:t>
-            </a:r>
-            <a:r>
-              <a:rPr sz="1200"/>
-              <a:t>
-</a:t>
-            </a:r>
-            <a:r>
-              <a:rPr lang="id-ID" sz="1200" b="0" i="0" strike="noStrike" cap="none" baseline="0">
-                <a:solidFill>
-                  <a:srgbClr val="000000"/>
-                </a:solidFill>
-                <a:effectLst/>
-                <a:latin typeface="Aptos"/>
-                <a:ea typeface="Aptos"/>
-                <a:cs typeface="Aptos"/>
-              </a:rPr>
-              <a:t>Pasar Amerika Latin menawarkan peluang besar untuk teh Chai, karena wilayah ini memiliki permintaan yang meningkat untuk produk yang sehat, alami, dan eksotis.</a:t>
-            </a:r>
-            <a:r>
-              <a:rPr lang="id-ID" sz="1200" b="0" i="0" strike="noStrike" cap="none" baseline="0">
-                <a:solidFill>
-                  <a:srgbClr val="000000"/>
-                </a:solidFill>
-                <a:effectLst/>
-                <a:latin typeface="Aptos"/>
-                <a:ea typeface="Aptos"/>
-                <a:cs typeface="Aptos"/>
-              </a:rPr>
-              <a:t> </a:t>
-            </a:r>
-            <a:r>
-              <a:rPr lang="id-ID" sz="1200" b="0" i="0" strike="noStrike" cap="none" baseline="0">
-                <a:solidFill>
-                  <a:srgbClr val="000000"/>
-                </a:solidFill>
-                <a:effectLst/>
-                <a:latin typeface="Aptos"/>
-                <a:ea typeface="Aptos"/>
-                <a:cs typeface="Aptos"/>
-              </a:rPr>
-              <a:t>Wilayah ini juga memiliki budaya teh yang kuat, terutama di negara-negara seperti Argentina, Chili, dan Uruguay, di mana mate adalah minuman yang populer.</a:t>
-            </a:r>
-            <a:r>
-              <a:rPr lang="id-ID" sz="1200" b="0" i="0" strike="noStrike" cap="none" baseline="0">
-                <a:solidFill>
-                  <a:srgbClr val="000000"/>
-                </a:solidFill>
-                <a:effectLst/>
-                <a:latin typeface="Aptos"/>
-                <a:ea typeface="Aptos"/>
-                <a:cs typeface="Aptos"/>
-              </a:rPr>
-              <a:t> </a:t>
-            </a:r>
-            <a:r>
-              <a:rPr lang="id-ID" sz="1200" b="0" i="0" strike="noStrike" cap="none" baseline="0">
-                <a:solidFill>
-                  <a:srgbClr val="000000"/>
-                </a:solidFill>
-                <a:effectLst/>
-                <a:latin typeface="Aptos"/>
-                <a:ea typeface="Aptos"/>
-                <a:cs typeface="Aptos"/>
-              </a:rPr>
-              <a:t>Teh Chai dapat menarik bagi pecinta teh dan peminum kopi, karena menawarkan peningkatan kafein yang serupa dan profil rasa yang lebih kompleks.</a:t>
-            </a:r>
-            <a:r>
-              <a:rPr lang="id-ID" sz="1200" b="0" i="0" strike="noStrike" cap="none" baseline="0">
-                <a:solidFill>
-                  <a:srgbClr val="000000"/>
-                </a:solidFill>
-                <a:effectLst/>
-                <a:latin typeface="Aptos"/>
-                <a:ea typeface="Aptos"/>
-                <a:cs typeface="Aptos"/>
-              </a:rPr>
-              <a:t> </a:t>
-            </a:r>
-            <a:r>
-              <a:rPr lang="id-ID" sz="1200" b="0" i="0" strike="noStrike" cap="none" baseline="0">
-                <a:solidFill>
-                  <a:srgbClr val="000000"/>
-                </a:solidFill>
-                <a:effectLst/>
-                <a:latin typeface="Aptos"/>
-                <a:ea typeface="Aptos"/>
-                <a:cs typeface="Aptos"/>
-              </a:rPr>
-              <a:t>Teh Chai juga dapat sesuai dengan gaya hidup dan preferensi konsumen Amerika Latin, yang senang bersosialisasi, berbagi, dan memanjakan diri dengan suguhan manis.</a:t>
-            </a:r>
-            <a:r>
-              <a:rPr sz="1200"/>
-              <a:t>
-</a:t>
-            </a:r>
-            <a:r>
-              <a:rPr lang="id-ID" sz="1200" b="0" i="0" strike="noStrike" cap="none" baseline="0">
-                <a:solidFill>
-                  <a:srgbClr val="000000"/>
-                </a:solidFill>
-                <a:effectLst/>
-                <a:latin typeface="Aptos"/>
-                <a:ea typeface="Aptos"/>
-                <a:cs typeface="Aptos"/>
-              </a:rPr>
-              <a:t>Menurut laporan Grand View Research, ukuran pasar teh Chai global bernilai USD 1,9 miliar pada tahun 2019 dan diperkirakan akan tumbuh pada tingkat pertumbuhan tahunan majemuk (CAGR) sebesar 5,5% dari 2020 hingga 2027.</a:t>
-            </a:r>
-            <a:r>
-              <a:rPr lang="id-ID" sz="1200" b="0" i="0" strike="noStrike" cap="none" baseline="0">
-                <a:solidFill>
-                  <a:srgbClr val="000000"/>
-                </a:solidFill>
-                <a:effectLst/>
-                <a:latin typeface="Aptos"/>
-                <a:ea typeface="Aptos"/>
-                <a:cs typeface="Aptos"/>
-              </a:rPr>
-              <a:t> </a:t>
-            </a:r>
-            <a:r>
-              <a:rPr lang="id-ID" sz="1200" b="0" i="0" strike="noStrike" cap="none" baseline="0">
-                <a:solidFill>
-                  <a:srgbClr val="000000"/>
-                </a:solidFill>
-                <a:effectLst/>
-                <a:latin typeface="Aptos"/>
-                <a:ea typeface="Aptos"/>
-                <a:cs typeface="Aptos"/>
-              </a:rPr>
-              <a:t>Laporan ini juga menyatakan bahwa Amerika Latin adalah salah satu wilayah dengan pertumbuhan tercepat untuk teh Chai, dengan CAGR 6,2% dari 2020 hingga 2027.</a:t>
-            </a:r>
-            <a:r>
-              <a:rPr lang="id-ID" sz="1200" b="0" i="0" strike="noStrike" cap="none" baseline="0">
-                <a:solidFill>
-                  <a:srgbClr val="000000"/>
-                </a:solidFill>
-                <a:effectLst/>
-                <a:latin typeface="Aptos"/>
-                <a:ea typeface="Aptos"/>
-                <a:cs typeface="Aptos"/>
-              </a:rPr>
-              <a:t> </a:t>
-            </a:r>
-            <a:r>
-              <a:rPr lang="id-ID" sz="1200" b="0" i="0" strike="noStrike" cap="none" baseline="0">
-                <a:solidFill>
-                  <a:srgbClr val="000000"/>
-                </a:solidFill>
-                <a:effectLst/>
-                <a:latin typeface="Aptos"/>
-                <a:ea typeface="Aptos"/>
-                <a:cs typeface="Aptos"/>
-              </a:rPr>
-              <a:t>Pendorong utama pertumbuhan teh Chai di Amerika Latin adalah:</a:t>
+              <a:t>Menurut laporan Grand View Research, ukuran pasar teh Chai global bernilai USD 1,9 miliar pada tahun 2019 dan diperkirakan akan tumbuh pada tingkat pertumbuhan tahunan majemuk (CAGR) sebesar 5,5% dari 2020 hingga 2027. Laporan ini juga menyatakan bahwa Amerika Latin adalah salah satu wilayah dengan pertumbuhan tercepat untuk teh Chai, dengan CAGR 6,2% dari 2020 hingga 2027. Pendorong utama pertumbuhan teh Chai di Amerika Latin adalah:</a:t>
             </a:r>
             <a:r>
               <a:rPr sz="1200"/>
@@ -3846,8 +3107,8 @@
 </file>
 
 <file path=ppt/notesSlides/notesSlide8.xml><?xml version="1.0" encoding="utf-8"?>
-<p:notes xmlns:a="http://schemas.openxmlformats.org/drawingml/2006/main" xmlns:r="http://schemas.openxmlformats.org/officeDocument/2006/relationships" xmlns:m="http://schemas.openxmlformats.org/officeDocument/2006/math" xmlns:w="http://schemas.openxmlformats.org/wordprocessingml/2006/main" xmlns:wp="http://schemas.openxmlformats.org/drawingml/2006/wordprocessingDrawing" xmlns:a14="http://schemas.microsoft.com/office/drawing/2010/main" xmlns:mc="http://schemas.openxmlformats.org/markup-compatibility/2006" xmlns:p14="http://schemas.microsoft.com/office/powerpoint/2010/main" xmlns:p="http://schemas.openxmlformats.org/presentationml/2006/main">
-  <p:cSld name="">
+<p:notes xmlns:a="http://schemas.openxmlformats.org/drawingml/2006/main" xmlns:r="http://schemas.openxmlformats.org/officeDocument/2006/relationships" xmlns:p="http://schemas.openxmlformats.org/presentationml/2006/main">
+  <p:cSld>
     <p:spTree>
       <p:nvGrpSpPr>
         <p:cNvPr id="1" name=""/>
@@ -3858,6 +3119,8 @@
         <a:xfrm>
           <a:off x="0" y="0"/>
           <a:ext cx="0" cy="0"/>
+          <a:chOff x="0" y="0"/>
+          <a:chExt cx="0" cy="0"/>
         </a:xfrm>
       </p:grpSpPr>
       <p:sp>
@@ -3897,7 +3160,12 @@
                 <a:ea typeface="Aptos"/>
                 <a:cs typeface="Aptos"/>
               </a:rPr>
-              <a:t>Teh Chai di Amerika Latin didistribusikan melalui pengecer, grosir, dan distributor.</a:t>
+              <a:t>Teh Chai di Amerika Latin didistribusikan melalui pengecer, grosir, dan distributor. Peritel, seperti supermarket dan kafe, menjual langsung ke konsumen dan dapat memengaruhi persepsi dan pembelian mereka. Peritel utama termasuk Walmart dan Starbucks. Grosir menjual secara massal ke pengecer, sementara distributor mengangkut produk dari produsen ke pengecer.</a:t>
+            </a:r>
+            <a:r>
+              <a:rPr sz="1200"/>
+              <a:t>
+</a:t>
             </a:r>
             <a:r>
               <a:rPr lang="id-ID" sz="1200" b="0" i="0" strike="noStrike" cap="none" baseline="0">
@@ -3909,7 +3177,12 @@
                 <a:ea typeface="Aptos"/>
                 <a:cs typeface="Aptos"/>
               </a:rPr>
-              <a:t> </a:t>
+              <a:t>Konten Asli:</a:t>
+            </a:r>
+            <a:r>
+              <a:rPr sz="1200"/>
+              <a:t>
+</a:t>
             </a:r>
             <a:r>
               <a:rPr lang="id-ID" sz="1200" b="0" i="0" strike="noStrike" cap="none" baseline="0">
@@ -3921,7 +3194,12 @@
                 <a:ea typeface="Aptos"/>
                 <a:cs typeface="Aptos"/>
               </a:rPr>
-              <a:t>Peritel, seperti supermarket dan kafe, menjual langsung ke konsumen dan dapat memengaruhi persepsi dan pembelian mereka.</a:t>
+              <a:t>Saluran distribusi untuk teh Chai di Amerika Latin adalah cara dan sarana yang digunakan untuk mengirimkan dan menjual produk teh Chai kepada konsumen akhir. Saluran distribusi untuk teh Chai di Amerika Latin dapat diklasifikasikan menjadi tiga jenis: pengecer, grosir, dan distributor.</a:t>
+            </a:r>
+            <a:r>
+              <a:rPr sz="1200"/>
+              <a:t>
+</a:t>
             </a:r>
             <a:r>
               <a:rPr lang="id-ID" sz="1200" b="0" i="0" strike="noStrike" cap="none" baseline="0">
@@ -3933,200 +3211,7 @@
                 <a:ea typeface="Aptos"/>
                 <a:cs typeface="Aptos"/>
               </a:rPr>
-              <a:t> </a:t>
-            </a:r>
-            <a:r>
-              <a:rPr lang="id-ID" sz="1200" b="0" i="0" strike="noStrike" cap="none" baseline="0">
-                <a:solidFill>
-                  <a:srgbClr val="000000"/>
-                </a:solidFill>
-                <a:effectLst/>
-                <a:latin typeface="Aptos"/>
-                <a:ea typeface="Aptos"/>
-                <a:cs typeface="Aptos"/>
-              </a:rPr>
-              <a:t>Peritel utama termasuk Walmart dan Starbucks.</a:t>
-            </a:r>
-            <a:r>
-              <a:rPr lang="id-ID" sz="1200" b="0" i="0" strike="noStrike" cap="none" baseline="0">
-                <a:solidFill>
-                  <a:srgbClr val="000000"/>
-                </a:solidFill>
-                <a:effectLst/>
-                <a:latin typeface="Aptos"/>
-                <a:ea typeface="Aptos"/>
-                <a:cs typeface="Aptos"/>
-              </a:rPr>
-              <a:t> </a:t>
-            </a:r>
-            <a:r>
-              <a:rPr lang="id-ID" sz="1200" b="0" i="0" strike="noStrike" cap="none" baseline="0">
-                <a:solidFill>
-                  <a:srgbClr val="000000"/>
-                </a:solidFill>
-                <a:effectLst/>
-                <a:latin typeface="Aptos"/>
-                <a:ea typeface="Aptos"/>
-                <a:cs typeface="Aptos"/>
-              </a:rPr>
-              <a:t>Grosir menjual secara massal ke pengecer, sementara distributor mengangkut produk dari produsen ke pengecer.</a:t>
-            </a:r>
-            <a:r>
-              <a:rPr sz="1200"/>
-              <a:t>
-</a:t>
-            </a:r>
-            <a:r>
-              <a:rPr sz="1200"/>
-              <a:t>
-</a:t>
-            </a:r>
-            <a:r>
-              <a:rPr sz="1200"/>
-              <a:t>
-</a:t>
-            </a:r>
-            <a:r>
-              <a:rPr lang="id-ID" sz="1200" b="0" i="0" strike="noStrike" cap="none" baseline="0">
-                <a:solidFill>
-                  <a:srgbClr val="000000"/>
-                </a:solidFill>
-                <a:effectLst/>
-                <a:latin typeface="Aptos"/>
-                <a:ea typeface="Aptos"/>
-                <a:cs typeface="Aptos"/>
-              </a:rPr>
-              <a:t>Konten Asli:</a:t>
-            </a:r>
-            <a:r>
-              <a:rPr sz="1200"/>
-              <a:t>
-</a:t>
-            </a:r>
-            <a:r>
-              <a:rPr lang="id-ID" sz="1200" b="0" i="0" strike="noStrike" cap="none" baseline="0">
-                <a:solidFill>
-                  <a:srgbClr val="000000"/>
-                </a:solidFill>
-                <a:effectLst/>
-                <a:latin typeface="Aptos"/>
-                <a:ea typeface="Aptos"/>
-                <a:cs typeface="Aptos"/>
-              </a:rPr>
-              <a:t>Saluran distribusi untuk teh Chai di Amerika Latin adalah cara dan sarana yang digunakan untuk mengirimkan dan menjual produk teh Chai kepada konsumen akhir.</a:t>
-            </a:r>
-            <a:r>
-              <a:rPr lang="id-ID" sz="1200" b="0" i="0" strike="noStrike" cap="none" baseline="0">
-                <a:solidFill>
-                  <a:srgbClr val="000000"/>
-                </a:solidFill>
-                <a:effectLst/>
-                <a:latin typeface="Aptos"/>
-                <a:ea typeface="Aptos"/>
-                <a:cs typeface="Aptos"/>
-              </a:rPr>
-              <a:t> </a:t>
-            </a:r>
-            <a:r>
-              <a:rPr lang="id-ID" sz="1200" b="0" i="0" strike="noStrike" cap="none" baseline="0">
-                <a:solidFill>
-                  <a:srgbClr val="000000"/>
-                </a:solidFill>
-                <a:effectLst/>
-                <a:latin typeface="Aptos"/>
-                <a:ea typeface="Aptos"/>
-                <a:cs typeface="Aptos"/>
-              </a:rPr>
-              <a:t>Saluran distribusi untuk teh Chai di Amerika Latin dapat diklasifikasikan menjadi tiga jenis: pengecer, grosir, dan distributor.</a:t>
-            </a:r>
-            <a:r>
-              <a:rPr sz="1200"/>
-              <a:t>
-</a:t>
-            </a:r>
-            <a:r>
-              <a:rPr lang="id-ID" sz="1200" b="0" i="0" strike="noStrike" cap="none" baseline="0">
-                <a:solidFill>
-                  <a:srgbClr val="000000"/>
-                </a:solidFill>
-                <a:effectLst/>
-                <a:latin typeface="Aptos"/>
-                <a:ea typeface="Aptos"/>
-                <a:cs typeface="Aptos"/>
-              </a:rPr>
-              <a:t>Peritel adalah bisnis yang menjual produk teh Chai langsung ke konsumen, seperti supermarket, toko serba ada, toko khusus, kafe, dan platform online.</a:t>
-            </a:r>
-            <a:r>
-              <a:rPr lang="id-ID" sz="1200" b="0" i="0" strike="noStrike" cap="none" baseline="0">
-                <a:solidFill>
-                  <a:srgbClr val="000000"/>
-                </a:solidFill>
-                <a:effectLst/>
-                <a:latin typeface="Aptos"/>
-                <a:ea typeface="Aptos"/>
-                <a:cs typeface="Aptos"/>
-              </a:rPr>
-              <a:t> </a:t>
-            </a:r>
-            <a:r>
-              <a:rPr lang="id-ID" sz="1200" b="0" i="0" strike="noStrike" cap="none" baseline="0">
-                <a:solidFill>
-                  <a:srgbClr val="000000"/>
-                </a:solidFill>
-                <a:effectLst/>
-                <a:latin typeface="Aptos"/>
-                <a:ea typeface="Aptos"/>
-                <a:cs typeface="Aptos"/>
-              </a:rPr>
-              <a:t>Peritel adalah saluran yang paling terlihat dan dapat diakses untuk produk teh Chai, dan mereka dapat memengaruhi persepsi konsumen, preferensi, dan pembelian produk teh Chai.</a:t>
-            </a:r>
-            <a:r>
-              <a:rPr lang="id-ID" sz="1200" b="0" i="0" strike="noStrike" cap="none" baseline="0">
-                <a:solidFill>
-                  <a:srgbClr val="000000"/>
-                </a:solidFill>
-                <a:effectLst/>
-                <a:latin typeface="Aptos"/>
-                <a:ea typeface="Aptos"/>
-                <a:cs typeface="Aptos"/>
-              </a:rPr>
-              <a:t> </a:t>
-            </a:r>
-            <a:r>
-              <a:rPr lang="id-ID" sz="1200" b="0" i="0" strike="noStrike" cap="none" baseline="0">
-                <a:solidFill>
-                  <a:srgbClr val="000000"/>
-                </a:solidFill>
-                <a:effectLst/>
-                <a:latin typeface="Aptos"/>
-                <a:ea typeface="Aptos"/>
-                <a:cs typeface="Aptos"/>
-              </a:rPr>
-              <a:t>Peritel juga dapat menawarkan dukungan promosi dan merchandising untuk produk teh Chai, seperti pajangan, papan tanda, dan ruang rak.</a:t>
-            </a:r>
-            <a:r>
-              <a:rPr lang="id-ID" sz="1200" b="0" i="0" strike="noStrike" cap="none" baseline="0">
-                <a:solidFill>
-                  <a:srgbClr val="000000"/>
-                </a:solidFill>
-                <a:effectLst/>
-                <a:latin typeface="Aptos"/>
-                <a:ea typeface="Aptos"/>
-                <a:cs typeface="Aptos"/>
-              </a:rPr>
-              <a:t> </a:t>
-            </a:r>
-            <a:r>
-              <a:rPr lang="id-ID" sz="1200" b="0" i="0" strike="noStrike" cap="none" baseline="0">
-                <a:solidFill>
-                  <a:srgbClr val="000000"/>
-                </a:solidFill>
-                <a:effectLst/>
-                <a:latin typeface="Aptos"/>
-                <a:ea typeface="Aptos"/>
-                <a:cs typeface="Aptos"/>
-              </a:rPr>
-              <a:t>Beberapa peritel utama produk teh Chai di Amerika Latin adalah Walmart, Carrefour, Oxxo, Starbucks, dan Amazon.</a:t>
+              <a:t>Peritel adalah bisnis yang menjual produk teh Chai langsung ke konsumen, seperti supermarket, toko serba ada, toko khusus, kafe, dan platform online. Peritel adalah saluran yang paling terlihat dan dapat diakses untuk produk teh Chai, dan mereka dapat memengaruhi persepsi konsumen, preferensi, dan pembelian produk teh Chai. Peritel juga dapat menawarkan dukungan promosi dan merchandising untuk produk teh Chai, seperti pajangan, papan tanda, dan ruang rak. Beberapa peritel utama produk teh Chai di Amerika Latin adalah Walmart, Carrefour, Oxxo, Starbucks, dan Amazon.</a:t>
             </a:r>
             <a:r>
               <a:rPr sz="1200"/>
@@ -4173,8 +3258,8 @@
 </file>
 
 <file path=ppt/notesSlides/notesSlide9.xml><?xml version="1.0" encoding="utf-8"?>
-<p:notes xmlns:a="http://schemas.openxmlformats.org/drawingml/2006/main" xmlns:r="http://schemas.openxmlformats.org/officeDocument/2006/relationships" xmlns:m="http://schemas.openxmlformats.org/officeDocument/2006/math" xmlns:w="http://schemas.openxmlformats.org/wordprocessingml/2006/main" xmlns:wp="http://schemas.openxmlformats.org/drawingml/2006/wordprocessingDrawing" xmlns:a14="http://schemas.microsoft.com/office/drawing/2010/main" xmlns:mc="http://schemas.openxmlformats.org/markup-compatibility/2006" xmlns:p14="http://schemas.microsoft.com/office/powerpoint/2010/main" xmlns:p="http://schemas.openxmlformats.org/presentationml/2006/main">
-  <p:cSld name="">
+<p:notes xmlns:a="http://schemas.openxmlformats.org/drawingml/2006/main" xmlns:r="http://schemas.openxmlformats.org/officeDocument/2006/relationships" xmlns:p="http://schemas.openxmlformats.org/presentationml/2006/main">
+  <p:cSld>
     <p:spTree>
       <p:nvGrpSpPr>
         <p:cNvPr id="1" name=""/>
@@ -4185,6 +3270,8 @@
         <a:xfrm>
           <a:off x="0" y="0"/>
           <a:ext cx="0" cy="0"/>
+          <a:chOff x="0" y="0"/>
+          <a:chExt cx="0" cy="0"/>
         </a:xfrm>
       </p:grpSpPr>
       <p:sp>
@@ -4224,7 +3311,12 @@
                 <a:ea typeface="Aptos"/>
                 <a:cs typeface="Aptos"/>
               </a:rPr>
-              <a:t>Grosir membeli produk teh Chai secara massal dan menjualnya kepada pengecer atau perantara lainnya.</a:t>
+              <a:t>Grosir membeli produk teh Chai secara massal dan menjualnya kepada pengecer atau perantara lainnya. Mereka menghubungkan pasokan dan permintaan produk teh Chai dan menawarkan berbagai layanan. Grosir utama di Amerika Latin termasuk Cencosud, Grupo Pao de Acucar, La Anonima, dan Makro.</a:t>
+            </a:r>
+            <a:r>
+              <a:rPr sz="1200"/>
+              <a:t>
+</a:t>
             </a:r>
             <a:r>
               <a:rPr lang="id-ID" sz="1200" b="0" i="0" strike="noStrike" cap="none" baseline="0">
@@ -4236,7 +3328,12 @@
                 <a:ea typeface="Aptos"/>
                 <a:cs typeface="Aptos"/>
               </a:rPr>
-              <a:t> </a:t>
+              <a:t>Konten Asli:</a:t>
+            </a:r>
+            <a:r>
+              <a:rPr sz="1200"/>
+              <a:t>
+</a:t>
             </a:r>
             <a:r>
               <a:rPr lang="id-ID" sz="1200" b="0" i="0" strike="noStrike" cap="none" baseline="0">
@@ -4248,147 +3345,7 @@
                 <a:ea typeface="Aptos"/>
                 <a:cs typeface="Aptos"/>
               </a:rPr>
-              <a:t>Mereka menghubungkan pasokan dan permintaan produk teh Chai dan menawarkan berbagai layanan.</a:t>
-            </a:r>
-            <a:r>
-              <a:rPr lang="id-ID" sz="1200" b="0" i="0" strike="noStrike" cap="none" baseline="0">
-                <a:solidFill>
-                  <a:srgbClr val="000000"/>
-                </a:solidFill>
-                <a:effectLst/>
-                <a:latin typeface="Aptos"/>
-                <a:ea typeface="Aptos"/>
-                <a:cs typeface="Aptos"/>
-              </a:rPr>
-              <a:t> </a:t>
-            </a:r>
-            <a:r>
-              <a:rPr lang="id-ID" sz="1200" b="0" i="0" strike="noStrike" cap="none" baseline="0">
-                <a:solidFill>
-                  <a:srgbClr val="000000"/>
-                </a:solidFill>
-                <a:effectLst/>
-                <a:latin typeface="Aptos"/>
-                <a:ea typeface="Aptos"/>
-                <a:cs typeface="Aptos"/>
-              </a:rPr>
-              <a:t>Grosir utama di Amerika Latin termasuk Cencosud, Grupo Pao de Acucar, La Anonima, dan Makro.</a:t>
-            </a:r>
-            <a:r>
-              <a:rPr sz="1200"/>
-              <a:t>
-</a:t>
-            </a:r>
-            <a:r>
-              <a:rPr sz="1200"/>
-              <a:t>
-</a:t>
-            </a:r>
-            <a:r>
-              <a:rPr sz="1200"/>
-              <a:t>
-</a:t>
-            </a:r>
-            <a:r>
-              <a:rPr lang="id-ID" sz="1200" b="0" i="0" strike="noStrike" cap="none" baseline="0">
-                <a:solidFill>
-                  <a:srgbClr val="000000"/>
-                </a:solidFill>
-                <a:effectLst/>
-                <a:latin typeface="Aptos"/>
-                <a:ea typeface="Aptos"/>
-                <a:cs typeface="Aptos"/>
-              </a:rPr>
-              <a:t>Konten Asli:</a:t>
-            </a:r>
-            <a:r>
-              <a:rPr sz="1200"/>
-              <a:t>
-</a:t>
-            </a:r>
-            <a:r>
-              <a:rPr lang="id-ID" sz="1200" b="0" i="0" strike="noStrike" cap="none" baseline="0">
-                <a:solidFill>
-                  <a:srgbClr val="000000"/>
-                </a:solidFill>
-                <a:effectLst/>
-                <a:latin typeface="Aptos"/>
-                <a:ea typeface="Aptos"/>
-                <a:cs typeface="Aptos"/>
-              </a:rPr>
-              <a:t>Grosir adalah bisnis yang membeli produk teh Chai secara massal dari produsen atau distributor dan menjualnya ke pengecer atau perantara lainnya.</a:t>
-            </a:r>
-            <a:r>
-              <a:rPr lang="id-ID" sz="1200" b="0" i="0" strike="noStrike" cap="none" baseline="0">
-                <a:solidFill>
-                  <a:srgbClr val="000000"/>
-                </a:solidFill>
-                <a:effectLst/>
-                <a:latin typeface="Aptos"/>
-                <a:ea typeface="Aptos"/>
-                <a:cs typeface="Aptos"/>
-              </a:rPr>
-              <a:t> </a:t>
-            </a:r>
-            <a:r>
-              <a:rPr lang="id-ID" sz="1200" b="0" i="0" strike="noStrike" cap="none" baseline="0">
-                <a:solidFill>
-                  <a:srgbClr val="000000"/>
-                </a:solidFill>
-                <a:effectLst/>
-                <a:latin typeface="Aptos"/>
-                <a:ea typeface="Aptos"/>
-                <a:cs typeface="Aptos"/>
-              </a:rPr>
-              <a:t>Grosir adalah hubungan antara pasokan dan permintaan produk teh Chai, dan mereka dapat menawarkan ekonomi skala, penyimpanan, dan layanan transportasi untuk produk teh Chai.</a:t>
-            </a:r>
-            <a:r>
-              <a:rPr lang="id-ID" sz="1200" b="0" i="0" strike="noStrike" cap="none" baseline="0">
-                <a:solidFill>
-                  <a:srgbClr val="000000"/>
-                </a:solidFill>
-                <a:effectLst/>
-                <a:latin typeface="Aptos"/>
-                <a:ea typeface="Aptos"/>
-                <a:cs typeface="Aptos"/>
-              </a:rPr>
-              <a:t> </a:t>
-            </a:r>
-            <a:r>
-              <a:rPr lang="id-ID" sz="1200" b="0" i="0" strike="noStrike" cap="none" baseline="0">
-                <a:solidFill>
-                  <a:srgbClr val="000000"/>
-                </a:solidFill>
-                <a:effectLst/>
-                <a:latin typeface="Aptos"/>
-                <a:ea typeface="Aptos"/>
-                <a:cs typeface="Aptos"/>
-              </a:rPr>
-              <a:t>Grosir juga dapat memberikan informasi pasar, umpan balik, dan fasilitas kredit untuk produk teh Chai.</a:t>
-            </a:r>
-            <a:r>
-              <a:rPr lang="id-ID" sz="1200" b="0" i="0" strike="noStrike" cap="none" baseline="0">
-                <a:solidFill>
-                  <a:srgbClr val="000000"/>
-                </a:solidFill>
-                <a:effectLst/>
-                <a:latin typeface="Aptos"/>
-                <a:ea typeface="Aptos"/>
-                <a:cs typeface="Aptos"/>
-              </a:rPr>
-              <a:t> </a:t>
-            </a:r>
-            <a:r>
-              <a:rPr lang="id-ID" sz="1200" b="0" i="0" strike="noStrike" cap="none" baseline="0">
-                <a:solidFill>
-                  <a:srgbClr val="000000"/>
-                </a:solidFill>
-                <a:effectLst/>
-                <a:latin typeface="Aptos"/>
-                <a:ea typeface="Aptos"/>
-                <a:cs typeface="Aptos"/>
-              </a:rPr>
-              <a:t>Beberapa grosir utama produk teh Chai di Amerika Latin adalah Cencosud, Grupo Pao de Acucar, La Anonima, dan Makro.</a:t>
+              <a:t>Grosir adalah bisnis yang membeli produk teh Chai secara massal dari produsen atau distributor dan menjualnya ke pengecer atau perantara lainnya. Grosir adalah hubungan antara pasokan dan permintaan produk teh Chai, dan mereka dapat menawarkan ekonomi skala, penyimpanan, dan layanan transportasi untuk produk teh Chai. Grosir juga dapat memberikan informasi pasar, umpan balik, dan fasilitas kredit untuk produk teh Chai. Beberapa grosir utama produk teh Chai di Amerika Latin adalah Cencosud, Grupo Pao de Acucar, La Anonima, dan Makro.</a:t>
             </a:r>
             <a:r>
               <a:rPr sz="1200"/>
@@ -4435,7 +3392,7 @@
 </file>
 
 <file path=ppt/slideLayouts/slideLayout1.xml><?xml version="1.0" encoding="utf-8"?>
-<p:sldLayout xmlns:a="http://schemas.openxmlformats.org/drawingml/2006/main" xmlns:r="http://schemas.openxmlformats.org/officeDocument/2006/relationships" xmlns:m="http://schemas.openxmlformats.org/officeDocument/2006/math" xmlns:w="http://schemas.openxmlformats.org/wordprocessingml/2006/main" xmlns:wp="http://schemas.openxmlformats.org/drawingml/2006/wordprocessingDrawing" xmlns:a14="http://schemas.microsoft.com/office/drawing/2010/main" xmlns:mc="http://schemas.openxmlformats.org/markup-compatibility/2006" xmlns:p14="http://schemas.microsoft.com/office/powerpoint/2010/main" xmlns:p15="http://schemas.microsoft.com/office/powerpoint/2012/main" xmlns:p159="http://schemas.microsoft.com/office/powerpoint/2015/09/main" xmlns:p="http://schemas.openxmlformats.org/presentationml/2006/main" showMasterSp="0" type="title" preserve="1">
+<p:sldLayout xmlns:a="http://schemas.openxmlformats.org/drawingml/2006/main" xmlns:r="http://schemas.openxmlformats.org/officeDocument/2006/relationships" xmlns:p="http://schemas.openxmlformats.org/presentationml/2006/main" showMasterSp="0" type="title" preserve="1">
   <p:cSld name="Title Slide">
     <p:spTree>
       <p:nvGrpSpPr>
@@ -4447,6 +3404,8 @@
         <a:xfrm>
           <a:off x="0" y="0"/>
           <a:ext cx="0" cy="0"/>
+          <a:chOff x="0" y="0"/>
+          <a:chExt cx="0" cy="0"/>
         </a:xfrm>
       </p:grpSpPr>
       <p:sp>
@@ -4495,7 +3454,9 @@
         <p:txBody>
           <a:bodyPr/>
           <a:lstStyle/>
-          <a:p/>
+          <a:p>
+            <a:endParaRPr/>
+          </a:p>
         </p:txBody>
       </p:sp>
       <p:sp>
@@ -4538,7 +3499,6 @@
               <a:rPr lang="en-US"/>
               <a:t>Click to edit Master title style</a:t>
             </a:r>
-            <a:endParaRPr lang="en-US"/>
           </a:p>
         </p:txBody>
       </p:sp>
@@ -4610,7 +3570,6 @@
               <a:rPr lang="en-US"/>
               <a:t>Click to edit Master subtitle style</a:t>
             </a:r>
-            <a:endParaRPr lang="en-US"/>
           </a:p>
         </p:txBody>
       </p:sp>
@@ -4681,7 +3640,7 @@
           <a:p>
             <a:fld id="{9184DA70-C731-4C70-880D-CCD4705E623C}" type="datetime1">
               <a:rPr lang="en-US" smtClean="0"/>
-              <a:t>6/26/2024</a:t>
+              <a:t>5/16/2025</a:t>
             </a:fld>
             <a:endParaRPr lang="en-US"/>
           </a:p>
@@ -4752,12 +3711,11 @@
     <a:masterClrMapping/>
   </p:clrMapOvr>
   <p:transition/>
-  <p:timing/>
 </p:sldLayout>
 </file>
 
 <file path=ppt/slideLayouts/slideLayout10.xml><?xml version="1.0" encoding="utf-8"?>
-<p:sldLayout xmlns:a="http://schemas.openxmlformats.org/drawingml/2006/main" xmlns:r="http://schemas.openxmlformats.org/officeDocument/2006/relationships" xmlns:m="http://schemas.openxmlformats.org/officeDocument/2006/math" xmlns:w="http://schemas.openxmlformats.org/wordprocessingml/2006/main" xmlns:wp="http://schemas.openxmlformats.org/drawingml/2006/wordprocessingDrawing" xmlns:a14="http://schemas.microsoft.com/office/drawing/2010/main" xmlns:mc="http://schemas.openxmlformats.org/markup-compatibility/2006" xmlns:p14="http://schemas.microsoft.com/office/powerpoint/2010/main" xmlns:p15="http://schemas.microsoft.com/office/powerpoint/2012/main" xmlns:p159="http://schemas.microsoft.com/office/powerpoint/2015/09/main" xmlns:p="http://schemas.openxmlformats.org/presentationml/2006/main" type="vertTx" preserve="1">
+<p:sldLayout xmlns:a="http://schemas.openxmlformats.org/drawingml/2006/main" xmlns:r="http://schemas.openxmlformats.org/officeDocument/2006/relationships" xmlns:p="http://schemas.openxmlformats.org/presentationml/2006/main" type="vertTx" preserve="1">
   <p:cSld name="Title and Vertical Text">
     <p:spTree>
       <p:nvGrpSpPr>
@@ -4769,6 +3727,8 @@
         <a:xfrm>
           <a:off x="0" y="0"/>
           <a:ext cx="0" cy="0"/>
+          <a:chOff x="0" y="0"/>
+          <a:chExt cx="0" cy="0"/>
         </a:xfrm>
       </p:grpSpPr>
       <p:sp>
@@ -4790,7 +3750,6 @@
               <a:rPr lang="en-US"/>
               <a:t>Click to edit Master title style</a:t>
             </a:r>
-            <a:endParaRPr lang="en-US"/>
           </a:p>
         </p:txBody>
       </p:sp>
@@ -4842,7 +3801,6 @@
               <a:rPr lang="en-US"/>
               <a:t>Fifth level</a:t>
             </a:r>
-            <a:endParaRPr lang="en-US"/>
           </a:p>
         </p:txBody>
       </p:sp>
@@ -4869,7 +3827,7 @@
           <a:p>
             <a:fld id="{B612A279-0833-481D-8C56-F67FD0AC6C50}" type="datetime1">
               <a:rPr lang="en-US" smtClean="0"/>
-              <a:t>6/26/2024</a:t>
+              <a:t>5/16/2025</a:t>
             </a:fld>
             <a:endParaRPr lang="en-US"/>
           </a:p>
@@ -4940,12 +3898,11 @@
     <a:masterClrMapping/>
   </p:clrMapOvr>
   <p:transition/>
-  <p:timing/>
 </p:sldLayout>
 </file>
 
 <file path=ppt/slideLayouts/slideLayout11.xml><?xml version="1.0" encoding="utf-8"?>
-<p:sldLayout xmlns:a="http://schemas.openxmlformats.org/drawingml/2006/main" xmlns:r="http://schemas.openxmlformats.org/officeDocument/2006/relationships" xmlns:m="http://schemas.openxmlformats.org/officeDocument/2006/math" xmlns:w="http://schemas.openxmlformats.org/wordprocessingml/2006/main" xmlns:wp="http://schemas.openxmlformats.org/drawingml/2006/wordprocessingDrawing" xmlns:a14="http://schemas.microsoft.com/office/drawing/2010/main" xmlns:mc="http://schemas.openxmlformats.org/markup-compatibility/2006" xmlns:p14="http://schemas.microsoft.com/office/powerpoint/2010/main" xmlns:p15="http://schemas.microsoft.com/office/powerpoint/2012/main" xmlns:p159="http://schemas.microsoft.com/office/powerpoint/2015/09/main" xmlns:p="http://schemas.openxmlformats.org/presentationml/2006/main" showMasterSp="0" type="vertTitleAndTx" preserve="1">
+<p:sldLayout xmlns:a="http://schemas.openxmlformats.org/drawingml/2006/main" xmlns:r="http://schemas.openxmlformats.org/officeDocument/2006/relationships" xmlns:p="http://schemas.openxmlformats.org/presentationml/2006/main" showMasterSp="0" type="vertTitleAndTx" preserve="1">
   <p:cSld name="Vertical Title and Text">
     <p:spTree>
       <p:nvGrpSpPr>
@@ -4957,6 +3914,8 @@
         <a:xfrm>
           <a:off x="0" y="0"/>
           <a:ext cx="0" cy="0"/>
+          <a:chOff x="0" y="0"/>
+          <a:chExt cx="0" cy="0"/>
         </a:xfrm>
       </p:grpSpPr>
       <p:sp>
@@ -5005,7 +3964,9 @@
         <p:txBody>
           <a:bodyPr/>
           <a:lstStyle/>
-          <a:p/>
+          <a:p>
+            <a:endParaRPr/>
+          </a:p>
         </p:txBody>
       </p:sp>
       <p:sp>
@@ -5032,7 +3993,6 @@
               <a:rPr lang="en-US"/>
               <a:t>Click to edit Master title style</a:t>
             </a:r>
-            <a:endParaRPr lang="en-US"/>
           </a:p>
         </p:txBody>
       </p:sp>
@@ -5089,7 +4049,6 @@
               <a:rPr lang="en-US"/>
               <a:t>Fifth level</a:t>
             </a:r>
-            <a:endParaRPr lang="en-US"/>
           </a:p>
         </p:txBody>
       </p:sp>
@@ -5116,7 +4075,7 @@
           <a:p>
             <a:fld id="{6587DA83-5663-4C9C-B9AA-0B40A3DAFF81}" type="datetime1">
               <a:rPr lang="en-US" smtClean="0"/>
-              <a:t>6/26/2024</a:t>
+              <a:t>5/16/2025</a:t>
             </a:fld>
             <a:endParaRPr lang="en-US"/>
           </a:p>
@@ -5187,12 +4146,11 @@
     <a:masterClrMapping/>
   </p:clrMapOvr>
   <p:transition/>
-  <p:timing/>
 </p:sldLayout>
 </file>
 
 <file path=ppt/slideLayouts/slideLayout2.xml><?xml version="1.0" encoding="utf-8"?>
-<p:sldLayout xmlns:a="http://schemas.openxmlformats.org/drawingml/2006/main" xmlns:r="http://schemas.openxmlformats.org/officeDocument/2006/relationships" xmlns:m="http://schemas.openxmlformats.org/officeDocument/2006/math" xmlns:w="http://schemas.openxmlformats.org/wordprocessingml/2006/main" xmlns:wp="http://schemas.openxmlformats.org/drawingml/2006/wordprocessingDrawing" xmlns:a14="http://schemas.microsoft.com/office/drawing/2010/main" xmlns:mc="http://schemas.openxmlformats.org/markup-compatibility/2006" xmlns:p14="http://schemas.microsoft.com/office/powerpoint/2010/main" xmlns:p15="http://schemas.microsoft.com/office/powerpoint/2012/main" xmlns:p159="http://schemas.microsoft.com/office/powerpoint/2015/09/main" xmlns:p="http://schemas.openxmlformats.org/presentationml/2006/main" type="obj" preserve="1">
+<p:sldLayout xmlns:a="http://schemas.openxmlformats.org/drawingml/2006/main" xmlns:r="http://schemas.openxmlformats.org/officeDocument/2006/relationships" xmlns:p="http://schemas.openxmlformats.org/presentationml/2006/main" type="obj" preserve="1">
   <p:cSld name="Title and Content">
     <p:spTree>
       <p:nvGrpSpPr>
@@ -5204,6 +4162,8 @@
         <a:xfrm>
           <a:off x="0" y="0"/>
           <a:ext cx="0" cy="0"/>
+          <a:chOff x="0" y="0"/>
+          <a:chExt cx="0" cy="0"/>
         </a:xfrm>
       </p:grpSpPr>
       <p:sp>
@@ -5225,7 +4185,6 @@
               <a:rPr lang="en-US"/>
               <a:t>Click to edit Master title style</a:t>
             </a:r>
-            <a:endParaRPr lang="en-US"/>
           </a:p>
         </p:txBody>
       </p:sp>
@@ -5277,7 +4236,6 @@
               <a:rPr lang="en-US"/>
               <a:t>Fifth level</a:t>
             </a:r>
-            <a:endParaRPr lang="en-US"/>
           </a:p>
         </p:txBody>
       </p:sp>
@@ -5304,7 +4262,7 @@
           <a:p>
             <a:fld id="{4BE1D723-8F53-4F53-90B0-1982A396982E}" type="datetime1">
               <a:rPr lang="en-US" smtClean="0"/>
-              <a:t>6/26/2024</a:t>
+              <a:t>5/16/2025</a:t>
             </a:fld>
             <a:endParaRPr lang="en-US"/>
           </a:p>
@@ -5375,12 +4333,11 @@
     <a:masterClrMapping/>
   </p:clrMapOvr>
   <p:transition/>
-  <p:timing/>
 </p:sldLayout>
 </file>
 
 <file path=ppt/slideLayouts/slideLayout3.xml><?xml version="1.0" encoding="utf-8"?>
-<p:sldLayout xmlns:a="http://schemas.openxmlformats.org/drawingml/2006/main" xmlns:r="http://schemas.openxmlformats.org/officeDocument/2006/relationships" xmlns:m="http://schemas.openxmlformats.org/officeDocument/2006/math" xmlns:w="http://schemas.openxmlformats.org/wordprocessingml/2006/main" xmlns:wp="http://schemas.openxmlformats.org/drawingml/2006/wordprocessingDrawing" xmlns:a14="http://schemas.microsoft.com/office/drawing/2010/main" xmlns:mc="http://schemas.openxmlformats.org/markup-compatibility/2006" xmlns:p14="http://schemas.microsoft.com/office/powerpoint/2010/main" xmlns:p15="http://schemas.microsoft.com/office/powerpoint/2012/main" xmlns:p159="http://schemas.microsoft.com/office/powerpoint/2015/09/main" xmlns:p="http://schemas.openxmlformats.org/presentationml/2006/main" showMasterSp="0" type="secHead" preserve="1">
+<p:sldLayout xmlns:a="http://schemas.openxmlformats.org/drawingml/2006/main" xmlns:r="http://schemas.openxmlformats.org/officeDocument/2006/relationships" xmlns:p="http://schemas.openxmlformats.org/presentationml/2006/main" showMasterSp="0" type="secHead" preserve="1">
   <p:cSld name="Section Header">
     <p:bg>
       <p:bgPr>
@@ -5400,6 +4357,8 @@
         <a:xfrm>
           <a:off x="0" y="0"/>
           <a:ext cx="0" cy="0"/>
+          <a:chOff x="0" y="0"/>
+          <a:chExt cx="0" cy="0"/>
         </a:xfrm>
       </p:grpSpPr>
       <p:sp>
@@ -5448,7 +4407,9 @@
         <p:txBody>
           <a:bodyPr/>
           <a:lstStyle/>
-          <a:p/>
+          <a:p>
+            <a:endParaRPr/>
+          </a:p>
         </p:txBody>
       </p:sp>
       <p:sp>
@@ -5491,7 +4452,6 @@
               <a:rPr lang="en-US"/>
               <a:t>Click to edit Master title style</a:t>
             </a:r>
-            <a:endParaRPr lang="en-US"/>
           </a:p>
         </p:txBody>
       </p:sp>
@@ -5682,7 +4642,7 @@
           <a:p>
             <a:fld id="{97669AF7-7BEB-44E4-9852-375E34362B5B}" type="datetime1">
               <a:rPr lang="en-US" smtClean="0"/>
-              <a:t>6/26/2024</a:t>
+              <a:t>5/16/2025</a:t>
             </a:fld>
             <a:endParaRPr lang="en-US"/>
           </a:p>
@@ -5753,12 +4713,11 @@
     <a:masterClrMapping/>
   </p:clrMapOvr>
   <p:transition/>
-  <p:timing/>
 </p:sldLayout>
 </file>
 
 <file path=ppt/slideLayouts/slideLayout4.xml><?xml version="1.0" encoding="utf-8"?>
-<p:sldLayout xmlns:a="http://schemas.openxmlformats.org/drawingml/2006/main" xmlns:r="http://schemas.openxmlformats.org/officeDocument/2006/relationships" xmlns:m="http://schemas.openxmlformats.org/officeDocument/2006/math" xmlns:w="http://schemas.openxmlformats.org/wordprocessingml/2006/main" xmlns:wp="http://schemas.openxmlformats.org/drawingml/2006/wordprocessingDrawing" xmlns:a14="http://schemas.microsoft.com/office/drawing/2010/main" xmlns:mc="http://schemas.openxmlformats.org/markup-compatibility/2006" xmlns:p14="http://schemas.microsoft.com/office/powerpoint/2010/main" xmlns:p15="http://schemas.microsoft.com/office/powerpoint/2012/main" xmlns:p159="http://schemas.microsoft.com/office/powerpoint/2015/09/main" xmlns:p="http://schemas.openxmlformats.org/presentationml/2006/main" type="twoObj" preserve="1">
+<p:sldLayout xmlns:a="http://schemas.openxmlformats.org/drawingml/2006/main" xmlns:r="http://schemas.openxmlformats.org/officeDocument/2006/relationships" xmlns:p="http://schemas.openxmlformats.org/presentationml/2006/main" type="twoObj" preserve="1">
   <p:cSld name="Two Content">
     <p:spTree>
       <p:nvGrpSpPr>
@@ -5770,6 +4729,8 @@
         <a:xfrm>
           <a:off x="0" y="0"/>
           <a:ext cx="0" cy="0"/>
+          <a:chOff x="0" y="0"/>
+          <a:chExt cx="0" cy="0"/>
         </a:xfrm>
       </p:grpSpPr>
       <p:sp>
@@ -5796,7 +4757,6 @@
               <a:rPr lang="en-US"/>
               <a:t>Click to edit Master title style</a:t>
             </a:r>
-            <a:endParaRPr lang="en-US"/>
           </a:p>
         </p:txBody>
       </p:sp>
@@ -5853,7 +4813,6 @@
               <a:rPr lang="en-US"/>
               <a:t>Fifth level</a:t>
             </a:r>
-            <a:endParaRPr lang="en-US"/>
           </a:p>
         </p:txBody>
       </p:sp>
@@ -5910,7 +4869,6 @@
               <a:rPr lang="en-US"/>
               <a:t>Fifth level</a:t>
             </a:r>
-            <a:endParaRPr lang="en-US"/>
           </a:p>
         </p:txBody>
       </p:sp>
@@ -5937,7 +4895,7 @@
           <a:p>
             <a:fld id="{BAAAC38D-0552-4C82-B593-E6124DFADBE2}" type="datetime1">
               <a:rPr lang="en-US" smtClean="0"/>
-              <a:t>6/26/2024</a:t>
+              <a:t>5/16/2025</a:t>
             </a:fld>
             <a:endParaRPr lang="en-US"/>
           </a:p>
@@ -6008,12 +4966,11 @@
     <a:masterClrMapping/>
   </p:clrMapOvr>
   <p:transition/>
-  <p:timing/>
 </p:sldLayout>
 </file>
 
 <file path=ppt/slideLayouts/slideLayout5.xml><?xml version="1.0" encoding="utf-8"?>
-<p:sldLayout xmlns:a="http://schemas.openxmlformats.org/drawingml/2006/main" xmlns:r="http://schemas.openxmlformats.org/officeDocument/2006/relationships" xmlns:m="http://schemas.openxmlformats.org/officeDocument/2006/math" xmlns:w="http://schemas.openxmlformats.org/wordprocessingml/2006/main" xmlns:wp="http://schemas.openxmlformats.org/drawingml/2006/wordprocessingDrawing" xmlns:a14="http://schemas.microsoft.com/office/drawing/2010/main" xmlns:mc="http://schemas.openxmlformats.org/markup-compatibility/2006" xmlns:p14="http://schemas.microsoft.com/office/powerpoint/2010/main" xmlns:p15="http://schemas.microsoft.com/office/powerpoint/2012/main" xmlns:p159="http://schemas.microsoft.com/office/powerpoint/2015/09/main" xmlns:p="http://schemas.openxmlformats.org/presentationml/2006/main" type="twoTxTwoObj" preserve="1">
+<p:sldLayout xmlns:a="http://schemas.openxmlformats.org/drawingml/2006/main" xmlns:r="http://schemas.openxmlformats.org/officeDocument/2006/relationships" xmlns:p="http://schemas.openxmlformats.org/presentationml/2006/main" type="twoTxTwoObj" preserve="1">
   <p:cSld name="Comparison">
     <p:spTree>
       <p:nvGrpSpPr>
@@ -6025,6 +4982,8 @@
         <a:xfrm>
           <a:off x="0" y="0"/>
           <a:ext cx="0" cy="0"/>
+          <a:chOff x="0" y="0"/>
+          <a:chExt cx="0" cy="0"/>
         </a:xfrm>
       </p:grpSpPr>
       <p:sp>
@@ -6051,7 +5010,6 @@
               <a:rPr lang="en-US"/>
               <a:t>Click to edit Master title style</a:t>
             </a:r>
-            <a:endParaRPr lang="en-US"/>
           </a:p>
         </p:txBody>
       </p:sp>
@@ -6179,7 +5137,6 @@
               <a:rPr lang="en-US"/>
               <a:t>Fifth level</a:t>
             </a:r>
-            <a:endParaRPr lang="en-US"/>
           </a:p>
         </p:txBody>
       </p:sp>
@@ -6307,7 +5264,6 @@
               <a:rPr lang="en-US"/>
               <a:t>Fifth level</a:t>
             </a:r>
-            <a:endParaRPr lang="en-US"/>
           </a:p>
         </p:txBody>
       </p:sp>
@@ -6334,7 +5290,7 @@
           <a:p>
             <a:fld id="{D9DF0F1C-5577-4ACB-BB62-DF8F3C494C7E}" type="datetime1">
               <a:rPr lang="en-US" smtClean="0"/>
-              <a:t>6/26/2024</a:t>
+              <a:t>5/16/2025</a:t>
             </a:fld>
             <a:endParaRPr lang="en-US"/>
           </a:p>
@@ -6405,12 +5361,11 @@
     <a:masterClrMapping/>
   </p:clrMapOvr>
   <p:transition/>
-  <p:timing/>
 </p:sldLayout>
 </file>
 
 <file path=ppt/slideLayouts/slideLayout6.xml><?xml version="1.0" encoding="utf-8"?>
-<p:sldLayout xmlns:a="http://schemas.openxmlformats.org/drawingml/2006/main" xmlns:r="http://schemas.openxmlformats.org/officeDocument/2006/relationships" xmlns:m="http://schemas.openxmlformats.org/officeDocument/2006/math" xmlns:w="http://schemas.openxmlformats.org/wordprocessingml/2006/main" xmlns:wp="http://schemas.openxmlformats.org/drawingml/2006/wordprocessingDrawing" xmlns:a14="http://schemas.microsoft.com/office/drawing/2010/main" xmlns:mc="http://schemas.openxmlformats.org/markup-compatibility/2006" xmlns:p14="http://schemas.microsoft.com/office/powerpoint/2010/main" xmlns:p15="http://schemas.microsoft.com/office/powerpoint/2012/main" xmlns:p159="http://schemas.microsoft.com/office/powerpoint/2015/09/main" xmlns:p="http://schemas.openxmlformats.org/presentationml/2006/main" type="titleOnly" preserve="1">
+<p:sldLayout xmlns:a="http://schemas.openxmlformats.org/drawingml/2006/main" xmlns:r="http://schemas.openxmlformats.org/officeDocument/2006/relationships" xmlns:p="http://schemas.openxmlformats.org/presentationml/2006/main" type="titleOnly" preserve="1">
   <p:cSld name="Title Only">
     <p:spTree>
       <p:nvGrpSpPr>
@@ -6422,6 +5377,8 @@
         <a:xfrm>
           <a:off x="0" y="0"/>
           <a:ext cx="0" cy="0"/>
+          <a:chOff x="0" y="0"/>
+          <a:chExt cx="0" cy="0"/>
         </a:xfrm>
       </p:grpSpPr>
       <p:sp>
@@ -6443,7 +5400,6 @@
               <a:rPr lang="en-US"/>
               <a:t>Click to edit Master title style</a:t>
             </a:r>
-            <a:endParaRPr lang="en-US"/>
           </a:p>
         </p:txBody>
       </p:sp>
@@ -6470,7 +5426,7 @@
           <a:p>
             <a:fld id="{1775B394-D9F9-4F0C-B15D-605F45CB9E9F}" type="datetime1">
               <a:rPr lang="en-US" smtClean="0"/>
-              <a:t>6/26/2024</a:t>
+              <a:t>5/16/2025</a:t>
             </a:fld>
             <a:endParaRPr lang="en-US"/>
           </a:p>
@@ -6541,12 +5497,11 @@
     <a:masterClrMapping/>
   </p:clrMapOvr>
   <p:transition/>
-  <p:timing/>
 </p:sldLayout>
 </file>
 
 <file path=ppt/slideLayouts/slideLayout7.xml><?xml version="1.0" encoding="utf-8"?>
-<p:sldLayout xmlns:a="http://schemas.openxmlformats.org/drawingml/2006/main" xmlns:r="http://schemas.openxmlformats.org/officeDocument/2006/relationships" xmlns:m="http://schemas.openxmlformats.org/officeDocument/2006/math" xmlns:w="http://schemas.openxmlformats.org/wordprocessingml/2006/main" xmlns:wp="http://schemas.openxmlformats.org/drawingml/2006/wordprocessingDrawing" xmlns:a14="http://schemas.microsoft.com/office/drawing/2010/main" xmlns:mc="http://schemas.openxmlformats.org/markup-compatibility/2006" xmlns:p14="http://schemas.microsoft.com/office/powerpoint/2010/main" xmlns:p15="http://schemas.microsoft.com/office/powerpoint/2012/main" xmlns:p159="http://schemas.microsoft.com/office/powerpoint/2015/09/main" xmlns:p="http://schemas.openxmlformats.org/presentationml/2006/main" showMasterSp="0" type="blank" preserve="1">
+<p:sldLayout xmlns:a="http://schemas.openxmlformats.org/drawingml/2006/main" xmlns:r="http://schemas.openxmlformats.org/officeDocument/2006/relationships" xmlns:p="http://schemas.openxmlformats.org/presentationml/2006/main" showMasterSp="0" type="blank" preserve="1">
   <p:cSld name="Blank">
     <p:spTree>
       <p:nvGrpSpPr>
@@ -6558,6 +5513,8 @@
         <a:xfrm>
           <a:off x="0" y="0"/>
           <a:ext cx="0" cy="0"/>
+          <a:chOff x="0" y="0"/>
+          <a:chExt cx="0" cy="0"/>
         </a:xfrm>
       </p:grpSpPr>
       <p:sp>
@@ -6606,7 +5563,9 @@
         <p:txBody>
           <a:bodyPr/>
           <a:lstStyle/>
-          <a:p/>
+          <a:p>
+            <a:endParaRPr/>
+          </a:p>
         </p:txBody>
       </p:sp>
       <p:sp>
@@ -6632,7 +5591,7 @@
           <a:p>
             <a:fld id="{39667345-2558-425A-8533-9BFDBCE15005}" type="datetime1">
               <a:rPr lang="en-US" smtClean="0"/>
-              <a:t>6/26/2024</a:t>
+              <a:t>5/16/2025</a:t>
             </a:fld>
             <a:endParaRPr lang="en-US"/>
           </a:p>
@@ -6703,12 +5662,11 @@
     <a:masterClrMapping/>
   </p:clrMapOvr>
   <p:transition/>
-  <p:timing/>
 </p:sldLayout>
 </file>
 
 <file path=ppt/slideLayouts/slideLayout8.xml><?xml version="1.0" encoding="utf-8"?>
-<p:sldLayout xmlns:a="http://schemas.openxmlformats.org/drawingml/2006/main" xmlns:r="http://schemas.openxmlformats.org/officeDocument/2006/relationships" xmlns:m="http://schemas.openxmlformats.org/officeDocument/2006/math" xmlns:w="http://schemas.openxmlformats.org/wordprocessingml/2006/main" xmlns:wp="http://schemas.openxmlformats.org/drawingml/2006/wordprocessingDrawing" xmlns:a14="http://schemas.microsoft.com/office/drawing/2010/main" xmlns:mc="http://schemas.openxmlformats.org/markup-compatibility/2006" xmlns:p14="http://schemas.microsoft.com/office/powerpoint/2010/main" xmlns:p15="http://schemas.microsoft.com/office/powerpoint/2012/main" xmlns:p159="http://schemas.microsoft.com/office/powerpoint/2015/09/main" xmlns:p="http://schemas.openxmlformats.org/presentationml/2006/main" showMasterSp="0" type="objTx" preserve="1">
+<p:sldLayout xmlns:a="http://schemas.openxmlformats.org/drawingml/2006/main" xmlns:r="http://schemas.openxmlformats.org/officeDocument/2006/relationships" xmlns:p="http://schemas.openxmlformats.org/presentationml/2006/main" showMasterSp="0" type="objTx" preserve="1">
   <p:cSld name="Content with Caption">
     <p:spTree>
       <p:nvGrpSpPr>
@@ -6720,6 +5678,8 @@
         <a:xfrm>
           <a:off x="0" y="0"/>
           <a:ext cx="0" cy="0"/>
+          <a:chOff x="0" y="0"/>
+          <a:chExt cx="0" cy="0"/>
         </a:xfrm>
       </p:grpSpPr>
       <p:sp>
@@ -6768,7 +5728,9 @@
         <p:txBody>
           <a:bodyPr/>
           <a:lstStyle/>
-          <a:p/>
+          <a:p>
+            <a:endParaRPr/>
+          </a:p>
         </p:txBody>
       </p:sp>
       <p:sp>
@@ -6808,7 +5770,6 @@
               <a:rPr lang="en-US"/>
               <a:t>Click to edit Master title style</a:t>
             </a:r>
-            <a:endParaRPr lang="en-US"/>
           </a:p>
         </p:txBody>
       </p:sp>
@@ -6865,7 +5826,6 @@
               <a:rPr lang="en-US"/>
               <a:t>Fifth level</a:t>
             </a:r>
-            <a:endParaRPr lang="en-US"/>
           </a:p>
         </p:txBody>
       </p:sp>
@@ -6966,7 +5926,7 @@
           <a:p>
             <a:fld id="{92BEA474-078D-4E9B-9B14-09A87B19DC46}" type="datetime1">
               <a:rPr lang="en-US" smtClean="0"/>
-              <a:t>6/26/2024</a:t>
+              <a:t>5/16/2025</a:t>
             </a:fld>
             <a:endParaRPr lang="en-US"/>
           </a:p>
@@ -7046,12 +6006,11 @@
     <a:masterClrMapping/>
   </p:clrMapOvr>
   <p:transition/>
-  <p:timing/>
 </p:sldLayout>
 </file>
 
 <file path=ppt/slideLayouts/slideLayout9.xml><?xml version="1.0" encoding="utf-8"?>
-<p:sldLayout xmlns:a="http://schemas.openxmlformats.org/drawingml/2006/main" xmlns:r="http://schemas.openxmlformats.org/officeDocument/2006/relationships" xmlns:m="http://schemas.openxmlformats.org/officeDocument/2006/math" xmlns:w="http://schemas.openxmlformats.org/wordprocessingml/2006/main" xmlns:wp="http://schemas.openxmlformats.org/drawingml/2006/wordprocessingDrawing" xmlns:a14="http://schemas.microsoft.com/office/drawing/2010/main" xmlns:mc="http://schemas.openxmlformats.org/markup-compatibility/2006" xmlns:p14="http://schemas.microsoft.com/office/powerpoint/2010/main" xmlns:p15="http://schemas.microsoft.com/office/powerpoint/2012/main" xmlns:p159="http://schemas.microsoft.com/office/powerpoint/2015/09/main" xmlns:p="http://schemas.openxmlformats.org/presentationml/2006/main" showMasterSp="0" type="picTx" preserve="1">
+<p:sldLayout xmlns:a="http://schemas.openxmlformats.org/drawingml/2006/main" xmlns:r="http://schemas.openxmlformats.org/officeDocument/2006/relationships" xmlns:p="http://schemas.openxmlformats.org/presentationml/2006/main" showMasterSp="0" type="picTx" preserve="1">
   <p:cSld name="Picture with Caption">
     <p:spTree>
       <p:nvGrpSpPr>
@@ -7063,6 +6022,8 @@
         <a:xfrm>
           <a:off x="0" y="0"/>
           <a:ext cx="0" cy="0"/>
+          <a:chOff x="0" y="0"/>
+          <a:chExt cx="0" cy="0"/>
         </a:xfrm>
       </p:grpSpPr>
       <p:sp>
@@ -7111,7 +6072,9 @@
         <p:txBody>
           <a:bodyPr/>
           <a:lstStyle/>
-          <a:p/>
+          <a:p>
+            <a:endParaRPr/>
+          </a:p>
         </p:txBody>
       </p:sp>
       <p:sp>
@@ -7180,7 +6143,6 @@
               <a:rPr lang="en-US"/>
               <a:t>Click icon to add picture</a:t>
             </a:r>
-            <a:endParaRPr lang="en-US"/>
           </a:p>
         </p:txBody>
       </p:sp>
@@ -7218,7 +6180,6 @@
               <a:rPr lang="en-US"/>
               <a:t>Click to edit Master title style</a:t>
             </a:r>
-            <a:endParaRPr lang="en-US"/>
           </a:p>
         </p:txBody>
       </p:sp>
@@ -7320,7 +6281,7 @@
           <a:p>
             <a:fld id="{4907D986-8816-4272-A432-0437A28A9828}" type="datetime1">
               <a:rPr lang="en-US" smtClean="0"/>
-              <a:t>6/26/2024</a:t>
+              <a:t>5/16/2025</a:t>
             </a:fld>
             <a:endParaRPr lang="en-US"/>
           </a:p>
@@ -7385,12 +6346,11 @@
     <a:masterClrMapping/>
   </p:clrMapOvr>
   <p:transition/>
-  <p:timing/>
 </p:sldLayout>
 </file>
 
 <file path=ppt/slideMasters/slideMaster1.xml><?xml version="1.0" encoding="utf-8"?>
-<p:sldMaster xmlns:a="http://schemas.openxmlformats.org/drawingml/2006/main" xmlns:r="http://schemas.openxmlformats.org/officeDocument/2006/relationships" xmlns:m="http://schemas.openxmlformats.org/officeDocument/2006/math" xmlns:w="http://schemas.openxmlformats.org/wordprocessingml/2006/main" xmlns:wp="http://schemas.openxmlformats.org/drawingml/2006/wordprocessingDrawing" xmlns:a14="http://schemas.microsoft.com/office/drawing/2010/main" xmlns:mc="http://schemas.openxmlformats.org/markup-compatibility/2006" xmlns:p14="http://schemas.microsoft.com/office/powerpoint/2010/main" xmlns:p15="http://schemas.microsoft.com/office/powerpoint/2012/main" xmlns:p159="http://schemas.microsoft.com/office/powerpoint/2015/09/main" xmlns:p="http://schemas.openxmlformats.org/presentationml/2006/main">
+<p:sldMaster xmlns:a="http://schemas.openxmlformats.org/drawingml/2006/main" xmlns:r="http://schemas.openxmlformats.org/officeDocument/2006/relationships" xmlns:p="http://schemas.openxmlformats.org/presentationml/2006/main">
   <p:cSld>
     <p:bg>
       <p:bgRef idx="1001">
@@ -7407,6 +6367,8 @@
         <a:xfrm>
           <a:off x="0" y="0"/>
           <a:ext cx="0" cy="0"/>
+          <a:chOff x="0" y="0"/>
+          <a:chExt cx="0" cy="0"/>
         </a:xfrm>
       </p:grpSpPr>
       <p:sp>
@@ -7455,7 +6417,9 @@
         <p:txBody>
           <a:bodyPr/>
           <a:lstStyle/>
-          <a:p/>
+          <a:p>
+            <a:endParaRPr/>
+          </a:p>
         </p:txBody>
       </p:sp>
       <p:sp>
@@ -7487,7 +6451,6 @@
               <a:rPr lang="en-US"/>
               <a:t>Click to edit Master title style</a:t>
             </a:r>
-            <a:endParaRPr lang="en-US"/>
           </a:p>
         </p:txBody>
       </p:sp>
@@ -7549,7 +6512,6 @@
               <a:rPr lang="en-US"/>
               <a:t>Fifth level</a:t>
             </a:r>
-            <a:endParaRPr lang="en-US"/>
           </a:p>
         </p:txBody>
       </p:sp>
@@ -7586,7 +6548,7 @@
           <a:p>
             <a:fld id="{62D6E202-B606-4609-B914-27C9371A1F6D}" type="datetime1">
               <a:rPr lang="en-US" smtClean="0"/>
-              <a:t>6/26/2024</a:t>
+              <a:t>5/16/2025</a:t>
             </a:fld>
             <a:endParaRPr lang="en-US"/>
           </a:p>
@@ -7732,7 +6694,6 @@
     <p:sldLayoutId id="2147483671" r:id="rId11"/>
   </p:sldLayoutIdLst>
   <p:transition/>
-  <p:timing/>
   <p:txStyles>
     <p:titleStyle>
       <a:lvl1pPr algn="l" defTabSz="914400" rtl="0" eaLnBrk="1" latinLnBrk="0" hangingPunct="1">
@@ -7771,7 +6732,7 @@
           <a:schemeClr val="accent1"/>
         </a:buClr>
         <a:buSzTx/>
-        <a:buFont typeface="Calibri" panose="020f0502020204030204" pitchFamily="34" charset="0"/>
+        <a:buFont typeface="Calibri" panose="020F0502020204030204" pitchFamily="34" charset="0"/>
         <a:buChar char=" "/>
         <a:defRPr sz="1900" kern="1200">
           <a:solidFill>
@@ -7796,7 +6757,7 @@
           <a:spcPts val="400"/>
         </a:spcAft>
         <a:buClrTx/>
-        <a:buFont typeface="Calibri" panose="020f0502020204030204" pitchFamily="34" charset="0"/>
+        <a:buFont typeface="Calibri" panose="020F0502020204030204" pitchFamily="34" charset="0"/>
         <a:buChar char="◦"/>
         <a:defRPr sz="1700" kern="1200">
           <a:solidFill>
@@ -7821,7 +6782,7 @@
           <a:spcPts val="400"/>
         </a:spcAft>
         <a:buClrTx/>
-        <a:buFont typeface="Calibri" panose="020f0502020204030204" pitchFamily="34" charset="0"/>
+        <a:buFont typeface="Calibri" panose="020F0502020204030204" pitchFamily="34" charset="0"/>
         <a:buChar char="◦"/>
         <a:defRPr sz="1300" kern="1200">
           <a:solidFill>
@@ -7846,7 +6807,7 @@
           <a:spcPts val="400"/>
         </a:spcAft>
         <a:buClrTx/>
-        <a:buFont typeface="Calibri" panose="020f0502020204030204" pitchFamily="34" charset="0"/>
+        <a:buFont typeface="Calibri" panose="020F0502020204030204" pitchFamily="34" charset="0"/>
         <a:buChar char="◦"/>
         <a:defRPr sz="1300" kern="1200">
           <a:solidFill>
@@ -7871,7 +6832,7 @@
           <a:spcPts val="400"/>
         </a:spcAft>
         <a:buClrTx/>
-        <a:buFont typeface="Calibri" panose="020f0502020204030204" pitchFamily="34" charset="0"/>
+        <a:buFont typeface="Calibri" panose="020F0502020204030204" pitchFamily="34" charset="0"/>
         <a:buChar char="◦"/>
         <a:defRPr sz="1300" kern="1200">
           <a:solidFill>
@@ -7898,7 +6859,7 @@
         <a:buClr>
           <a:schemeClr val="accent1"/>
         </a:buClr>
-        <a:buFont typeface="Calibri" panose="020f0502020204030204" pitchFamily="34" charset="0"/>
+        <a:buFont typeface="Calibri" panose="020F0502020204030204" pitchFamily="34" charset="0"/>
         <a:buChar char="◦"/>
         <a:defRPr sz="1400" kern="1200">
           <a:solidFill>
@@ -7925,7 +6886,7 @@
         <a:buClr>
           <a:schemeClr val="accent1"/>
         </a:buClr>
-        <a:buFont typeface="Calibri" panose="020f0502020204030204" pitchFamily="34" charset="0"/>
+        <a:buFont typeface="Calibri" panose="020F0502020204030204" pitchFamily="34" charset="0"/>
         <a:buChar char="◦"/>
         <a:defRPr sz="1400" kern="1200">
           <a:solidFill>
@@ -7952,7 +6913,7 @@
         <a:buClr>
           <a:schemeClr val="accent1"/>
         </a:buClr>
-        <a:buFont typeface="Calibri" panose="020f0502020204030204" pitchFamily="34" charset="0"/>
+        <a:buFont typeface="Calibri" panose="020F0502020204030204" pitchFamily="34" charset="0"/>
         <a:buChar char="◦"/>
         <a:defRPr sz="1400" kern="1200">
           <a:solidFill>
@@ -7979,7 +6940,7 @@
         <a:buClr>
           <a:schemeClr val="accent1"/>
         </a:buClr>
-        <a:buFont typeface="Calibri" panose="020f0502020204030204" pitchFamily="34" charset="0"/>
+        <a:buFont typeface="Calibri" panose="020F0502020204030204" pitchFamily="34" charset="0"/>
         <a:buChar char="◦"/>
         <a:defRPr sz="1400" kern="1200">
           <a:solidFill>
@@ -8094,8 +7055,8 @@
 </file>
 
 <file path=ppt/slides/slide1.xml><?xml version="1.0" encoding="utf-8"?>
-<p:sld xmlns:a="http://schemas.openxmlformats.org/drawingml/2006/main" xmlns:r="http://schemas.openxmlformats.org/officeDocument/2006/relationships" xmlns:m="http://schemas.openxmlformats.org/officeDocument/2006/math" xmlns:w="http://schemas.openxmlformats.org/wordprocessingml/2006/main" xmlns:wp="http://schemas.openxmlformats.org/drawingml/2006/wordprocessingDrawing" xmlns:a14="http://schemas.microsoft.com/office/drawing/2010/main" xmlns:mc="http://schemas.openxmlformats.org/markup-compatibility/2006" xmlns:p14="http://schemas.microsoft.com/office/powerpoint/2010/main" xmlns:p15="http://schemas.microsoft.com/office/powerpoint/2012/main" xmlns:p159="http://schemas.microsoft.com/office/powerpoint/2015/09/main" xmlns:p="http://schemas.openxmlformats.org/presentationml/2006/main">
-  <p:cSld name="">
+<p:sld xmlns:a="http://schemas.openxmlformats.org/drawingml/2006/main" xmlns:r="http://schemas.openxmlformats.org/officeDocument/2006/relationships" xmlns:p="http://schemas.openxmlformats.org/presentationml/2006/main">
+  <p:cSld>
     <p:bg>
       <p:bgPr>
         <a:solidFill>
@@ -8114,6 +7075,8 @@
         <a:xfrm>
           <a:off x="0" y="0"/>
           <a:ext cx="0" cy="0"/>
+          <a:chOff x="0" y="0"/>
+          <a:chExt cx="0" cy="0"/>
         </a:xfrm>
       </p:grpSpPr>
       <p:sp useBgFill="1">
@@ -8412,8 +7375,8 @@
 </file>
 
 <file path=ppt/slides/slide10.xml><?xml version="1.0" encoding="utf-8"?>
-<p:sld xmlns:a="http://schemas.openxmlformats.org/drawingml/2006/main" xmlns:r="http://schemas.openxmlformats.org/officeDocument/2006/relationships" xmlns:m="http://schemas.openxmlformats.org/officeDocument/2006/math" xmlns:w="http://schemas.openxmlformats.org/wordprocessingml/2006/main" xmlns:wp="http://schemas.openxmlformats.org/drawingml/2006/wordprocessingDrawing" xmlns:a14="http://schemas.microsoft.com/office/drawing/2010/main" xmlns:mc="http://schemas.openxmlformats.org/markup-compatibility/2006" xmlns:p14="http://schemas.microsoft.com/office/powerpoint/2010/main" xmlns:p15="http://schemas.microsoft.com/office/powerpoint/2012/main" xmlns:p159="http://schemas.microsoft.com/office/powerpoint/2015/09/main" xmlns:p="http://schemas.openxmlformats.org/presentationml/2006/main">
-  <p:cSld name="">
+<p:sld xmlns:a="http://schemas.openxmlformats.org/drawingml/2006/main" xmlns:r="http://schemas.openxmlformats.org/officeDocument/2006/relationships" xmlns:p="http://schemas.openxmlformats.org/presentationml/2006/main">
+  <p:cSld>
     <p:bg>
       <p:bgPr>
         <a:solidFill>
@@ -8432,6 +7395,8 @@
         <a:xfrm>
           <a:off x="0" y="0"/>
           <a:ext cx="0" cy="0"/>
+          <a:chOff x="0" y="0"/>
+          <a:chExt cx="0" cy="0"/>
         </a:xfrm>
       </p:grpSpPr>
       <p:sp>
@@ -8971,13 +7936,12 @@
     <a:overrideClrMapping bg1="dk1" tx1="lt1" bg2="dk2" tx2="lt2" accent1="accent1" accent2="accent2" accent3="accent3" accent4="accent4" accent5="accent5" accent6="accent6" hlink="hlink" folHlink="folHlink"/>
   </p:clrMapOvr>
   <p:transition/>
-  <p:timing/>
 </p:sld>
 </file>
 
 <file path=ppt/slides/slide11.xml><?xml version="1.0" encoding="utf-8"?>
-<p:sld xmlns:a="http://schemas.openxmlformats.org/drawingml/2006/main" xmlns:r="http://schemas.openxmlformats.org/officeDocument/2006/relationships" xmlns:m="http://schemas.openxmlformats.org/officeDocument/2006/math" xmlns:w="http://schemas.openxmlformats.org/wordprocessingml/2006/main" xmlns:wp="http://schemas.openxmlformats.org/drawingml/2006/wordprocessingDrawing" xmlns:a14="http://schemas.microsoft.com/office/drawing/2010/main" xmlns:mc="http://schemas.openxmlformats.org/markup-compatibility/2006" xmlns:p14="http://schemas.microsoft.com/office/powerpoint/2010/main" xmlns:p15="http://schemas.microsoft.com/office/powerpoint/2012/main" xmlns:p159="http://schemas.microsoft.com/office/powerpoint/2015/09/main" xmlns:p="http://schemas.openxmlformats.org/presentationml/2006/main">
-  <p:cSld name="">
+<p:sld xmlns:a="http://schemas.openxmlformats.org/drawingml/2006/main" xmlns:r="http://schemas.openxmlformats.org/officeDocument/2006/relationships" xmlns:p="http://schemas.openxmlformats.org/presentationml/2006/main">
+  <p:cSld>
     <p:bg>
       <p:bgPr>
         <a:solidFill>
@@ -8996,6 +7960,8 @@
         <a:xfrm>
           <a:off x="0" y="0"/>
           <a:ext cx="0" cy="0"/>
+          <a:chOff x="0" y="0"/>
+          <a:chExt cx="0" cy="0"/>
         </a:xfrm>
       </p:grpSpPr>
       <p:sp useBgFill="1">
@@ -9181,13 +8147,13 @@
         </p:nvSpPr>
         <p:spPr>
           <a:xfrm>
-            <a:off x="5231958" y="605896"/>
-            <a:ext cx="5923721" cy="5646208"/>
+            <a:off x="5231958" y="605895"/>
+            <a:ext cx="5923721" cy="5804235"/>
           </a:xfrm>
         </p:spPr>
         <p:txBody>
           <a:bodyPr anchor="ctr">
-            <a:normAutofit fontScale="95000" lnSpcReduction="20000"/>
+            <a:normAutofit fontScale="95000"/>
           </a:bodyPr>
           <a:lstStyle/>
           <a:p>
@@ -9197,7 +8163,7 @@
               </a:lnSpc>
             </a:pPr>
             <a:r>
-              <a:rPr lang="id-ID" sz="1700" b="0" i="0" strike="noStrike" cap="none" baseline="0">
+              <a:rPr lang="id-ID" sz="1700" b="0" i="0" strike="noStrike" cap="none" baseline="0" dirty="0">
                 <a:solidFill>
                   <a:srgbClr val="404040"/>
                 </a:solidFill>
@@ -9216,7 +8182,7 @@
               </a:lnSpc>
             </a:pPr>
             <a:r>
-              <a:rPr lang="id-ID" sz="1700" b="0" i="0" strike="noStrike" cap="none" baseline="0">
+              <a:rPr lang="id-ID" sz="1700" b="0" i="0" strike="noStrike" cap="none" baseline="0" dirty="0">
                 <a:solidFill>
                   <a:srgbClr val="404040"/>
                 </a:solidFill>
@@ -9235,7 +8201,7 @@
               </a:lnSpc>
             </a:pPr>
             <a:r>
-              <a:rPr lang="id-ID" sz="1700" b="0" i="0" strike="noStrike" cap="none" baseline="0">
+              <a:rPr lang="id-ID" sz="1700" b="0" i="0" strike="noStrike" cap="none" baseline="0" dirty="0">
                 <a:solidFill>
                   <a:srgbClr val="404040"/>
                 </a:solidFill>
@@ -9254,7 +8220,7 @@
               </a:lnSpc>
             </a:pPr>
             <a:r>
-              <a:rPr lang="id-ID" sz="1700" b="0" i="0" strike="noStrike" cap="none" baseline="0">
+              <a:rPr lang="id-ID" sz="1700" b="0" i="0" strike="noStrike" cap="none" baseline="0" dirty="0">
                 <a:solidFill>
                   <a:srgbClr val="404040"/>
                 </a:solidFill>
@@ -9273,7 +8239,7 @@
               </a:lnSpc>
             </a:pPr>
             <a:r>
-              <a:rPr lang="id-ID" sz="1700" b="0" i="0" strike="noStrike" cap="none" baseline="0">
+              <a:rPr lang="id-ID" sz="1700" b="0" i="0" strike="noStrike" cap="none" baseline="0" dirty="0">
                 <a:solidFill>
                   <a:srgbClr val="404040"/>
                 </a:solidFill>
@@ -9292,7 +8258,7 @@
               </a:lnSpc>
             </a:pPr>
             <a:r>
-              <a:rPr lang="id-ID" sz="1700" b="0" i="0" strike="noStrike" cap="none" baseline="0">
+              <a:rPr lang="id-ID" sz="1700" b="0" i="0" strike="noStrike" cap="none" baseline="0" dirty="0">
                 <a:solidFill>
                   <a:srgbClr val="404040"/>
                 </a:solidFill>
@@ -9311,7 +8277,7 @@
               </a:lnSpc>
             </a:pPr>
             <a:r>
-              <a:rPr lang="id-ID" sz="1700" b="0" i="0" strike="noStrike" cap="none" baseline="0">
+              <a:rPr lang="id-ID" sz="1700" b="0" i="0" strike="noStrike" cap="none" baseline="0" dirty="0">
                 <a:solidFill>
                   <a:srgbClr val="404040"/>
                 </a:solidFill>
@@ -9330,7 +8296,7 @@
               </a:lnSpc>
             </a:pPr>
             <a:r>
-              <a:rPr lang="id-ID" sz="1700" b="0" i="0" strike="noStrike" cap="none" baseline="0">
+              <a:rPr lang="id-ID" sz="1700" b="0" i="0" strike="noStrike" cap="none" baseline="0" dirty="0">
                 <a:solidFill>
                   <a:srgbClr val="404040"/>
                 </a:solidFill>
@@ -9349,7 +8315,7 @@
               </a:lnSpc>
             </a:pPr>
             <a:r>
-              <a:rPr lang="id-ID" sz="1700" b="0" i="0" strike="noStrike" cap="none" baseline="0">
+              <a:rPr lang="id-ID" sz="1700" b="0" i="0" strike="noStrike" cap="none" baseline="0" dirty="0">
                 <a:solidFill>
                   <a:srgbClr val="404040"/>
                 </a:solidFill>
@@ -9368,7 +8334,7 @@
               </a:lnSpc>
             </a:pPr>
             <a:r>
-              <a:rPr lang="id-ID" sz="1700" b="0" i="0" strike="noStrike" cap="none" baseline="0">
+              <a:rPr lang="id-ID" sz="1700" b="0" i="0" strike="noStrike" cap="none" baseline="0" dirty="0">
                 <a:solidFill>
                   <a:srgbClr val="404040"/>
                 </a:solidFill>
@@ -9387,7 +8353,7 @@
               </a:lnSpc>
             </a:pPr>
             <a:r>
-              <a:rPr lang="id-ID" sz="1700" b="0" i="0" strike="noStrike" cap="none" baseline="0">
+              <a:rPr lang="id-ID" sz="1700" b="0" i="0" strike="noStrike" cap="none" baseline="0" dirty="0">
                 <a:solidFill>
                   <a:srgbClr val="404040"/>
                 </a:solidFill>
@@ -9406,7 +8372,7 @@
               </a:lnSpc>
             </a:pPr>
             <a:r>
-              <a:rPr lang="id-ID" sz="1700" b="0" i="0" strike="noStrike" cap="none" baseline="0">
+              <a:rPr lang="id-ID" sz="1700" b="0" i="0" strike="noStrike" cap="none" baseline="0" dirty="0">
                 <a:solidFill>
                   <a:srgbClr val="404040"/>
                 </a:solidFill>
@@ -9431,13 +8397,12 @@
     <a:masterClrMapping/>
   </p:clrMapOvr>
   <p:transition/>
-  <p:timing/>
 </p:sld>
 </file>
 
 <file path=ppt/slides/slide12.xml><?xml version="1.0" encoding="utf-8"?>
-<p:sld xmlns:a="http://schemas.openxmlformats.org/drawingml/2006/main" xmlns:r="http://schemas.openxmlformats.org/officeDocument/2006/relationships" xmlns:m="http://schemas.openxmlformats.org/officeDocument/2006/math" xmlns:w="http://schemas.openxmlformats.org/wordprocessingml/2006/main" xmlns:wp="http://schemas.openxmlformats.org/drawingml/2006/wordprocessingDrawing" xmlns:a14="http://schemas.microsoft.com/office/drawing/2010/main" xmlns:mc="http://schemas.openxmlformats.org/markup-compatibility/2006" xmlns:p14="http://schemas.microsoft.com/office/powerpoint/2010/main" xmlns:p15="http://schemas.microsoft.com/office/powerpoint/2012/main" xmlns:p159="http://schemas.microsoft.com/office/powerpoint/2015/09/main" xmlns:p="http://schemas.openxmlformats.org/presentationml/2006/main">
-  <p:cSld name="">
+<p:sld xmlns:a="http://schemas.openxmlformats.org/drawingml/2006/main" xmlns:r="http://schemas.openxmlformats.org/officeDocument/2006/relationships" xmlns:p="http://schemas.openxmlformats.org/presentationml/2006/main">
+  <p:cSld>
     <p:bg>
       <p:bgPr>
         <a:solidFill>
@@ -9456,6 +8421,8 @@
         <a:xfrm>
           <a:off x="0" y="0"/>
           <a:ext cx="0" cy="0"/>
+          <a:chOff x="0" y="0"/>
+          <a:chExt cx="0" cy="0"/>
         </a:xfrm>
       </p:grpSpPr>
       <p:sp>
@@ -9862,13 +8829,12 @@
     <a:masterClrMapping/>
   </p:clrMapOvr>
   <p:transition/>
-  <p:timing/>
 </p:sld>
 </file>
 
 <file path=ppt/slides/slide13.xml><?xml version="1.0" encoding="utf-8"?>
-<p:sld xmlns:a="http://schemas.openxmlformats.org/drawingml/2006/main" xmlns:r="http://schemas.openxmlformats.org/officeDocument/2006/relationships" xmlns:m="http://schemas.openxmlformats.org/officeDocument/2006/math" xmlns:w="http://schemas.openxmlformats.org/wordprocessingml/2006/main" xmlns:wp="http://schemas.openxmlformats.org/drawingml/2006/wordprocessingDrawing" xmlns:a14="http://schemas.microsoft.com/office/drawing/2010/main" xmlns:mc="http://schemas.openxmlformats.org/markup-compatibility/2006" xmlns:p14="http://schemas.microsoft.com/office/powerpoint/2010/main" xmlns:p15="http://schemas.microsoft.com/office/powerpoint/2012/main" xmlns:p159="http://schemas.microsoft.com/office/powerpoint/2015/09/main" xmlns:p="http://schemas.openxmlformats.org/presentationml/2006/main">
-  <p:cSld name="">
+<p:sld xmlns:a="http://schemas.openxmlformats.org/drawingml/2006/main" xmlns:r="http://schemas.openxmlformats.org/officeDocument/2006/relationships" xmlns:p="http://schemas.openxmlformats.org/presentationml/2006/main">
+  <p:cSld>
     <p:bg>
       <p:bgPr>
         <a:solidFill>
@@ -9887,6 +8853,8 @@
         <a:xfrm>
           <a:off x="0" y="0"/>
           <a:ext cx="0" cy="0"/>
+          <a:chOff x="0" y="0"/>
+          <a:chExt cx="0" cy="0"/>
         </a:xfrm>
       </p:grpSpPr>
       <p:sp useBgFill="1">
@@ -10040,7 +9008,7 @@
           <a:lstStyle/>
           <a:p>
             <a:r>
-              <a:rPr lang="id-ID" sz="4400" b="0" i="0" strike="noStrike" cap="none" baseline="0">
+              <a:rPr lang="id-ID" sz="4400" b="0" i="0" strike="noStrike" cap="none" baseline="0" dirty="0">
                 <a:solidFill>
                   <a:srgbClr val="FFFFFF"/>
                 </a:solidFill>
@@ -10083,7 +9051,7 @@
           <a:lstStyle/>
           <a:p>
             <a:r>
-              <a:rPr lang="id-ID" sz="2400" b="0" i="0" strike="noStrike" cap="none" baseline="0">
+              <a:rPr lang="id-ID" sz="2400" b="0" i="0" strike="noStrike" cap="none" baseline="0" dirty="0">
                 <a:solidFill>
                   <a:srgbClr val="404040"/>
                 </a:solidFill>
@@ -10097,7 +9065,7 @@
           </a:p>
           <a:p>
             <a:r>
-              <a:rPr lang="id-ID" sz="2400" b="0" i="0" strike="noStrike" cap="none" baseline="0">
+              <a:rPr lang="id-ID" sz="2400" b="0" i="0" strike="noStrike" cap="none" baseline="0" dirty="0">
                 <a:solidFill>
                   <a:srgbClr val="404040"/>
                 </a:solidFill>
@@ -10111,7 +9079,7 @@
           </a:p>
           <a:p>
             <a:r>
-              <a:rPr lang="id-ID" sz="2400" b="0" i="0" strike="noStrike" cap="none" baseline="0">
+              <a:rPr lang="id-ID" sz="2400" b="0" i="0" strike="noStrike" cap="none" baseline="0" dirty="0">
                 <a:solidFill>
                   <a:srgbClr val="404040"/>
                 </a:solidFill>
@@ -10125,7 +9093,7 @@
           </a:p>
           <a:p>
             <a:r>
-              <a:rPr lang="id-ID" sz="2400" b="0" i="0" strike="noStrike" cap="none" baseline="0">
+              <a:rPr lang="id-ID" sz="2400" b="0" i="0" strike="noStrike" cap="none" baseline="0" dirty="0">
                 <a:solidFill>
                   <a:srgbClr val="404040"/>
                 </a:solidFill>
@@ -10139,7 +9107,7 @@
           </a:p>
           <a:p>
             <a:r>
-              <a:rPr lang="id-ID" sz="2400" b="0" i="0" strike="noStrike" cap="none" baseline="0">
+              <a:rPr lang="id-ID" sz="2400" b="0" i="0" strike="noStrike" cap="none" baseline="0" dirty="0">
                 <a:solidFill>
                   <a:srgbClr val="404040"/>
                 </a:solidFill>
@@ -10164,13 +9132,12 @@
     <a:masterClrMapping/>
   </p:clrMapOvr>
   <p:transition/>
-  <p:timing/>
 </p:sld>
 </file>
 
 <file path=ppt/slides/slide14.xml><?xml version="1.0" encoding="utf-8"?>
-<p:sld xmlns:a="http://schemas.openxmlformats.org/drawingml/2006/main" xmlns:r="http://schemas.openxmlformats.org/officeDocument/2006/relationships" xmlns:m="http://schemas.openxmlformats.org/officeDocument/2006/math" xmlns:w="http://schemas.openxmlformats.org/wordprocessingml/2006/main" xmlns:wp="http://schemas.openxmlformats.org/drawingml/2006/wordprocessingDrawing" xmlns:a14="http://schemas.microsoft.com/office/drawing/2010/main" xmlns:mc="http://schemas.openxmlformats.org/markup-compatibility/2006" xmlns:p14="http://schemas.microsoft.com/office/powerpoint/2010/main" xmlns:p15="http://schemas.microsoft.com/office/powerpoint/2012/main" xmlns:p159="http://schemas.microsoft.com/office/powerpoint/2015/09/main" xmlns:p="http://schemas.openxmlformats.org/presentationml/2006/main">
-  <p:cSld name="">
+<p:sld xmlns:a="http://schemas.openxmlformats.org/drawingml/2006/main" xmlns:r="http://schemas.openxmlformats.org/officeDocument/2006/relationships" xmlns:p="http://schemas.openxmlformats.org/presentationml/2006/main">
+  <p:cSld>
     <p:bg>
       <p:bgPr>
         <a:solidFill>
@@ -10189,6 +9156,8 @@
         <a:xfrm>
           <a:off x="0" y="0"/>
           <a:ext cx="0" cy="0"/>
+          <a:chOff x="0" y="0"/>
+          <a:chExt cx="0" cy="0"/>
         </a:xfrm>
       </p:grpSpPr>
       <p:sp useBgFill="1">
@@ -10342,7 +9311,7 @@
           <a:lstStyle/>
           <a:p>
             <a:r>
-              <a:rPr lang="id-ID" sz="3700" b="0" i="0" strike="noStrike" cap="none" baseline="0">
+              <a:rPr lang="id-ID" sz="3700" b="0" i="0" strike="noStrike" cap="none" baseline="0" dirty="0">
                 <a:solidFill>
                   <a:srgbClr val="FFFFFF"/>
                 </a:solidFill>
@@ -10374,13 +9343,13 @@
         </p:nvSpPr>
         <p:spPr>
           <a:xfrm>
-            <a:off x="5231958" y="605896"/>
-            <a:ext cx="5923721" cy="5646208"/>
+            <a:off x="5231958" y="605895"/>
+            <a:ext cx="5923721" cy="6000177"/>
           </a:xfrm>
         </p:spPr>
         <p:txBody>
           <a:bodyPr anchor="ctr">
-            <a:normAutofit fontScale="95000" lnSpcReduction="20000"/>
+            <a:normAutofit fontScale="95000"/>
           </a:bodyPr>
           <a:lstStyle/>
           <a:p>
@@ -10390,7 +9359,7 @@
               </a:lnSpc>
             </a:pPr>
             <a:r>
-              <a:rPr lang="id-ID" sz="1900" b="0" i="0" strike="noStrike" cap="none" baseline="0">
+              <a:rPr lang="id-ID" sz="1900" b="0" i="0" strike="noStrike" cap="none" baseline="0" dirty="0">
                 <a:solidFill>
                   <a:srgbClr val="404040"/>
                 </a:solidFill>
@@ -10409,7 +9378,7 @@
               </a:lnSpc>
             </a:pPr>
             <a:r>
-              <a:rPr lang="id-ID" sz="1900" b="0" i="0" strike="noStrike" cap="none" baseline="0">
+              <a:rPr lang="id-ID" sz="1900" b="0" i="0" strike="noStrike" cap="none" baseline="0" dirty="0">
                 <a:solidFill>
                   <a:srgbClr val="404040"/>
                 </a:solidFill>
@@ -10428,7 +9397,7 @@
               </a:lnSpc>
             </a:pPr>
             <a:r>
-              <a:rPr lang="id-ID" sz="1900" b="0" i="0" strike="noStrike" cap="none" baseline="0">
+              <a:rPr lang="id-ID" sz="1900" b="0" i="0" strike="noStrike" cap="none" baseline="0" dirty="0">
                 <a:solidFill>
                   <a:srgbClr val="404040"/>
                 </a:solidFill>
@@ -10447,7 +9416,7 @@
               </a:lnSpc>
             </a:pPr>
             <a:r>
-              <a:rPr lang="id-ID" sz="1900" b="0" i="0" strike="noStrike" cap="none" baseline="0">
+              <a:rPr lang="id-ID" sz="1900" b="0" i="0" strike="noStrike" cap="none" baseline="0" dirty="0">
                 <a:solidFill>
                   <a:srgbClr val="404040"/>
                 </a:solidFill>
@@ -10466,7 +9435,7 @@
               </a:lnSpc>
             </a:pPr>
             <a:r>
-              <a:rPr lang="id-ID" sz="1900" b="0" i="0" strike="noStrike" cap="none" baseline="0">
+              <a:rPr lang="id-ID" sz="1900" b="0" i="0" strike="noStrike" cap="none" baseline="0" dirty="0">
                 <a:solidFill>
                   <a:srgbClr val="404040"/>
                 </a:solidFill>
@@ -10485,7 +9454,7 @@
               </a:lnSpc>
             </a:pPr>
             <a:r>
-              <a:rPr lang="id-ID" sz="1900" b="0" i="0" strike="noStrike" cap="none" baseline="0">
+              <a:rPr lang="id-ID" sz="1900" b="0" i="0" strike="noStrike" cap="none" baseline="0" dirty="0">
                 <a:solidFill>
                   <a:srgbClr val="404040"/>
                 </a:solidFill>
@@ -10504,7 +9473,7 @@
               </a:lnSpc>
             </a:pPr>
             <a:r>
-              <a:rPr lang="id-ID" sz="1900" b="0" i="0" strike="noStrike" cap="none" baseline="0">
+              <a:rPr lang="id-ID" sz="1900" b="0" i="0" strike="noStrike" cap="none" baseline="0" dirty="0">
                 <a:solidFill>
                   <a:srgbClr val="404040"/>
                 </a:solidFill>
@@ -10523,7 +9492,7 @@
               </a:lnSpc>
             </a:pPr>
             <a:r>
-              <a:rPr lang="id-ID" sz="1900" b="0" i="0" strike="noStrike" cap="none" baseline="0">
+              <a:rPr lang="id-ID" sz="1900" b="0" i="0" strike="noStrike" cap="none" baseline="0" dirty="0">
                 <a:solidFill>
                   <a:srgbClr val="404040"/>
                 </a:solidFill>
@@ -10542,7 +9511,7 @@
               </a:lnSpc>
             </a:pPr>
             <a:r>
-              <a:rPr lang="id-ID" sz="1900" b="0" i="0" strike="noStrike" cap="none" baseline="0">
+              <a:rPr lang="id-ID" sz="1900" b="0" i="0" strike="noStrike" cap="none" baseline="0" dirty="0">
                 <a:solidFill>
                   <a:srgbClr val="404040"/>
                 </a:solidFill>
@@ -10561,7 +9530,7 @@
               </a:lnSpc>
             </a:pPr>
             <a:r>
-              <a:rPr lang="id-ID" sz="1900" b="0" i="0" strike="noStrike" cap="none" baseline="0">
+              <a:rPr lang="id-ID" sz="1900" b="0" i="0" strike="noStrike" cap="none" baseline="0" dirty="0">
                 <a:solidFill>
                   <a:srgbClr val="404040"/>
                 </a:solidFill>
@@ -10586,13 +9555,12 @@
     <a:masterClrMapping/>
   </p:clrMapOvr>
   <p:transition/>
-  <p:timing/>
 </p:sld>
 </file>
 
 <file path=ppt/slides/slide2.xml><?xml version="1.0" encoding="utf-8"?>
-<p:sld xmlns:a="http://schemas.openxmlformats.org/drawingml/2006/main" xmlns:r="http://schemas.openxmlformats.org/officeDocument/2006/relationships" xmlns:m="http://schemas.openxmlformats.org/officeDocument/2006/math" xmlns:w="http://schemas.openxmlformats.org/wordprocessingml/2006/main" xmlns:wp="http://schemas.openxmlformats.org/drawingml/2006/wordprocessingDrawing" xmlns:a14="http://schemas.microsoft.com/office/drawing/2010/main" xmlns:mc="http://schemas.openxmlformats.org/markup-compatibility/2006" xmlns:p14="http://schemas.microsoft.com/office/powerpoint/2010/main" xmlns:p15="http://schemas.microsoft.com/office/powerpoint/2012/main" xmlns:p159="http://schemas.microsoft.com/office/powerpoint/2015/09/main" xmlns:p="http://schemas.openxmlformats.org/presentationml/2006/main">
-  <p:cSld name="">
+<p:sld xmlns:a="http://schemas.openxmlformats.org/drawingml/2006/main" xmlns:r="http://schemas.openxmlformats.org/officeDocument/2006/relationships" xmlns:p="http://schemas.openxmlformats.org/presentationml/2006/main">
+  <p:cSld>
     <p:bg>
       <p:bgPr>
         <a:solidFill>
@@ -10615,6 +9583,8 @@
         <a:xfrm>
           <a:off x="0" y="0"/>
           <a:ext cx="0" cy="0"/>
+          <a:chOff x="0" y="0"/>
+          <a:chExt cx="0" cy="0"/>
         </a:xfrm>
       </p:grpSpPr>
       <p:sp>
@@ -11066,13 +10036,12 @@
     <a:masterClrMapping/>
   </p:clrMapOvr>
   <p:transition/>
-  <p:timing/>
 </p:sld>
 </file>
 
 <file path=ppt/slides/slide3.xml><?xml version="1.0" encoding="utf-8"?>
-<p:sld xmlns:a="http://schemas.openxmlformats.org/drawingml/2006/main" xmlns:r="http://schemas.openxmlformats.org/officeDocument/2006/relationships" xmlns:m="http://schemas.openxmlformats.org/officeDocument/2006/math" xmlns:w="http://schemas.openxmlformats.org/wordprocessingml/2006/main" xmlns:wp="http://schemas.openxmlformats.org/drawingml/2006/wordprocessingDrawing" xmlns:a14="http://schemas.microsoft.com/office/drawing/2010/main" xmlns:mc="http://schemas.openxmlformats.org/markup-compatibility/2006" xmlns:p14="http://schemas.microsoft.com/office/powerpoint/2010/main" xmlns:p15="http://schemas.microsoft.com/office/powerpoint/2012/main" xmlns:p159="http://schemas.microsoft.com/office/powerpoint/2015/09/main" xmlns:p="http://schemas.openxmlformats.org/presentationml/2006/main">
-  <p:cSld name="">
+<p:sld xmlns:a="http://schemas.openxmlformats.org/drawingml/2006/main" xmlns:r="http://schemas.openxmlformats.org/officeDocument/2006/relationships" xmlns:p="http://schemas.openxmlformats.org/presentationml/2006/main">
+  <p:cSld>
     <p:bg>
       <p:bgPr>
         <a:solidFill>
@@ -11091,6 +10060,8 @@
         <a:xfrm>
           <a:off x="0" y="0"/>
           <a:ext cx="0" cy="0"/>
+          <a:chOff x="0" y="0"/>
+          <a:chExt cx="0" cy="0"/>
         </a:xfrm>
       </p:grpSpPr>
       <p:sp>
@@ -11386,12 +10357,12 @@
         <p:spPr>
           <a:xfrm>
             <a:off x="643467" y="2546224"/>
-            <a:ext cx="3448259" cy="3342747"/>
+            <a:ext cx="3919202" cy="3342747"/>
           </a:xfrm>
         </p:spPr>
         <p:txBody>
           <a:bodyPr vert="horz" lIns="0" tIns="45720" rIns="0" bIns="45720" rtlCol="0">
-            <a:normAutofit lnSpcReduction="20000"/>
+            <a:normAutofit/>
           </a:bodyPr>
           <a:lstStyle/>
           <a:p>
@@ -11401,7 +10372,7 @@
               </a:lnSpc>
             </a:pPr>
             <a:r>
-              <a:rPr lang="id-ID" sz="1500" b="0" i="0" strike="noStrike" cap="none" baseline="0">
+              <a:rPr lang="id-ID" sz="1500" b="0" i="0" strike="noStrike" cap="none" spc="-30" dirty="0">
                 <a:solidFill>
                   <a:srgbClr val="FFFFFF"/>
                 </a:solidFill>
@@ -11420,7 +10391,7 @@
               </a:lnSpc>
             </a:pPr>
             <a:r>
-              <a:rPr lang="id-ID" sz="1500" b="0" i="0" strike="noStrike" cap="none" baseline="0">
+              <a:rPr lang="id-ID" sz="1500" b="0" i="0" strike="noStrike" cap="none" spc="-30" dirty="0">
                 <a:solidFill>
                   <a:srgbClr val="FFFFFF"/>
                 </a:solidFill>
@@ -11439,7 +10410,7 @@
               </a:lnSpc>
             </a:pPr>
             <a:r>
-              <a:rPr lang="id-ID" sz="1500" b="0" i="0" strike="noStrike" cap="none" baseline="0">
+              <a:rPr lang="id-ID" sz="1500" b="0" i="0" strike="noStrike" cap="none" spc="-30" dirty="0">
                 <a:solidFill>
                   <a:srgbClr val="FFFFFF"/>
                 </a:solidFill>
@@ -11458,7 +10429,7 @@
               </a:lnSpc>
             </a:pPr>
             <a:r>
-              <a:rPr lang="id-ID" sz="1500" b="0" i="0" strike="noStrike" cap="none" baseline="0">
+              <a:rPr lang="id-ID" sz="1500" b="0" i="0" strike="noStrike" cap="none" spc="-30" dirty="0">
                 <a:solidFill>
                   <a:srgbClr val="FFFFFF"/>
                 </a:solidFill>
@@ -11477,7 +10448,7 @@
               </a:lnSpc>
             </a:pPr>
             <a:r>
-              <a:rPr lang="id-ID" sz="1500" b="0" i="0" strike="noStrike" cap="none" baseline="0">
+              <a:rPr lang="id-ID" sz="1500" b="0" i="0" strike="noStrike" cap="none" spc="-30" dirty="0">
                 <a:solidFill>
                   <a:srgbClr val="FFFFFF"/>
                 </a:solidFill>
@@ -11496,7 +10467,7 @@
               </a:lnSpc>
             </a:pPr>
             <a:r>
-              <a:rPr lang="id-ID" sz="1500" b="0" i="0" strike="noStrike" cap="none" baseline="0">
+              <a:rPr lang="id-ID" sz="1500" b="0" i="0" strike="noStrike" cap="none" spc="-30" dirty="0">
                 <a:solidFill>
                   <a:srgbClr val="FFFFFF"/>
                 </a:solidFill>
@@ -11515,7 +10486,7 @@
               </a:lnSpc>
             </a:pPr>
             <a:r>
-              <a:rPr lang="id-ID" sz="1500" b="0" i="0" strike="noStrike" cap="none" baseline="0">
+              <a:rPr lang="id-ID" sz="1500" b="0" i="0" strike="noStrike" cap="none" spc="-30" dirty="0">
                 <a:solidFill>
                   <a:srgbClr val="FFFFFF"/>
                 </a:solidFill>
@@ -11573,13 +10544,12 @@
     <a:overrideClrMapping bg1="dk1" tx1="lt1" bg2="dk2" tx2="lt2" accent1="accent1" accent2="accent2" accent3="accent3" accent4="accent4" accent5="accent5" accent6="accent6" hlink="hlink" folHlink="folHlink"/>
   </p:clrMapOvr>
   <p:transition/>
-  <p:timing/>
 </p:sld>
 </file>
 
 <file path=ppt/slides/slide4.xml><?xml version="1.0" encoding="utf-8"?>
-<p:sld xmlns:a="http://schemas.openxmlformats.org/drawingml/2006/main" xmlns:r="http://schemas.openxmlformats.org/officeDocument/2006/relationships" xmlns:m="http://schemas.openxmlformats.org/officeDocument/2006/math" xmlns:w="http://schemas.openxmlformats.org/wordprocessingml/2006/main" xmlns:wp="http://schemas.openxmlformats.org/drawingml/2006/wordprocessingDrawing" xmlns:a14="http://schemas.microsoft.com/office/drawing/2010/main" xmlns:mc="http://schemas.openxmlformats.org/markup-compatibility/2006" xmlns:p14="http://schemas.microsoft.com/office/powerpoint/2010/main" xmlns:p15="http://schemas.microsoft.com/office/powerpoint/2012/main" xmlns:p159="http://schemas.microsoft.com/office/powerpoint/2015/09/main" xmlns:p="http://schemas.openxmlformats.org/presentationml/2006/main">
-  <p:cSld name="">
+<p:sld xmlns:a="http://schemas.openxmlformats.org/drawingml/2006/main" xmlns:r="http://schemas.openxmlformats.org/officeDocument/2006/relationships" xmlns:p="http://schemas.openxmlformats.org/presentationml/2006/main">
+  <p:cSld>
     <p:bg>
       <p:bgPr>
         <a:solidFill>
@@ -11598,6 +10568,8 @@
         <a:xfrm>
           <a:off x="0" y="0"/>
           <a:ext cx="0" cy="0"/>
+          <a:chOff x="0" y="0"/>
+          <a:chExt cx="0" cy="0"/>
         </a:xfrm>
       </p:grpSpPr>
       <p:sp>
@@ -11954,12 +10926,12 @@
         <p:spPr>
           <a:xfrm>
             <a:off x="6064301" y="4905300"/>
-            <a:ext cx="5493699" cy="1554485"/>
+            <a:ext cx="5493699" cy="1666280"/>
           </a:xfrm>
         </p:spPr>
         <p:txBody>
           <a:bodyPr vert="horz" lIns="0" tIns="45720" rIns="0" bIns="45720" rtlCol="0" anchor="ctr">
-            <a:normAutofit lnSpcReduction="20000"/>
+            <a:normAutofit/>
           </a:bodyPr>
           <a:lstStyle/>
           <a:p>
@@ -11969,7 +10941,7 @@
               </a:lnSpc>
             </a:pPr>
             <a:r>
-              <a:rPr lang="id-ID" sz="1500" b="0" i="0" strike="noStrike" cap="none" baseline="0">
+              <a:rPr lang="id-ID" sz="1500" b="0" i="0" strike="noStrike" cap="none" baseline="0" dirty="0">
                 <a:solidFill>
                   <a:srgbClr val="FFFFFF"/>
                 </a:solidFill>
@@ -11988,7 +10960,7 @@
               </a:lnSpc>
             </a:pPr>
             <a:r>
-              <a:rPr lang="id-ID" sz="1500" b="0" i="0" strike="noStrike" cap="none" baseline="0">
+              <a:rPr lang="id-ID" sz="1500" b="0" i="0" strike="noStrike" cap="none" baseline="0" dirty="0">
                 <a:solidFill>
                   <a:srgbClr val="FFFFFF"/>
                 </a:solidFill>
@@ -12007,7 +10979,7 @@
               </a:lnSpc>
             </a:pPr>
             <a:r>
-              <a:rPr lang="id-ID" sz="1500" b="0" i="0" strike="noStrike" cap="none" baseline="0">
+              <a:rPr lang="id-ID" sz="1500" b="0" i="0" strike="noStrike" cap="none" baseline="0" dirty="0">
                 <a:solidFill>
                   <a:srgbClr val="FFFFFF"/>
                 </a:solidFill>
@@ -12026,7 +10998,7 @@
               </a:lnSpc>
             </a:pPr>
             <a:r>
-              <a:rPr lang="id-ID" sz="1500" b="0" i="0" strike="noStrike" cap="none" baseline="0">
+              <a:rPr lang="id-ID" sz="1500" b="0" i="0" strike="noStrike" cap="none" baseline="0" dirty="0">
                 <a:solidFill>
                   <a:srgbClr val="FFFFFF"/>
                 </a:solidFill>
@@ -12056,14 +11028,14 @@
             <p:ph sz="half" idx="1"/>
             <p:extLst>
               <p:ext uri="{D42A27DB-BD31-4B8C-83A1-F6EECF244321}">
-                <p14:modId xmlns:p14="http://schemas.microsoft.com/office/powerpoint/2010/main" val="3445590745"/>
+                <p14:modId xmlns:p14="http://schemas.microsoft.com/office/powerpoint/2010/main" val="4044367585"/>
               </p:ext>
             </p:extLst>
           </p:nvPr>
         </p:nvGraphicFramePr>
         <p:xfrm>
           <a:off x="1346750" y="930063"/>
-          <a:ext cx="9499602" cy="3419856"/>
+          <a:ext cx="9499602" cy="2983992"/>
         </p:xfrm>
         <a:graphic>
           <a:graphicData uri="http://schemas.openxmlformats.org/drawingml/2006/table">
@@ -12097,11 +11069,11 @@
               <a:tr h="1240536">
                 <a:tc>
                   <a:txBody>
-                    <a:bodyPr vert="horz" wrap="square"/>
+                    <a:bodyPr/>
                     <a:lstStyle/>
                     <a:p>
                       <a:r>
-                        <a:rPr lang="id-ID" sz="3300" b="1" i="0" strike="noStrike" cap="none" baseline="0">
+                        <a:rPr lang="id-ID" sz="3000" b="1" i="0" strike="noStrike" cap="none" baseline="0" dirty="0">
                           <a:solidFill>
                             <a:srgbClr val="FFFFFF"/>
                           </a:solidFill>
@@ -12118,11 +11090,11 @@
                 </a:tc>
                 <a:tc>
                   <a:txBody>
-                    <a:bodyPr vert="horz" wrap="square"/>
+                    <a:bodyPr/>
                     <a:lstStyle/>
                     <a:p>
                       <a:r>
-                        <a:rPr lang="id-ID" sz="3300" b="1" i="0" strike="noStrike" cap="none" baseline="0">
+                        <a:rPr lang="id-ID" sz="3000" b="1" i="0" strike="noStrike" cap="none" baseline="0" dirty="0">
                           <a:solidFill>
                             <a:srgbClr val="FFFFFF"/>
                           </a:solidFill>
@@ -12139,11 +11111,11 @@
                 </a:tc>
                 <a:tc>
                   <a:txBody>
-                    <a:bodyPr vert="horz" wrap="square"/>
+                    <a:bodyPr/>
                     <a:lstStyle/>
                     <a:p>
                       <a:r>
-                        <a:rPr lang="id-ID" sz="3300" b="1" i="0" strike="noStrike" cap="none" baseline="0">
+                        <a:rPr lang="id-ID" sz="3000" b="1" i="0" strike="noStrike" cap="none" baseline="0">
                           <a:solidFill>
                             <a:srgbClr val="FFFFFF"/>
                           </a:solidFill>
@@ -12167,11 +11139,11 @@
               <a:tr h="1743456">
                 <a:tc>
                   <a:txBody>
-                    <a:bodyPr vert="horz" wrap="square"/>
+                    <a:bodyPr/>
                     <a:lstStyle/>
                     <a:p>
                       <a:r>
-                        <a:rPr lang="id-ID" sz="3300" b="0" i="0" strike="noStrike" cap="none" baseline="0">
+                        <a:rPr lang="id-ID" sz="3000" b="0" i="0" strike="noStrike" cap="none" baseline="0">
                           <a:solidFill>
                             <a:srgbClr val="000000"/>
                           </a:solidFill>
@@ -12188,11 +11160,11 @@
                 </a:tc>
                 <a:tc>
                   <a:txBody>
-                    <a:bodyPr vert="horz" wrap="square"/>
+                    <a:bodyPr/>
                     <a:lstStyle/>
                     <a:p>
                       <a:r>
-                        <a:rPr lang="id-ID" sz="3300" b="0" i="0" strike="noStrike" cap="none" baseline="0">
+                        <a:rPr lang="id-ID" sz="3000" b="0" i="0" strike="noStrike" cap="none" baseline="0" dirty="0">
                           <a:solidFill>
                             <a:srgbClr val="000000"/>
                           </a:solidFill>
@@ -12209,11 +11181,11 @@
                 </a:tc>
                 <a:tc>
                   <a:txBody>
-                    <a:bodyPr vert="horz" wrap="square"/>
+                    <a:bodyPr/>
                     <a:lstStyle/>
                     <a:p>
                       <a:r>
-                        <a:rPr lang="id-ID" sz="3300" b="0" i="0" strike="noStrike" cap="none" baseline="0">
+                        <a:rPr lang="id-ID" sz="3000" b="0" i="0" strike="noStrike" cap="none" baseline="0" dirty="0">
                           <a:solidFill>
                             <a:srgbClr val="000000"/>
                           </a:solidFill>
@@ -12249,13 +11221,12 @@
     <a:masterClrMapping/>
   </p:clrMapOvr>
   <p:transition/>
-  <p:timing/>
 </p:sld>
 </file>
 
 <file path=ppt/slides/slide5.xml><?xml version="1.0" encoding="utf-8"?>
-<p:sld xmlns:a="http://schemas.openxmlformats.org/drawingml/2006/main" xmlns:r="http://schemas.openxmlformats.org/officeDocument/2006/relationships" xmlns:m="http://schemas.openxmlformats.org/officeDocument/2006/math" xmlns:w="http://schemas.openxmlformats.org/wordprocessingml/2006/main" xmlns:wp="http://schemas.openxmlformats.org/drawingml/2006/wordprocessingDrawing" xmlns:a14="http://schemas.microsoft.com/office/drawing/2010/main" xmlns:mc="http://schemas.openxmlformats.org/markup-compatibility/2006" xmlns:p14="http://schemas.microsoft.com/office/powerpoint/2010/main" xmlns:p15="http://schemas.microsoft.com/office/powerpoint/2012/main" xmlns:p159="http://schemas.microsoft.com/office/powerpoint/2015/09/main" xmlns:p="http://schemas.openxmlformats.org/presentationml/2006/main">
-  <p:cSld name="">
+<p:sld xmlns:a="http://schemas.openxmlformats.org/drawingml/2006/main" xmlns:r="http://schemas.openxmlformats.org/officeDocument/2006/relationships" xmlns:p="http://schemas.openxmlformats.org/presentationml/2006/main">
+  <p:cSld>
     <p:bg>
       <p:bgPr>
         <a:solidFill>
@@ -12274,6 +11245,8 @@
         <a:xfrm>
           <a:off x="0" y="0"/>
           <a:ext cx="0" cy="0"/>
+          <a:chOff x="0" y="0"/>
+          <a:chExt cx="0" cy="0"/>
         </a:xfrm>
       </p:grpSpPr>
       <p:sp useBgFill="1">
@@ -12512,14 +11485,14 @@
             <p:ph idx="1"/>
             <p:extLst>
               <p:ext uri="{D42A27DB-BD31-4B8C-83A1-F6EECF244321}">
-                <p14:modId xmlns:p14="http://schemas.microsoft.com/office/powerpoint/2010/main" val="2541948706"/>
+                <p14:modId xmlns:p14="http://schemas.microsoft.com/office/powerpoint/2010/main" val="3209499062"/>
               </p:ext>
             </p:extLst>
           </p:nvPr>
         </p:nvGraphicFramePr>
         <p:xfrm>
           <a:off x="1096963" y="2287915"/>
-          <a:ext cx="10058401" cy="3697554"/>
+          <a:ext cx="10058401" cy="3407281"/>
         </p:xfrm>
         <a:graphic>
           <a:graphicData uri="http://schemas.openxmlformats.org/drawingml/2006/table">
@@ -12528,14 +11501,14 @@
                 <a:tableStyleId>{5C22544A-7EE6-4342-B048-85BDC9FD1C3A}</a:tableStyleId>
               </a:tblPr>
               <a:tblGrid>
-                <a:gridCol w="5019947">
+                <a:gridCol w="4865298">
                   <a:extLst>
                     <a:ext uri="{9D8B030D-6E8A-4147-A177-3AD203B41FA5}">
                       <a16:colId xmlns:a16="http://schemas.microsoft.com/office/drawing/2014/main" val="496415718"/>
                     </a:ext>
                   </a:extLst>
                 </a:gridCol>
-                <a:gridCol w="5038454">
+                <a:gridCol w="5193103">
                   <a:extLst>
                     <a:ext uri="{9D8B030D-6E8A-4147-A177-3AD203B41FA5}">
                       <a16:colId xmlns:a16="http://schemas.microsoft.com/office/drawing/2014/main" val="159665682"/>
@@ -12546,7 +11519,7 @@
               <a:tr h="363233">
                 <a:tc>
                   <a:txBody>
-                    <a:bodyPr vert="horz" wrap="square"/>
+                    <a:bodyPr/>
                     <a:lstStyle/>
                     <a:p>
                       <a:pPr>
@@ -12575,7 +11548,7 @@
                 </a:tc>
                 <a:tc>
                   <a:txBody>
-                    <a:bodyPr vert="horz" wrap="square"/>
+                    <a:bodyPr/>
                     <a:lstStyle/>
                     <a:p>
                       <a:pPr>
@@ -12611,7 +11584,7 @@
               <a:tr h="1448982">
                 <a:tc>
                   <a:txBody>
-                    <a:bodyPr vert="horz" wrap="square"/>
+                    <a:bodyPr/>
                     <a:lstStyle/>
                     <a:p>
                       <a:pPr>
@@ -12640,7 +11613,7 @@
                 </a:tc>
                 <a:tc>
                   <a:txBody>
-                    <a:bodyPr vert="horz" wrap="square"/>
+                    <a:bodyPr/>
                     <a:lstStyle/>
                     <a:p>
                       <a:pPr>
@@ -12658,31 +11631,7 @@
                           <a:ea typeface="Franklin Gothic Book"/>
                           <a:cs typeface="Franklin Gothic Book"/>
                         </a:rPr>
-                        <a:t>Manjakan diri dalam pelukan kaya dan aromatik Mystic Spice Premium Chai Tea, campuran yang dibuat dengan cermat untuk menghormati tradisi chai India yang abadi.</a:t>
-                      </a:r>
-                      <a:r>
-                        <a:rPr lang="id-ID" sz="1400" b="0" i="0" strike="noStrike" cap="none" baseline="0">
-                          <a:solidFill>
-                            <a:srgbClr val="000000"/>
-                          </a:solidFill>
-                          <a:effectLst/>
-                          <a:latin typeface="Franklin Gothic Book"/>
-                          <a:ea typeface="Franklin Gothic Book"/>
-                          <a:cs typeface="Franklin Gothic Book"/>
-                        </a:rPr>
-                        <a:t> </a:t>
-                      </a:r>
-                      <a:r>
-                        <a:rPr lang="id-ID" sz="1400" b="0" i="0" strike="noStrike" cap="none" baseline="0">
-                          <a:solidFill>
-                            <a:srgbClr val="000000"/>
-                          </a:solidFill>
-                          <a:effectLst/>
-                          <a:latin typeface="Franklin Gothic Book"/>
-                          <a:ea typeface="Franklin Gothic Book"/>
-                          <a:cs typeface="Franklin Gothic Book"/>
-                        </a:rPr>
-                        <a:t>Setiap cangkir menawarkan perjalanan yang memikat melalui lanskap India yang semarak, menghadirkan pengalaman chai yang autentik langsung di rumah Anda</a:t>
+                        <a:t>Manjakan diri dalam pelukan kaya dan aromatik Mystic Spice Premium Chai Tea, campuran yang dibuat dengan cermat untuk menghormati tradisi chai India yang abadi. Setiap cangkir menawarkan perjalanan yang memikat melalui lanskap India yang semarak, menghadirkan pengalaman chai yang autentik langsung di rumah Anda</a:t>
                       </a:r>
                       <a:endParaRPr lang="en-US" sz="2300">
                         <a:effectLst/>
@@ -12700,7 +11649,7 @@
               <a:tr h="363233">
                 <a:tc>
                   <a:txBody>
-                    <a:bodyPr vert="horz" wrap="square"/>
+                    <a:bodyPr/>
                     <a:lstStyle/>
                     <a:p>
                       <a:pPr>
@@ -12729,7 +11678,7 @@
                 </a:tc>
                 <a:tc>
                   <a:txBody>
-                    <a:bodyPr vert="horz" wrap="square"/>
+                    <a:bodyPr/>
                     <a:lstStyle/>
                     <a:p>
                       <a:pPr>
@@ -12765,7 +11714,7 @@
               <a:tr h="1231833">
                 <a:tc>
                   <a:txBody>
-                    <a:bodyPr vert="horz" wrap="square"/>
+                    <a:bodyPr/>
                     <a:lstStyle/>
                     <a:p>
                       <a:pPr>
@@ -12783,31 +11732,7 @@
                           <a:ea typeface="Franklin Gothic Book"/>
                           <a:cs typeface="Franklin Gothic Book"/>
                         </a:rPr>
-                        <a:t>Campuran Autentik: Chai kami adalah perpaduan harmonis dari daun teh hitam premium dan rempah-rempah tanah pilihan, termasuk kayu manis, kapulaga, cengkeh, jahe, dan lada hitam.</a:t>
-                      </a:r>
-                      <a:r>
-                        <a:rPr lang="id-ID" sz="1400" b="0" i="0" strike="noStrike" cap="none" baseline="0">
-                          <a:solidFill>
-                            <a:srgbClr val="000000"/>
-                          </a:solidFill>
-                          <a:effectLst/>
-                          <a:latin typeface="Franklin Gothic Book"/>
-                          <a:ea typeface="Franklin Gothic Book"/>
-                          <a:cs typeface="Franklin Gothic Book"/>
-                        </a:rPr>
-                        <a:t> </a:t>
-                      </a:r>
-                      <a:r>
-                        <a:rPr lang="id-ID" sz="1400" b="0" i="0" strike="noStrike" cap="none" baseline="0">
-                          <a:solidFill>
-                            <a:srgbClr val="000000"/>
-                          </a:solidFill>
-                          <a:effectLst/>
-                          <a:latin typeface="Franklin Gothic Book"/>
-                          <a:ea typeface="Franklin Gothic Book"/>
-                          <a:cs typeface="Franklin Gothic Book"/>
-                        </a:rPr>
-                        <a:t>Resep lama ini menjanjikan rasa yang autentik dan kuat di setiap tegukan.</a:t>
+                        <a:t>Campuran Autentik: Chai kami adalah perpaduan harmonis dari daun teh hitam premium dan rempah-rempah tanah pilihan, termasuk kayu manis, kapulaga, cengkeh, jahe, dan lada hitam. Resep lama ini menjanjikan rasa yang autentik dan kuat di setiap tegukan.</a:t>
                       </a:r>
                       <a:endParaRPr lang="en-US" sz="2300">
                         <a:effectLst/>
@@ -12818,7 +11743,7 @@
                 </a:tc>
                 <a:tc>
                   <a:txBody>
-                    <a:bodyPr vert="horz" wrap="square"/>
+                    <a:bodyPr/>
                     <a:lstStyle/>
                     <a:p>
                       <a:pPr>
@@ -12827,7 +11752,7 @@
                         </a:spcAft>
                       </a:pPr>
                       <a:r>
-                        <a:rPr lang="id-ID" sz="1400" b="0" i="0" strike="noStrike" cap="none" baseline="0">
+                        <a:rPr lang="id-ID" sz="1400" b="0" i="0" strike="noStrike" cap="none" baseline="0" dirty="0">
                           <a:solidFill>
                             <a:srgbClr val="000000"/>
                           </a:solidFill>
@@ -12836,33 +11761,9 @@
                           <a:ea typeface="Franklin Gothic Book"/>
                           <a:cs typeface="Franklin Gothic Book"/>
                         </a:rPr>
-                        <a:t>Bahan yang Meningkatkan Kesehatan: Setiap bahan dalam Mystic Spice Chai Tea dipilih karena manfaat kesehatan alaminya.</a:t>
+                        <a:t>Bahan yang Meningkatkan Kesehatan: Setiap bahan dalam Mystic Spice Chai Tea dipilih karena manfaat kesehatan alaminya. Jahe dan kapulaga membantu melancarkan pencernaan, kayu manis membantu mengatur gula darah, dan cengkeh menambahkan antioksidan.</a:t>
                       </a:r>
-                      <a:r>
-                        <a:rPr lang="id-ID" sz="1400" b="0" i="0" strike="noStrike" cap="none" baseline="0">
-                          <a:solidFill>
-                            <a:srgbClr val="000000"/>
-                          </a:solidFill>
-                          <a:effectLst/>
-                          <a:latin typeface="Franklin Gothic Book"/>
-                          <a:ea typeface="Franklin Gothic Book"/>
-                          <a:cs typeface="Franklin Gothic Book"/>
-                        </a:rPr>
-                        <a:t> </a:t>
-                      </a:r>
-                      <a:r>
-                        <a:rPr lang="id-ID" sz="1400" b="0" i="0" strike="noStrike" cap="none" baseline="0">
-                          <a:solidFill>
-                            <a:srgbClr val="000000"/>
-                          </a:solidFill>
-                          <a:effectLst/>
-                          <a:latin typeface="Franklin Gothic Book"/>
-                          <a:ea typeface="Franklin Gothic Book"/>
-                          <a:cs typeface="Franklin Gothic Book"/>
-                        </a:rPr>
-                        <a:t>Jahe dan kapulaga membantu melancarkan pencernaan, kayu manis membantu mengatur gula darah, dan cengkeh menambahkan antioksidan.</a:t>
-                      </a:r>
-                      <a:endParaRPr lang="en-US" sz="2300">
+                      <a:endParaRPr lang="en-US" sz="2300" dirty="0">
                         <a:effectLst/>
                       </a:endParaRPr>
                     </a:p>
@@ -12890,13 +11791,12 @@
     <a:masterClrMapping/>
   </p:clrMapOvr>
   <p:transition/>
-  <p:timing/>
 </p:sld>
 </file>
 
 <file path=ppt/slides/slide6.xml><?xml version="1.0" encoding="utf-8"?>
-<p:sld xmlns:a="http://schemas.openxmlformats.org/drawingml/2006/main" xmlns:r="http://schemas.openxmlformats.org/officeDocument/2006/relationships" xmlns:m="http://schemas.openxmlformats.org/officeDocument/2006/math" xmlns:w="http://schemas.openxmlformats.org/wordprocessingml/2006/main" xmlns:wp="http://schemas.openxmlformats.org/drawingml/2006/wordprocessingDrawing" xmlns:a14="http://schemas.microsoft.com/office/drawing/2010/main" xmlns:mc="http://schemas.openxmlformats.org/markup-compatibility/2006" xmlns:p14="http://schemas.microsoft.com/office/powerpoint/2010/main" xmlns:p15="http://schemas.microsoft.com/office/powerpoint/2012/main" xmlns:p159="http://schemas.microsoft.com/office/powerpoint/2015/09/main" xmlns:p="http://schemas.openxmlformats.org/presentationml/2006/main">
-  <p:cSld name="">
+<p:sld xmlns:a="http://schemas.openxmlformats.org/drawingml/2006/main" xmlns:r="http://schemas.openxmlformats.org/officeDocument/2006/relationships" xmlns:p="http://schemas.openxmlformats.org/presentationml/2006/main">
+  <p:cSld>
     <p:bg>
       <p:bgPr>
         <a:solidFill>
@@ -12915,6 +11815,8 @@
         <a:xfrm>
           <a:off x="0" y="0"/>
           <a:ext cx="0" cy="0"/>
+          <a:chOff x="0" y="0"/>
+          <a:chExt cx="0" cy="0"/>
         </a:xfrm>
       </p:grpSpPr>
       <p:sp>
@@ -13274,7 +12176,7 @@
         </p:nvGraphicFramePr>
         <p:xfrm>
           <a:off x="5282335" y="1994843"/>
-          <a:ext cx="6275668" cy="4012742"/>
+          <a:ext cx="6275668" cy="3355537"/>
         </p:xfrm>
         <a:graphic>
           <a:graphicData uri="http://schemas.openxmlformats.org/drawingml/2006/table">
@@ -13301,7 +12203,7 @@
               <a:tr h="271208">
                 <a:tc>
                   <a:txBody>
-                    <a:bodyPr vert="horz" wrap="square"/>
+                    <a:bodyPr/>
                     <a:lstStyle/>
                     <a:p>
                       <a:pPr>
@@ -13330,7 +12232,7 @@
                 </a:tc>
                 <a:tc>
                   <a:txBody>
-                    <a:bodyPr vert="horz" wrap="square"/>
+                    <a:bodyPr/>
                     <a:lstStyle/>
                     <a:p>
                       <a:pPr>
@@ -13366,7 +12268,7 @@
               <a:tr h="1081883">
                 <a:tc>
                   <a:txBody>
-                    <a:bodyPr vert="horz" wrap="square"/>
+                    <a:bodyPr/>
                     <a:lstStyle/>
                     <a:p>
                       <a:pPr>
@@ -13384,31 +12286,7 @@
                           <a:ea typeface="Franklin Gothic Book"/>
                           <a:cs typeface="Franklin Gothic Book"/>
                         </a:rPr>
-                        <a:t>Aroma dan Rasa yang Kaya: Aroma yang hangat dan pedas serta rasa yang dalam dan menyegarkan dari chai kami menjadikannya minuman yang sempurna untuk memulai hari Anda atau bersantai di malam hari.</a:t>
-                      </a:r>
-                      <a:r>
-                        <a:rPr lang="id-ID" sz="1100" b="0" i="0" strike="noStrike" cap="none" baseline="0">
-                          <a:solidFill>
-                            <a:srgbClr val="000000"/>
-                          </a:solidFill>
-                          <a:effectLst/>
-                          <a:latin typeface="Franklin Gothic Book"/>
-                          <a:ea typeface="Franklin Gothic Book"/>
-                          <a:cs typeface="Franklin Gothic Book"/>
-                        </a:rPr>
-                        <a:t> </a:t>
-                      </a:r>
-                      <a:r>
-                        <a:rPr lang="id-ID" sz="1100" b="0" i="0" strike="noStrike" cap="none" baseline="0">
-                          <a:solidFill>
-                            <a:srgbClr val="000000"/>
-                          </a:solidFill>
-                          <a:effectLst/>
-                          <a:latin typeface="Franklin Gothic Book"/>
-                          <a:ea typeface="Franklin Gothic Book"/>
-                          <a:cs typeface="Franklin Gothic Book"/>
-                        </a:rPr>
-                        <a:t>Rasanya sangat kuat namun seimbang, menciptakan pengalaman yang nyaman dan menenangkan.</a:t>
+                        <a:t>Aroma dan Rasa yang Kaya: Aroma yang hangat dan pedas serta rasa yang dalam dan menyegarkan dari chai kami menjadikannya minuman yang sempurna untuk memulai hari Anda atau bersantai di malam hari. Rasanya sangat kuat namun seimbang, menciptakan pengalaman yang nyaman dan menenangkan.</a:t>
                       </a:r>
                       <a:endParaRPr lang="en-US" sz="1700">
                         <a:effectLst/>
@@ -13419,7 +12297,7 @@
                 </a:tc>
                 <a:tc>
                   <a:txBody>
-                    <a:bodyPr vert="horz" wrap="square"/>
+                    <a:bodyPr/>
                     <a:lstStyle/>
                     <a:p>
                       <a:pPr>
@@ -13437,31 +12315,7 @@
                           <a:ea typeface="Franklin Gothic Book"/>
                           <a:cs typeface="Franklin Gothic Book"/>
                         </a:rPr>
-                        <a:t>Opsi Penyeduhan Serbaguna: Baik jika Anda menyukai chai yang sangat mengebul, sebagai es teh yang menyegarkan, atau sebagai latte creamy, campuran kami cukup serbaguna untuk memenuhi semua preferensi.</a:t>
-                      </a:r>
-                      <a:r>
-                        <a:rPr lang="id-ID" sz="1100" b="0" i="0" strike="noStrike" cap="none" baseline="0">
-                          <a:solidFill>
-                            <a:srgbClr val="000000"/>
-                          </a:solidFill>
-                          <a:effectLst/>
-                          <a:latin typeface="Franklin Gothic Book"/>
-                          <a:ea typeface="Franklin Gothic Book"/>
-                          <a:cs typeface="Franklin Gothic Book"/>
-                        </a:rPr>
-                        <a:t> </a:t>
-                      </a:r>
-                      <a:r>
-                        <a:rPr lang="id-ID" sz="1100" b="0" i="0" strike="noStrike" cap="none" baseline="0">
-                          <a:solidFill>
-                            <a:srgbClr val="000000"/>
-                          </a:solidFill>
-                          <a:effectLst/>
-                          <a:latin typeface="Franklin Gothic Book"/>
-                          <a:ea typeface="Franklin Gothic Book"/>
-                          <a:cs typeface="Franklin Gothic Book"/>
-                        </a:rPr>
-                        <a:t>Instruksi penyeduhan yang mudah disertakan untuk membantu Anda menikmati chai seperti yang Anda suka.</a:t>
+                        <a:t>Opsi Penyeduhan Serbaguna: Baik jika Anda menyukai chai yang sangat mengebul, sebagai es teh yang menyegarkan, atau sebagai latte creamy, campuran kami cukup serbaguna untuk memenuhi semua preferensi. Instruksi penyeduhan yang mudah disertakan untuk membantu Anda menikmati chai seperti yang Anda suka.</a:t>
                       </a:r>
                       <a:endParaRPr lang="en-US" sz="1700">
                         <a:effectLst/>
@@ -13479,7 +12333,7 @@
               <a:tr h="757613">
                 <a:tc>
                   <a:txBody>
-                    <a:bodyPr vert="horz" wrap="square"/>
+                    <a:bodyPr/>
                     <a:lstStyle/>
                     <a:p>
                       <a:pPr>
@@ -13508,7 +12362,7 @@
                 </a:tc>
                 <a:tc>
                   <a:txBody>
-                    <a:bodyPr vert="horz" wrap="square"/>
+                    <a:bodyPr/>
                     <a:lstStyle/>
                     <a:p>
                       <a:pPr>
@@ -13544,7 +12398,7 @@
               <a:tr h="757613">
                 <a:tc>
                   <a:txBody>
-                    <a:bodyPr vert="horz" wrap="square"/>
+                    <a:bodyPr/>
                     <a:lstStyle/>
                     <a:p>
                       <a:pPr>
@@ -13562,31 +12416,7 @@
                           <a:ea typeface="Franklin Gothic Book"/>
                           <a:cs typeface="Franklin Gothic Book"/>
                         </a:rPr>
-                        <a:t>Jaminan Kepuasan Pelanggan: Kami mendukung produk kami dan menawarkan jaminan kepuasan.</a:t>
-                      </a:r>
-                      <a:r>
-                        <a:rPr lang="id-ID" sz="1100" b="0" i="0" strike="noStrike" cap="none" baseline="0">
-                          <a:solidFill>
-                            <a:srgbClr val="000000"/>
-                          </a:solidFill>
-                          <a:effectLst/>
-                          <a:latin typeface="Franklin Gothic Book"/>
-                          <a:ea typeface="Franklin Gothic Book"/>
-                          <a:cs typeface="Franklin Gothic Book"/>
-                        </a:rPr>
-                        <a:t> </a:t>
-                      </a:r>
-                      <a:r>
-                        <a:rPr lang="id-ID" sz="1100" b="0" i="0" strike="noStrike" cap="none" baseline="0">
-                          <a:solidFill>
-                            <a:srgbClr val="000000"/>
-                          </a:solidFill>
-                          <a:effectLst/>
-                          <a:latin typeface="Franklin Gothic Book"/>
-                          <a:ea typeface="Franklin Gothic Book"/>
-                          <a:cs typeface="Franklin Gothic Book"/>
-                        </a:rPr>
-                        <a:t>Jika Mystic Spice Chai Tea tidak memenuhi harapan Anda, kami berkomitmen untuk memperbaikinya.</a:t>
+                        <a:t>Jaminan Kepuasan Pelanggan: Kami mendukung produk kami dan menawarkan jaminan kepuasan. Jika Mystic Spice Chai Tea tidak memenuhi harapan Anda, kami berkomitmen untuk memperbaikinya.</a:t>
                       </a:r>
                       <a:endParaRPr lang="en-US" sz="1700">
                         <a:effectLst/>
@@ -13597,7 +12427,7 @@
                 </a:tc>
                 <a:tc>
                   <a:txBody>
-                    <a:bodyPr vert="horz" wrap="square"/>
+                    <a:bodyPr/>
                     <a:lstStyle/>
                     <a:p>
                       <a:pPr>
@@ -13645,13 +12475,12 @@
     <a:masterClrMapping/>
   </p:clrMapOvr>
   <p:transition/>
-  <p:timing/>
 </p:sld>
 </file>
 
 <file path=ppt/slides/slide7.xml><?xml version="1.0" encoding="utf-8"?>
-<p:sld xmlns:a="http://schemas.openxmlformats.org/drawingml/2006/main" xmlns:r="http://schemas.openxmlformats.org/officeDocument/2006/relationships" xmlns:m="http://schemas.openxmlformats.org/officeDocument/2006/math" xmlns:w="http://schemas.openxmlformats.org/wordprocessingml/2006/main" xmlns:wp="http://schemas.openxmlformats.org/drawingml/2006/wordprocessingDrawing" xmlns:a14="http://schemas.microsoft.com/office/drawing/2010/main" xmlns:mc="http://schemas.openxmlformats.org/markup-compatibility/2006" xmlns:p14="http://schemas.microsoft.com/office/powerpoint/2010/main" xmlns:p15="http://schemas.microsoft.com/office/powerpoint/2012/main" xmlns:p159="http://schemas.microsoft.com/office/powerpoint/2015/09/main" xmlns:p="http://schemas.openxmlformats.org/presentationml/2006/main">
-  <p:cSld name="">
+<p:sld xmlns:a="http://schemas.openxmlformats.org/drawingml/2006/main" xmlns:r="http://schemas.openxmlformats.org/officeDocument/2006/relationships" xmlns:p="http://schemas.openxmlformats.org/presentationml/2006/main">
+  <p:cSld>
     <p:bg>
       <p:bgPr>
         <a:solidFill>
@@ -13670,6 +12499,8 @@
         <a:xfrm>
           <a:off x="0" y="0"/>
           <a:ext cx="0" cy="0"/>
+          <a:chOff x="0" y="0"/>
+          <a:chExt cx="0" cy="0"/>
         </a:xfrm>
       </p:grpSpPr>
       <p:sp>
@@ -13965,13 +12796,13 @@
         </p:nvSpPr>
         <p:spPr>
           <a:xfrm>
-            <a:off x="6411684" y="2407436"/>
-            <a:ext cx="5127172" cy="3461658"/>
+            <a:off x="6411684" y="2407435"/>
+            <a:ext cx="5127172" cy="3644170"/>
           </a:xfrm>
         </p:spPr>
         <p:txBody>
           <a:bodyPr vert="horz" lIns="0" tIns="45720" rIns="0" bIns="45720" rtlCol="0">
-            <a:normAutofit fontScale="95000" lnSpcReduction="20000"/>
+            <a:normAutofit fontScale="95000"/>
           </a:bodyPr>
           <a:lstStyle/>
           <a:p>
@@ -13981,7 +12812,7 @@
               </a:lnSpc>
             </a:pPr>
             <a:r>
-              <a:rPr lang="id-ID" sz="1400" b="0" i="0" strike="noStrike" cap="none" baseline="0">
+              <a:rPr lang="id-ID" sz="1400" b="0" i="0" strike="noStrike" cap="none" baseline="0" dirty="0">
                 <a:solidFill>
                   <a:srgbClr val="404040"/>
                 </a:solidFill>
@@ -14000,7 +12831,7 @@
               </a:lnSpc>
             </a:pPr>
             <a:r>
-              <a:rPr lang="id-ID" sz="1400" b="0" i="0" strike="noStrike" cap="none" baseline="0">
+              <a:rPr lang="id-ID" sz="1400" b="0" i="0" strike="noStrike" cap="none" baseline="0" dirty="0">
                 <a:solidFill>
                   <a:srgbClr val="404040"/>
                 </a:solidFill>
@@ -14019,7 +12850,7 @@
               </a:lnSpc>
             </a:pPr>
             <a:r>
-              <a:rPr lang="id-ID" sz="1400" b="0" i="0" strike="noStrike" cap="none" baseline="0">
+              <a:rPr lang="id-ID" sz="1400" b="0" i="0" strike="noStrike" cap="none" baseline="0" dirty="0">
                 <a:solidFill>
                   <a:srgbClr val="404040"/>
                 </a:solidFill>
@@ -14038,7 +12869,7 @@
               </a:lnSpc>
             </a:pPr>
             <a:r>
-              <a:rPr lang="id-ID" sz="1400" b="0" i="0" strike="noStrike" cap="none" baseline="0">
+              <a:rPr lang="id-ID" sz="1400" b="0" i="0" strike="noStrike" cap="none" baseline="0" dirty="0">
                 <a:solidFill>
                   <a:srgbClr val="404040"/>
                 </a:solidFill>
@@ -14057,7 +12888,7 @@
               </a:lnSpc>
             </a:pPr>
             <a:r>
-              <a:rPr lang="id-ID" sz="1400" b="0" i="0" strike="noStrike" cap="none" baseline="0">
+              <a:rPr lang="id-ID" sz="1400" b="0" i="0" strike="noStrike" cap="none" baseline="0" dirty="0">
                 <a:solidFill>
                   <a:srgbClr val="404040"/>
                 </a:solidFill>
@@ -14076,7 +12907,7 @@
               </a:lnSpc>
             </a:pPr>
             <a:r>
-              <a:rPr lang="id-ID" sz="1400" b="0" i="0" strike="noStrike" cap="none" baseline="0">
+              <a:rPr lang="id-ID" sz="1400" b="0" i="0" strike="noStrike" cap="none" baseline="0" dirty="0">
                 <a:solidFill>
                   <a:srgbClr val="404040"/>
                 </a:solidFill>
@@ -14095,7 +12926,7 @@
               </a:lnSpc>
             </a:pPr>
             <a:r>
-              <a:rPr lang="id-ID" sz="1400" b="0" i="0" strike="noStrike" cap="none" baseline="0">
+              <a:rPr lang="id-ID" sz="1400" b="0" i="0" strike="noStrike" cap="none" baseline="0" dirty="0">
                 <a:solidFill>
                   <a:srgbClr val="404040"/>
                 </a:solidFill>
@@ -14114,7 +12945,7 @@
               </a:lnSpc>
             </a:pPr>
             <a:r>
-              <a:rPr lang="id-ID" sz="1400" b="0" i="0" strike="noStrike" cap="none" baseline="0">
+              <a:rPr lang="id-ID" sz="1400" b="0" i="0" strike="noStrike" cap="none" baseline="0" dirty="0">
                 <a:solidFill>
                   <a:srgbClr val="404040"/>
                 </a:solidFill>
@@ -14133,7 +12964,7 @@
               </a:lnSpc>
             </a:pPr>
             <a:r>
-              <a:rPr lang="id-ID" sz="1400" b="0" i="0" strike="noStrike" cap="none" baseline="0">
+              <a:rPr lang="id-ID" sz="1400" b="0" i="0" strike="noStrike" cap="none" baseline="0" dirty="0">
                 <a:solidFill>
                   <a:srgbClr val="404040"/>
                 </a:solidFill>
@@ -14232,7 +13063,7 @@
         </p:nvGraphicFramePr>
         <p:xfrm>
           <a:off x="643192" y="1541387"/>
-          <a:ext cx="5115348" cy="3728172"/>
+          <a:ext cx="5115348" cy="3455187"/>
         </p:xfrm>
         <a:graphic>
           <a:graphicData uri="http://schemas.openxmlformats.org/drawingml/2006/table">
@@ -14269,7 +13100,7 @@
               <a:tr h="1697807">
                 <a:tc>
                   <a:txBody>
-                    <a:bodyPr vert="horz" wrap="square"/>
+                    <a:bodyPr/>
                     <a:lstStyle/>
                     <a:p>
                       <a:r>
@@ -14304,11 +13135,11 @@
                 </a:tc>
                 <a:tc>
                   <a:txBody>
-                    <a:bodyPr vert="horz" wrap="square"/>
+                    <a:bodyPr/>
                     <a:lstStyle/>
                     <a:p>
                       <a:r>
-                        <a:rPr lang="id-ID" sz="2000" b="1" i="0" strike="noStrike" cap="all" baseline="0">
+                        <a:rPr lang="id-ID" sz="2000" b="1" i="0" strike="noStrike" cap="all" baseline="0" dirty="0">
                           <a:solidFill>
                             <a:srgbClr val="000000"/>
                           </a:solidFill>
@@ -14339,7 +13170,7 @@
                 </a:tc>
                 <a:tc>
                   <a:txBody>
-                    <a:bodyPr vert="horz" wrap="square"/>
+                    <a:bodyPr/>
                     <a:lstStyle/>
                     <a:p>
                       <a:r>
@@ -14381,7 +13212,7 @@
               <a:tr h="680116">
                 <a:tc>
                   <a:txBody>
-                    <a:bodyPr vert="horz" wrap="square"/>
+                    <a:bodyPr/>
                     <a:lstStyle/>
                     <a:p>
                       <a:r>
@@ -14421,7 +13252,7 @@
                 </a:tc>
                 <a:tc>
                   <a:txBody>
-                    <a:bodyPr vert="horz" wrap="square"/>
+                    <a:bodyPr/>
                     <a:lstStyle/>
                     <a:p>
                       <a:r>
@@ -14461,7 +13292,7 @@
                 </a:tc>
                 <a:tc>
                   <a:txBody>
-                    <a:bodyPr vert="horz" wrap="square"/>
+                    <a:bodyPr/>
                     <a:lstStyle/>
                     <a:p>
                       <a:r>
@@ -14508,7 +13339,7 @@
               <a:tr h="1077264">
                 <a:tc>
                   <a:txBody>
-                    <a:bodyPr vert="horz" wrap="square"/>
+                    <a:bodyPr/>
                     <a:lstStyle/>
                     <a:p>
                       <a:r>
@@ -14551,7 +13382,7 @@
                 </a:tc>
                 <a:tc>
                   <a:txBody>
-                    <a:bodyPr vert="horz" wrap="square"/>
+                    <a:bodyPr/>
                     <a:lstStyle/>
                     <a:p>
                       <a:r>
@@ -14594,11 +13425,11 @@
                 </a:tc>
                 <a:tc>
                   <a:txBody>
-                    <a:bodyPr vert="horz" wrap="square"/>
+                    <a:bodyPr/>
                     <a:lstStyle/>
                     <a:p>
                       <a:r>
-                        <a:rPr lang="id-ID" sz="2600" b="0" i="0" strike="noStrike" cap="none" baseline="0">
+                        <a:rPr lang="id-ID" sz="2600" b="0" i="0" strike="noStrike" cap="none" baseline="0" dirty="0">
                           <a:solidFill>
                             <a:srgbClr val="000000"/>
                           </a:solidFill>
@@ -14656,13 +13487,12 @@
     <a:masterClrMapping/>
   </p:clrMapOvr>
   <p:transition/>
-  <p:timing/>
 </p:sld>
 </file>
 
 <file path=ppt/slides/slide8.xml><?xml version="1.0" encoding="utf-8"?>
-<p:sld xmlns:a="http://schemas.openxmlformats.org/drawingml/2006/main" xmlns:r="http://schemas.openxmlformats.org/officeDocument/2006/relationships" xmlns:m="http://schemas.openxmlformats.org/officeDocument/2006/math" xmlns:w="http://schemas.openxmlformats.org/wordprocessingml/2006/main" xmlns:wp="http://schemas.openxmlformats.org/drawingml/2006/wordprocessingDrawing" xmlns:a14="http://schemas.microsoft.com/office/drawing/2010/main" xmlns:mc="http://schemas.openxmlformats.org/markup-compatibility/2006" xmlns:p14="http://schemas.microsoft.com/office/powerpoint/2010/main" xmlns:p15="http://schemas.microsoft.com/office/powerpoint/2012/main" xmlns:p159="http://schemas.microsoft.com/office/powerpoint/2015/09/main" xmlns:p="http://schemas.openxmlformats.org/presentationml/2006/main">
-  <p:cSld name="">
+<p:sld xmlns:a="http://schemas.openxmlformats.org/drawingml/2006/main" xmlns:r="http://schemas.openxmlformats.org/officeDocument/2006/relationships" xmlns:p="http://schemas.openxmlformats.org/presentationml/2006/main">
+  <p:cSld>
     <p:bg>
       <p:bgPr>
         <a:solidFill>
@@ -14681,6 +13511,8 @@
         <a:xfrm>
           <a:off x="0" y="0"/>
           <a:ext cx="0" cy="0"/>
+          <a:chOff x="0" y="0"/>
+          <a:chExt cx="0" cy="0"/>
         </a:xfrm>
       </p:grpSpPr>
       <p:sp useBgFill="1">
@@ -14867,7 +13699,7 @@
         <p:spPr>
           <a:xfrm>
             <a:off x="5231958" y="605896"/>
-            <a:ext cx="5923721" cy="5646208"/>
+            <a:ext cx="6580597" cy="5646208"/>
           </a:xfrm>
         </p:spPr>
         <p:txBody>
@@ -14877,7 +13709,7 @@
           <a:lstStyle/>
           <a:p>
             <a:r>
-              <a:rPr lang="id-ID" sz="2200" b="0" i="0" strike="noStrike" cap="none" baseline="0">
+              <a:rPr lang="id-ID" sz="2200" b="0" i="0" strike="noStrike" cap="none" baseline="0" dirty="0">
                 <a:solidFill>
                   <a:srgbClr val="404040"/>
                 </a:solidFill>
@@ -14892,7 +13724,7 @@
           <a:p>
             <a:pPr lvl="1"/>
             <a:r>
-              <a:rPr lang="id-ID" sz="2200" b="0" i="0" strike="noStrike" cap="none" baseline="0">
+              <a:rPr lang="id-ID" sz="2200" b="0" i="0" strike="noStrike" cap="none" baseline="0" dirty="0">
                 <a:solidFill>
                   <a:srgbClr val="404040"/>
                 </a:solidFill>
@@ -14907,7 +13739,7 @@
           <a:p>
             <a:pPr lvl="1"/>
             <a:r>
-              <a:rPr lang="id-ID" sz="2200" b="0" i="0" strike="noStrike" cap="none" baseline="0">
+              <a:rPr lang="id-ID" sz="2200" b="0" i="0" strike="noStrike" cap="none" baseline="0" dirty="0">
                 <a:solidFill>
                   <a:srgbClr val="404040"/>
                 </a:solidFill>
@@ -14922,7 +13754,7 @@
           <a:p>
             <a:pPr lvl="1"/>
             <a:r>
-              <a:rPr lang="id-ID" sz="2200" b="0" i="0" strike="noStrike" cap="none" baseline="0">
+              <a:rPr lang="id-ID" sz="2200" b="0" i="0" strike="noStrike" cap="none" baseline="0" dirty="0">
                 <a:solidFill>
                   <a:srgbClr val="404040"/>
                 </a:solidFill>
@@ -14937,7 +13769,7 @@
           <a:p>
             <a:pPr lvl="1"/>
             <a:r>
-              <a:rPr lang="id-ID" sz="2200" b="0" i="0" strike="noStrike" cap="none" baseline="0">
+              <a:rPr lang="id-ID" sz="2200" b="0" i="0" strike="noStrike" cap="none" baseline="0" dirty="0">
                 <a:solidFill>
                   <a:srgbClr val="404040"/>
                 </a:solidFill>
@@ -14951,7 +13783,7 @@
           </a:p>
           <a:p>
             <a:r>
-              <a:rPr lang="id-ID" sz="2200" b="0" i="0" strike="noStrike" cap="none" baseline="0">
+              <a:rPr lang="id-ID" sz="2200" b="0" i="0" strike="noStrike" cap="none" baseline="0" dirty="0">
                 <a:solidFill>
                   <a:srgbClr val="404040"/>
                 </a:solidFill>
@@ -14965,7 +13797,7 @@
           </a:p>
           <a:p>
             <a:r>
-              <a:rPr lang="id-ID" sz="2200" b="0" i="0" strike="noStrike" cap="none" baseline="0">
+              <a:rPr lang="id-ID" sz="2200" b="0" i="0" strike="noStrike" cap="none" baseline="0" dirty="0">
                 <a:solidFill>
                   <a:srgbClr val="404040"/>
                 </a:solidFill>
@@ -14990,13 +13822,12 @@
     <a:masterClrMapping/>
   </p:clrMapOvr>
   <p:transition/>
-  <p:timing/>
 </p:sld>
 </file>
 
 <file path=ppt/slides/slide9.xml><?xml version="1.0" encoding="utf-8"?>
-<p:sld xmlns:a="http://schemas.openxmlformats.org/drawingml/2006/main" xmlns:r="http://schemas.openxmlformats.org/officeDocument/2006/relationships" xmlns:m="http://schemas.openxmlformats.org/officeDocument/2006/math" xmlns:w="http://schemas.openxmlformats.org/wordprocessingml/2006/main" xmlns:wp="http://schemas.openxmlformats.org/drawingml/2006/wordprocessingDrawing" xmlns:a14="http://schemas.microsoft.com/office/drawing/2010/main" xmlns:mc="http://schemas.openxmlformats.org/markup-compatibility/2006" xmlns:p14="http://schemas.microsoft.com/office/powerpoint/2010/main" xmlns:p15="http://schemas.microsoft.com/office/powerpoint/2012/main" xmlns:p159="http://schemas.microsoft.com/office/powerpoint/2015/09/main" xmlns:p="http://schemas.openxmlformats.org/presentationml/2006/main">
-  <p:cSld name="">
+<p:sld xmlns:a="http://schemas.openxmlformats.org/drawingml/2006/main" xmlns:r="http://schemas.openxmlformats.org/officeDocument/2006/relationships" xmlns:p="http://schemas.openxmlformats.org/presentationml/2006/main">
+  <p:cSld>
     <p:bg>
       <p:bgPr>
         <a:solidFill>
@@ -15015,6 +13846,8 @@
         <a:xfrm>
           <a:off x="0" y="0"/>
           <a:ext cx="0" cy="0"/>
+          <a:chOff x="0" y="0"/>
+          <a:chExt cx="0" cy="0"/>
         </a:xfrm>
       </p:grpSpPr>
       <p:sp useBgFill="1">
@@ -15294,12 +14127,11 @@
     <a:masterClrMapping/>
   </p:clrMapOvr>
   <p:transition/>
-  <p:timing/>
 </p:sld>
 </file>
 
 <file path=ppt/tags/tag1.xml><?xml version="1.0" encoding="utf-8"?>
-<p:tagLst xmlns:p="http://schemas.openxmlformats.org/presentationml/2006/main">
+<p:tagLst xmlns:a="http://schemas.openxmlformats.org/drawingml/2006/main" xmlns:r="http://schemas.openxmlformats.org/officeDocument/2006/relationships" xmlns:p="http://schemas.openxmlformats.org/presentationml/2006/main">
   <p:tag name="AS_OS" val="Unix 3.10.0.1160"/>
   <p:tag name="AS_RELEASE_DATE" val="2023.06.30"/>
   <p:tag name="AS_TITLE" val="Aspose.Slides for Java"/>
@@ -15308,7 +14140,7 @@
 </file>
 
 <file path=ppt/theme/theme1.xml><?xml version="1.0" encoding="utf-8"?>
-<a:theme xmlns:r="http://schemas.openxmlformats.org/officeDocument/2006/relationships" xmlns:a="http://schemas.openxmlformats.org/drawingml/2006/main" name="RetrospectVTI">
+<a:theme xmlns:a="http://schemas.openxmlformats.org/drawingml/2006/main" name="RetrospectVTI">
   <a:themeElements>
     <a:clrScheme name="Office">
       <a:dk1>
@@ -15350,8 +14182,8 @@
     </a:clrScheme>
     <a:fontScheme name="Retrospect">
       <a:majorFont>
-        <a:latin typeface="Bookman Old Style" panose="020f0302020204030204"/>
-        <a:ea typeface="Bookman Old Style" panose="020f0302020204030204"/>
+        <a:latin typeface="Bookman Old Style" panose="020F0302020204030204"/>
+        <a:ea typeface="Bookman Old Style" panose="020F0302020204030204"/>
         <a:cs typeface="Arial"/>
         <a:font script="Jpan" typeface="ＭＳ Ｐゴシック"/>
         <a:font script="Hang" typeface="맑은 고딕"/>
@@ -15385,8 +14217,8 @@
         <a:font script="Geor" typeface="Sylfaen"/>
       </a:majorFont>
       <a:minorFont>
-        <a:latin typeface="Franklin Gothic Book" panose="020f0502020204030204"/>
-        <a:ea typeface="Franklin Gothic Book" panose="020f0502020204030204"/>
+        <a:latin typeface="Franklin Gothic Book" panose="020F0502020204030204"/>
+        <a:ea typeface="Franklin Gothic Book" panose="020F0502020204030204"/>
         <a:cs typeface="Arial"/>
         <a:font script="Jpan" typeface="ＭＳ Ｐゴシック"/>
         <a:font script="Hang" typeface="맑은 고딕"/>
@@ -15581,6 +14413,7 @@
     </a:fmtScheme>
   </a:themeElements>
   <a:objectDefaults/>
+  <a:extraClrSchemeLst/>
   <a:extLst>
     <a:ext uri="{05A4C25C-085E-4340-85A3-A5531E510DB2}">
       <thm15:themeFamily xmlns:thm15="http://schemas.microsoft.com/office/thememl/2012/main" name="RetrospectVTI" id="{ABE3C30C-0FC0-4450-828E-52DE70F1BCCB}" vid="{A6E2497D-935A-4CFD-B9FD-6DCB15FA68BF}"/>
@@ -15590,7 +14423,7 @@
 </file>
 
 <file path=ppt/theme/theme2.xml><?xml version="1.0" encoding="utf-8"?>
-<a:theme xmlns:r="http://schemas.openxmlformats.org/officeDocument/2006/relationships" xmlns:a="http://schemas.openxmlformats.org/drawingml/2006/main" name="Office Theme">
+<a:theme xmlns:a="http://schemas.openxmlformats.org/drawingml/2006/main" name="Office Theme">
   <a:themeElements>
     <a:clrScheme name="Office">
       <a:dk1>
@@ -15895,6 +14728,7 @@
       </a:style>
     </a:lnDef>
   </a:objectDefaults>
+  <a:extraClrSchemeLst/>
   <a:extLst>
     <a:ext uri="{05A4C25C-085E-4340-85A3-A5531E510DB2}">
       <thm15:themeFamily xmlns:thm15="http://schemas.microsoft.com/office/thememl/2012/main" name="Office Theme" id="{2E142A2C-CD16-42D6-873A-C26D2A0506FA}" vid="{1BDDFF52-6CD6-40A5-AB3C-68EB2F1E4D0A}"/>

</xml_diff>